<commit_message>
tactics to handle imbalance data
</commit_message>
<xml_diff>
--- a/documents/presentation/Final Presentation.pptx
+++ b/documents/presentation/Final Presentation.pptx
@@ -39,6 +39,7 @@
     <p:sldId id="283" r:id="rId33"/>
     <p:sldId id="284" r:id="rId34"/>
     <p:sldId id="285" r:id="rId35"/>
+    <p:sldId id="286" r:id="rId36"/>
   </p:sldIdLst>
   <p:sldSz cy="6858000" cx="12192000"/>
   <p:notesSz cx="6858000" cy="9144000"/>
@@ -2733,7 +2734,106 @@
       </p:grpSpPr>
       <p:sp>
         <p:nvSpPr>
-          <p:cNvPr id="283" name="Google Shape;283;p24:notes"/>
+          <p:cNvPr id="283" name="Google Shape;283;g6478606def_0_1:notes"/>
+          <p:cNvSpPr/>
+          <p:nvPr>
+            <p:ph idx="2" type="sldImg"/>
+          </p:nvPr>
+        </p:nvSpPr>
+        <p:spPr>
+          <a:xfrm>
+            <a:off x="1143225" y="685800"/>
+            <a:ext cx="4572300" cy="3429000"/>
+          </a:xfrm>
+          <a:custGeom>
+            <a:rect b="b" l="l" r="r" t="t"/>
+            <a:pathLst>
+              <a:path extrusionOk="0" h="120000" w="120000">
+                <a:moveTo>
+                  <a:pt x="0" y="0"/>
+                </a:moveTo>
+                <a:lnTo>
+                  <a:pt x="120000" y="0"/>
+                </a:lnTo>
+                <a:lnTo>
+                  <a:pt x="120000" y="120000"/>
+                </a:lnTo>
+                <a:lnTo>
+                  <a:pt x="0" y="120000"/>
+                </a:lnTo>
+                <a:close/>
+              </a:path>
+            </a:pathLst>
+          </a:custGeom>
+        </p:spPr>
+      </p:sp>
+      <p:sp>
+        <p:nvSpPr>
+          <p:cNvPr id="284" name="Google Shape;284;g6478606def_0_1:notes"/>
+          <p:cNvSpPr txBox="1"/>
+          <p:nvPr>
+            <p:ph idx="1" type="body"/>
+          </p:nvPr>
+        </p:nvSpPr>
+        <p:spPr>
+          <a:xfrm>
+            <a:off x="685800" y="4343400"/>
+            <a:ext cx="5486400" cy="4114800"/>
+          </a:xfrm>
+          <a:prstGeom prst="rect">
+            <a:avLst/>
+          </a:prstGeom>
+        </p:spPr>
+        <p:txBody>
+          <a:bodyPr anchorCtr="0" anchor="t" bIns="91425" lIns="91425" spcFirstLastPara="1" rIns="91425" wrap="square" tIns="91425">
+            <a:noAutofit/>
+          </a:bodyPr>
+          <a:lstStyle/>
+          <a:p>
+            <a:pPr indent="0" lvl="0" marL="0" rtl="0" algn="l">
+              <a:spcBef>
+                <a:spcPts val="0"/>
+              </a:spcBef>
+              <a:spcAft>
+                <a:spcPts val="0"/>
+              </a:spcAft>
+              <a:buNone/>
+            </a:pPr>
+            <a:r>
+              <a:t/>
+            </a:r>
+            <a:endParaRPr/>
+          </a:p>
+        </p:txBody>
+      </p:sp>
+    </p:spTree>
+  </p:cSld>
+  <p:clrMapOvr>
+    <a:masterClrMapping/>
+  </p:clrMapOvr>
+</p:notes>
+</file>
+
+<file path=ppt/notesSlides/notesSlide25.xml><?xml version="1.0" encoding="utf-8"?>
+<p:notes xmlns:a="http://schemas.openxmlformats.org/drawingml/2006/main" xmlns:r="http://schemas.openxmlformats.org/officeDocument/2006/relationships" xmlns:mc="http://schemas.openxmlformats.org/markup-compatibility/2006" xmlns:mv="urn:schemas-microsoft-com:mac:vml" xmlns:p="http://schemas.openxmlformats.org/presentationml/2006/main" xmlns:c="http://schemas.openxmlformats.org/drawingml/2006/chart" xmlns:dgm="http://schemas.openxmlformats.org/drawingml/2006/diagram" xmlns:o="urn:schemas-microsoft-com:office:office" xmlns:v="urn:schemas-microsoft-com:vml" xmlns:pvml="urn:schemas-microsoft-com:office:powerpoint" xmlns:com="http://schemas.openxmlformats.org/drawingml/2006/compatibility" xmlns:p14="http://schemas.microsoft.com/office/powerpoint/2010/main" xmlns:p15="http://schemas.microsoft.com/office/powerpoint/2012/main" showMasterPhAnim="0" showMasterSp="0">
+  <p:cSld>
+    <p:spTree>
+      <p:nvGrpSpPr>
+        <p:cNvPr id="288" name="Shape 288"/>
+        <p:cNvGrpSpPr/>
+        <p:nvPr/>
+      </p:nvGrpSpPr>
+      <p:grpSpPr>
+        <a:xfrm>
+          <a:off x="0" y="0"/>
+          <a:ext cx="0" cy="0"/>
+          <a:chOff x="0" y="0"/>
+          <a:chExt cx="0" cy="0"/>
+        </a:xfrm>
+      </p:grpSpPr>
+      <p:sp>
+        <p:nvSpPr>
+          <p:cNvPr id="289" name="Google Shape;289;p24:notes"/>
           <p:cNvSpPr txBox="1"/>
           <p:nvPr>
             <p:ph idx="1" type="body"/>
@@ -2780,7 +2880,7 @@
       </p:sp>
       <p:sp>
         <p:nvSpPr>
-          <p:cNvPr id="284" name="Google Shape;284;p24:notes"/>
+          <p:cNvPr id="290" name="Google Shape;290;p24:notes"/>
           <p:cNvSpPr/>
           <p:nvPr>
             <p:ph idx="2" type="sldImg"/>
@@ -2831,12 +2931,12 @@
 </p:notes>
 </file>
 
-<file path=ppt/notesSlides/notesSlide25.xml><?xml version="1.0" encoding="utf-8"?>
+<file path=ppt/notesSlides/notesSlide26.xml><?xml version="1.0" encoding="utf-8"?>
 <p:notes xmlns:a="http://schemas.openxmlformats.org/drawingml/2006/main" xmlns:r="http://schemas.openxmlformats.org/officeDocument/2006/relationships" xmlns:mc="http://schemas.openxmlformats.org/markup-compatibility/2006" xmlns:mv="urn:schemas-microsoft-com:mac:vml" xmlns:p="http://schemas.openxmlformats.org/presentationml/2006/main" xmlns:c="http://schemas.openxmlformats.org/drawingml/2006/chart" xmlns:dgm="http://schemas.openxmlformats.org/drawingml/2006/diagram" xmlns:o="urn:schemas-microsoft-com:office:office" xmlns:v="urn:schemas-microsoft-com:vml" xmlns:pvml="urn:schemas-microsoft-com:office:powerpoint" xmlns:com="http://schemas.openxmlformats.org/drawingml/2006/compatibility" xmlns:p14="http://schemas.microsoft.com/office/powerpoint/2010/main" xmlns:p15="http://schemas.microsoft.com/office/powerpoint/2012/main" showMasterPhAnim="0" showMasterSp="0">
   <p:cSld>
     <p:spTree>
       <p:nvGrpSpPr>
-        <p:cNvPr id="291" name="Shape 291"/>
+        <p:cNvPr id="297" name="Shape 297"/>
         <p:cNvGrpSpPr/>
         <p:nvPr/>
       </p:nvGrpSpPr>
@@ -2850,7 +2950,7 @@
       </p:grpSpPr>
       <p:sp>
         <p:nvSpPr>
-          <p:cNvPr id="292" name="Google Shape;292;p25:notes"/>
+          <p:cNvPr id="298" name="Google Shape;298;p25:notes"/>
           <p:cNvSpPr/>
           <p:nvPr>
             <p:ph idx="2" type="sldImg"/>
@@ -2895,7 +2995,7 @@
       </p:sp>
       <p:sp>
         <p:nvSpPr>
-          <p:cNvPr id="293" name="Google Shape;293;p25:notes"/>
+          <p:cNvPr id="299" name="Google Shape;299;p25:notes"/>
           <p:cNvSpPr txBox="1"/>
           <p:nvPr>
             <p:ph idx="1" type="body"/>
@@ -2948,12 +3048,12 @@
 </p:notes>
 </file>
 
-<file path=ppt/notesSlides/notesSlide26.xml><?xml version="1.0" encoding="utf-8"?>
+<file path=ppt/notesSlides/notesSlide27.xml><?xml version="1.0" encoding="utf-8"?>
 <p:notes xmlns:a="http://schemas.openxmlformats.org/drawingml/2006/main" xmlns:r="http://schemas.openxmlformats.org/officeDocument/2006/relationships" xmlns:mc="http://schemas.openxmlformats.org/markup-compatibility/2006" xmlns:mv="urn:schemas-microsoft-com:mac:vml" xmlns:p="http://schemas.openxmlformats.org/presentationml/2006/main" xmlns:c="http://schemas.openxmlformats.org/drawingml/2006/chart" xmlns:dgm="http://schemas.openxmlformats.org/drawingml/2006/diagram" xmlns:o="urn:schemas-microsoft-com:office:office" xmlns:v="urn:schemas-microsoft-com:vml" xmlns:pvml="urn:schemas-microsoft-com:office:powerpoint" xmlns:com="http://schemas.openxmlformats.org/drawingml/2006/compatibility" xmlns:p14="http://schemas.microsoft.com/office/powerpoint/2010/main" xmlns:p15="http://schemas.microsoft.com/office/powerpoint/2012/main" showMasterPhAnim="0" showMasterSp="0">
   <p:cSld>
     <p:spTree>
       <p:nvGrpSpPr>
-        <p:cNvPr id="298" name="Shape 298"/>
+        <p:cNvPr id="304" name="Shape 304"/>
         <p:cNvGrpSpPr/>
         <p:nvPr/>
       </p:nvGrpSpPr>
@@ -2967,7 +3067,7 @@
       </p:grpSpPr>
       <p:sp>
         <p:nvSpPr>
-          <p:cNvPr id="299" name="Google Shape;299;p26:notes"/>
+          <p:cNvPr id="305" name="Google Shape;305;p26:notes"/>
           <p:cNvSpPr/>
           <p:nvPr>
             <p:ph idx="2" type="sldImg"/>
@@ -3012,7 +3112,7 @@
       </p:sp>
       <p:sp>
         <p:nvSpPr>
-          <p:cNvPr id="300" name="Google Shape;300;p26:notes"/>
+          <p:cNvPr id="306" name="Google Shape;306;p26:notes"/>
           <p:cNvSpPr txBox="1"/>
           <p:nvPr>
             <p:ph idx="1" type="body"/>
@@ -3065,12 +3165,12 @@
 </p:notes>
 </file>
 
-<file path=ppt/notesSlides/notesSlide27.xml><?xml version="1.0" encoding="utf-8"?>
+<file path=ppt/notesSlides/notesSlide28.xml><?xml version="1.0" encoding="utf-8"?>
 <p:notes xmlns:a="http://schemas.openxmlformats.org/drawingml/2006/main" xmlns:r="http://schemas.openxmlformats.org/officeDocument/2006/relationships" xmlns:mc="http://schemas.openxmlformats.org/markup-compatibility/2006" xmlns:mv="urn:schemas-microsoft-com:mac:vml" xmlns:p="http://schemas.openxmlformats.org/presentationml/2006/main" xmlns:c="http://schemas.openxmlformats.org/drawingml/2006/chart" xmlns:dgm="http://schemas.openxmlformats.org/drawingml/2006/diagram" xmlns:o="urn:schemas-microsoft-com:office:office" xmlns:v="urn:schemas-microsoft-com:vml" xmlns:pvml="urn:schemas-microsoft-com:office:powerpoint" xmlns:com="http://schemas.openxmlformats.org/drawingml/2006/compatibility" xmlns:p14="http://schemas.microsoft.com/office/powerpoint/2010/main" xmlns:p15="http://schemas.microsoft.com/office/powerpoint/2012/main" showMasterPhAnim="0" showMasterSp="0">
   <p:cSld>
     <p:spTree>
       <p:nvGrpSpPr>
-        <p:cNvPr id="305" name="Shape 305"/>
+        <p:cNvPr id="311" name="Shape 311"/>
         <p:cNvGrpSpPr/>
         <p:nvPr/>
       </p:nvGrpSpPr>
@@ -3084,7 +3184,7 @@
       </p:grpSpPr>
       <p:sp>
         <p:nvSpPr>
-          <p:cNvPr id="306" name="Google Shape;306;p27:notes"/>
+          <p:cNvPr id="312" name="Google Shape;312;p27:notes"/>
           <p:cNvSpPr/>
           <p:nvPr>
             <p:ph idx="2" type="sldImg"/>
@@ -3129,7 +3229,7 @@
       </p:sp>
       <p:sp>
         <p:nvSpPr>
-          <p:cNvPr id="307" name="Google Shape;307;p27:notes"/>
+          <p:cNvPr id="313" name="Google Shape;313;p27:notes"/>
           <p:cNvSpPr txBox="1"/>
           <p:nvPr>
             <p:ph idx="1" type="body"/>
@@ -3173,105 +3273,6 @@
             <a:endParaRPr/>
           </a:p>
         </p:txBody>
-      </p:sp>
-    </p:spTree>
-  </p:cSld>
-  <p:clrMapOvr>
-    <a:masterClrMapping/>
-  </p:clrMapOvr>
-</p:notes>
-</file>
-
-<file path=ppt/notesSlides/notesSlide28.xml><?xml version="1.0" encoding="utf-8"?>
-<p:notes xmlns:a="http://schemas.openxmlformats.org/drawingml/2006/main" xmlns:r="http://schemas.openxmlformats.org/officeDocument/2006/relationships" xmlns:mc="http://schemas.openxmlformats.org/markup-compatibility/2006" xmlns:mv="urn:schemas-microsoft-com:mac:vml" xmlns:p="http://schemas.openxmlformats.org/presentationml/2006/main" xmlns:c="http://schemas.openxmlformats.org/drawingml/2006/chart" xmlns:dgm="http://schemas.openxmlformats.org/drawingml/2006/diagram" xmlns:o="urn:schemas-microsoft-com:office:office" xmlns:v="urn:schemas-microsoft-com:vml" xmlns:pvml="urn:schemas-microsoft-com:office:powerpoint" xmlns:com="http://schemas.openxmlformats.org/drawingml/2006/compatibility" xmlns:p14="http://schemas.microsoft.com/office/powerpoint/2010/main" xmlns:p15="http://schemas.microsoft.com/office/powerpoint/2012/main" showMasterPhAnim="0" showMasterSp="0">
-  <p:cSld>
-    <p:spTree>
-      <p:nvGrpSpPr>
-        <p:cNvPr id="312" name="Shape 312"/>
-        <p:cNvGrpSpPr/>
-        <p:nvPr/>
-      </p:nvGrpSpPr>
-      <p:grpSpPr>
-        <a:xfrm>
-          <a:off x="0" y="0"/>
-          <a:ext cx="0" cy="0"/>
-          <a:chOff x="0" y="0"/>
-          <a:chExt cx="0" cy="0"/>
-        </a:xfrm>
-      </p:grpSpPr>
-      <p:sp>
-        <p:nvSpPr>
-          <p:cNvPr id="313" name="Google Shape;313;p28:notes"/>
-          <p:cNvSpPr txBox="1"/>
-          <p:nvPr>
-            <p:ph idx="1" type="body"/>
-          </p:nvPr>
-        </p:nvSpPr>
-        <p:spPr>
-          <a:xfrm>
-            <a:off x="685800" y="4343400"/>
-            <a:ext cx="5486400" cy="4114800"/>
-          </a:xfrm>
-          <a:prstGeom prst="rect">
-            <a:avLst/>
-          </a:prstGeom>
-        </p:spPr>
-        <p:txBody>
-          <a:bodyPr anchorCtr="0" anchor="t" bIns="91425" lIns="91425" spcFirstLastPara="1" rIns="91425" wrap="square" tIns="91425">
-            <a:noAutofit/>
-          </a:bodyPr>
-          <a:lstStyle/>
-          <a:p>
-            <a:pPr indent="0" lvl="0" marL="0" rtl="0" algn="l">
-              <a:spcBef>
-                <a:spcPts val="0"/>
-              </a:spcBef>
-              <a:spcAft>
-                <a:spcPts val="0"/>
-              </a:spcAft>
-              <a:buNone/>
-            </a:pPr>
-            <a:r>
-              <a:t/>
-            </a:r>
-            <a:endParaRPr/>
-          </a:p>
-        </p:txBody>
-      </p:sp>
-      <p:sp>
-        <p:nvSpPr>
-          <p:cNvPr id="314" name="Google Shape;314;p28:notes"/>
-          <p:cNvSpPr/>
-          <p:nvPr>
-            <p:ph idx="2" type="sldImg"/>
-          </p:nvPr>
-        </p:nvSpPr>
-        <p:spPr>
-          <a:xfrm>
-            <a:off x="1143225" y="685800"/>
-            <a:ext cx="4572225" cy="3429000"/>
-          </a:xfrm>
-          <a:custGeom>
-            <a:rect b="b" l="l" r="r" t="t"/>
-            <a:pathLst>
-              <a:path extrusionOk="0" h="120000" w="120000">
-                <a:moveTo>
-                  <a:pt x="0" y="0"/>
-                </a:moveTo>
-                <a:lnTo>
-                  <a:pt x="120000" y="0"/>
-                </a:lnTo>
-                <a:lnTo>
-                  <a:pt x="120000" y="120000"/>
-                </a:lnTo>
-                <a:lnTo>
-                  <a:pt x="0" y="120000"/>
-                </a:lnTo>
-                <a:close/>
-              </a:path>
-            </a:pathLst>
-          </a:custGeom>
-        </p:spPr>
       </p:sp>
     </p:spTree>
   </p:cSld>
@@ -3300,7 +3301,7 @@
       </p:grpSpPr>
       <p:sp>
         <p:nvSpPr>
-          <p:cNvPr id="319" name="Google Shape;319;p29:notes"/>
+          <p:cNvPr id="319" name="Google Shape;319;p28:notes"/>
           <p:cNvSpPr txBox="1"/>
           <p:nvPr>
             <p:ph idx="1" type="body"/>
@@ -3339,7 +3340,7 @@
       </p:sp>
       <p:sp>
         <p:nvSpPr>
-          <p:cNvPr id="320" name="Google Shape;320;p29:notes"/>
+          <p:cNvPr id="320" name="Google Shape;320;p28:notes"/>
           <p:cNvSpPr/>
           <p:nvPr>
             <p:ph idx="2" type="sldImg"/>
@@ -3516,7 +3517,7 @@
       </p:grpSpPr>
       <p:sp>
         <p:nvSpPr>
-          <p:cNvPr id="325" name="Google Shape;325;p31:notes"/>
+          <p:cNvPr id="325" name="Google Shape;325;p29:notes"/>
           <p:cNvSpPr txBox="1"/>
           <p:nvPr>
             <p:ph idx="1" type="body"/>
@@ -3555,7 +3556,106 @@
       </p:sp>
       <p:sp>
         <p:nvSpPr>
-          <p:cNvPr id="326" name="Google Shape;326;p31:notes"/>
+          <p:cNvPr id="326" name="Google Shape;326;p29:notes"/>
+          <p:cNvSpPr/>
+          <p:nvPr>
+            <p:ph idx="2" type="sldImg"/>
+          </p:nvPr>
+        </p:nvSpPr>
+        <p:spPr>
+          <a:xfrm>
+            <a:off x="1143225" y="685800"/>
+            <a:ext cx="4572225" cy="3429000"/>
+          </a:xfrm>
+          <a:custGeom>
+            <a:rect b="b" l="l" r="r" t="t"/>
+            <a:pathLst>
+              <a:path extrusionOk="0" h="120000" w="120000">
+                <a:moveTo>
+                  <a:pt x="0" y="0"/>
+                </a:moveTo>
+                <a:lnTo>
+                  <a:pt x="120000" y="0"/>
+                </a:lnTo>
+                <a:lnTo>
+                  <a:pt x="120000" y="120000"/>
+                </a:lnTo>
+                <a:lnTo>
+                  <a:pt x="0" y="120000"/>
+                </a:lnTo>
+                <a:close/>
+              </a:path>
+            </a:pathLst>
+          </a:custGeom>
+        </p:spPr>
+      </p:sp>
+    </p:spTree>
+  </p:cSld>
+  <p:clrMapOvr>
+    <a:masterClrMapping/>
+  </p:clrMapOvr>
+</p:notes>
+</file>
+
+<file path=ppt/notesSlides/notesSlide31.xml><?xml version="1.0" encoding="utf-8"?>
+<p:notes xmlns:a="http://schemas.openxmlformats.org/drawingml/2006/main" xmlns:r="http://schemas.openxmlformats.org/officeDocument/2006/relationships" xmlns:mc="http://schemas.openxmlformats.org/markup-compatibility/2006" xmlns:mv="urn:schemas-microsoft-com:mac:vml" xmlns:p="http://schemas.openxmlformats.org/presentationml/2006/main" xmlns:c="http://schemas.openxmlformats.org/drawingml/2006/chart" xmlns:dgm="http://schemas.openxmlformats.org/drawingml/2006/diagram" xmlns:o="urn:schemas-microsoft-com:office:office" xmlns:v="urn:schemas-microsoft-com:vml" xmlns:pvml="urn:schemas-microsoft-com:office:powerpoint" xmlns:com="http://schemas.openxmlformats.org/drawingml/2006/compatibility" xmlns:p14="http://schemas.microsoft.com/office/powerpoint/2010/main" xmlns:p15="http://schemas.microsoft.com/office/powerpoint/2012/main" showMasterPhAnim="0" showMasterSp="0">
+  <p:cSld>
+    <p:spTree>
+      <p:nvGrpSpPr>
+        <p:cNvPr id="330" name="Shape 330"/>
+        <p:cNvGrpSpPr/>
+        <p:nvPr/>
+      </p:nvGrpSpPr>
+      <p:grpSpPr>
+        <a:xfrm>
+          <a:off x="0" y="0"/>
+          <a:ext cx="0" cy="0"/>
+          <a:chOff x="0" y="0"/>
+          <a:chExt cx="0" cy="0"/>
+        </a:xfrm>
+      </p:grpSpPr>
+      <p:sp>
+        <p:nvSpPr>
+          <p:cNvPr id="331" name="Google Shape;331;p31:notes"/>
+          <p:cNvSpPr txBox="1"/>
+          <p:nvPr>
+            <p:ph idx="1" type="body"/>
+          </p:nvPr>
+        </p:nvSpPr>
+        <p:spPr>
+          <a:xfrm>
+            <a:off x="685800" y="4343400"/>
+            <a:ext cx="5486400" cy="4114800"/>
+          </a:xfrm>
+          <a:prstGeom prst="rect">
+            <a:avLst/>
+          </a:prstGeom>
+        </p:spPr>
+        <p:txBody>
+          <a:bodyPr anchorCtr="0" anchor="t" bIns="91425" lIns="91425" spcFirstLastPara="1" rIns="91425" wrap="square" tIns="91425">
+            <a:noAutofit/>
+          </a:bodyPr>
+          <a:lstStyle/>
+          <a:p>
+            <a:pPr indent="0" lvl="0" marL="0" rtl="0" algn="l">
+              <a:spcBef>
+                <a:spcPts val="0"/>
+              </a:spcBef>
+              <a:spcAft>
+                <a:spcPts val="0"/>
+              </a:spcAft>
+              <a:buNone/>
+            </a:pPr>
+            <a:r>
+              <a:t/>
+            </a:r>
+            <a:endParaRPr/>
+          </a:p>
+        </p:txBody>
+      </p:sp>
+      <p:sp>
+        <p:nvSpPr>
+          <p:cNvPr id="332" name="Google Shape;332;p31:notes"/>
           <p:cNvSpPr/>
           <p:nvPr>
             <p:ph idx="2" type="sldImg"/>
@@ -27208,23 +27308,22 @@
       </p:sp>
       <p:pic>
         <p:nvPicPr>
-          <p:cNvPr descr="A screenshot of a cell phone&#10;&#10;Description automatically generated" id="281" name="Google Shape;281;p37"/>
+          <p:cNvPr id="281" name="Google Shape;281;p37"/>
           <p:cNvPicPr preferRelativeResize="0"/>
-          <p:nvPr>
-            <p:ph idx="1" type="body"/>
-          </p:nvPr>
+          <p:nvPr/>
         </p:nvPicPr>
-        <p:blipFill rotWithShape="1">
+        <p:blipFill>
           <a:blip r:embed="rId3">
             <a:alphaModFix/>
           </a:blip>
-          <a:srcRect b="0" l="0" r="0" t="0"/>
-          <a:stretch/>
+          <a:stretch>
+            <a:fillRect/>
+          </a:stretch>
         </p:blipFill>
         <p:spPr>
           <a:xfrm>
-            <a:off x="1045195" y="1675227"/>
-            <a:ext cx="10101609" cy="4394199"/>
+            <a:off x="1295400" y="1616903"/>
+            <a:ext cx="9420225" cy="4514850"/>
           </a:xfrm>
           <a:prstGeom prst="rect">
             <a:avLst/>
@@ -27246,13 +27345,6 @@
 <file path=ppt/slides/slide24.xml><?xml version="1.0" encoding="utf-8"?>
 <p:sld xmlns:a="http://schemas.openxmlformats.org/drawingml/2006/main" xmlns:r="http://schemas.openxmlformats.org/officeDocument/2006/relationships" xmlns:mc="http://schemas.openxmlformats.org/markup-compatibility/2006" xmlns:mv="urn:schemas-microsoft-com:mac:vml" xmlns:p="http://schemas.openxmlformats.org/presentationml/2006/main" xmlns:c="http://schemas.openxmlformats.org/drawingml/2006/chart" xmlns:dgm="http://schemas.openxmlformats.org/drawingml/2006/diagram" xmlns:o="urn:schemas-microsoft-com:office:office" xmlns:v="urn:schemas-microsoft-com:vml" xmlns:pvml="urn:schemas-microsoft-com:office:powerpoint" xmlns:com="http://schemas.openxmlformats.org/drawingml/2006/compatibility" xmlns:p14="http://schemas.microsoft.com/office/powerpoint/2010/main" xmlns:p15="http://schemas.microsoft.com/office/powerpoint/2012/main">
   <p:cSld>
-    <p:bg>
-      <p:bgPr>
-        <a:solidFill>
-          <a:schemeClr val="lt1"/>
-        </a:solidFill>
-      </p:bgPr>
-    </p:bg>
     <p:spTree>
       <p:nvGrpSpPr>
         <p:cNvPr id="285" name="Shape 285"/>
@@ -27270,6 +27362,187 @@
       <p:sp>
         <p:nvSpPr>
           <p:cNvPr id="286" name="Google Shape;286;p38"/>
+          <p:cNvSpPr txBox="1"/>
+          <p:nvPr>
+            <p:ph type="title"/>
+          </p:nvPr>
+        </p:nvSpPr>
+        <p:spPr>
+          <a:xfrm>
+            <a:off x="838200" y="365125"/>
+            <a:ext cx="10515600" cy="1325700"/>
+          </a:xfrm>
+          <a:prstGeom prst="rect">
+            <a:avLst/>
+          </a:prstGeom>
+        </p:spPr>
+        <p:txBody>
+          <a:bodyPr anchorCtr="0" anchor="ctr" bIns="45700" lIns="91425" spcFirstLastPara="1" rIns="91425" wrap="square" tIns="45700">
+            <a:noAutofit/>
+          </a:bodyPr>
+          <a:lstStyle/>
+          <a:p>
+            <a:pPr indent="0" lvl="0" marL="0" rtl="0" algn="l">
+              <a:spcBef>
+                <a:spcPts val="0"/>
+              </a:spcBef>
+              <a:spcAft>
+                <a:spcPts val="0"/>
+              </a:spcAft>
+              <a:buNone/>
+            </a:pPr>
+            <a:r>
+              <a:rPr lang="en-US"/>
+              <a:t>Tactics to deal Imbalance data</a:t>
+            </a:r>
+            <a:endParaRPr/>
+          </a:p>
+        </p:txBody>
+      </p:sp>
+      <p:sp>
+        <p:nvSpPr>
+          <p:cNvPr id="287" name="Google Shape;287;p38"/>
+          <p:cNvSpPr txBox="1"/>
+          <p:nvPr>
+            <p:ph idx="1" type="body"/>
+          </p:nvPr>
+        </p:nvSpPr>
+        <p:spPr>
+          <a:xfrm>
+            <a:off x="838200" y="1825625"/>
+            <a:ext cx="10515600" cy="4351200"/>
+          </a:xfrm>
+          <a:prstGeom prst="rect">
+            <a:avLst/>
+          </a:prstGeom>
+        </p:spPr>
+        <p:txBody>
+          <a:bodyPr anchorCtr="0" anchor="t" bIns="45700" lIns="91425" spcFirstLastPara="1" rIns="91425" wrap="square" tIns="45700">
+            <a:noAutofit/>
+          </a:bodyPr>
+          <a:lstStyle/>
+          <a:p>
+            <a:pPr indent="-342900" lvl="0" marL="457200" rtl="0" algn="l">
+              <a:spcBef>
+                <a:spcPts val="1000"/>
+              </a:spcBef>
+              <a:spcAft>
+                <a:spcPts val="0"/>
+              </a:spcAft>
+              <a:buSzPts val="1800"/>
+              <a:buAutoNum type="arabicPeriod"/>
+            </a:pPr>
+            <a:r>
+              <a:rPr lang="en-US"/>
+              <a:t>Recollect data if possible (may get more minority class observations)</a:t>
+            </a:r>
+            <a:endParaRPr/>
+          </a:p>
+          <a:p>
+            <a:pPr indent="-342900" lvl="0" marL="457200" rtl="0" algn="l">
+              <a:spcBef>
+                <a:spcPts val="0"/>
+              </a:spcBef>
+              <a:spcAft>
+                <a:spcPts val="0"/>
+              </a:spcAft>
+              <a:buSzPts val="1800"/>
+              <a:buAutoNum type="arabicPeriod"/>
+            </a:pPr>
+            <a:r>
+              <a:rPr lang="en-US"/>
+              <a:t>Over Sampling (Increase minority to level of majority class)</a:t>
+            </a:r>
+            <a:endParaRPr/>
+          </a:p>
+          <a:p>
+            <a:pPr indent="-342900" lvl="0" marL="457200" rtl="0" algn="l">
+              <a:spcBef>
+                <a:spcPts val="0"/>
+              </a:spcBef>
+              <a:spcAft>
+                <a:spcPts val="0"/>
+              </a:spcAft>
+              <a:buSzPts val="1800"/>
+              <a:buAutoNum type="arabicPeriod"/>
+            </a:pPr>
+            <a:r>
+              <a:rPr lang="en-US"/>
+              <a:t>Under Sampling (Take random samples of majority to match  minority class)</a:t>
+            </a:r>
+            <a:endParaRPr/>
+          </a:p>
+          <a:p>
+            <a:pPr indent="-342900" lvl="0" marL="457200" rtl="0" algn="l">
+              <a:spcBef>
+                <a:spcPts val="0"/>
+              </a:spcBef>
+              <a:spcAft>
+                <a:spcPts val="0"/>
+              </a:spcAft>
+              <a:buSzPts val="1800"/>
+              <a:buAutoNum type="arabicPeriod"/>
+            </a:pPr>
+            <a:r>
+              <a:rPr lang="en-US"/>
+              <a:t>Change Evaluation/Assessment Measure - ROCR/AUROC</a:t>
+            </a:r>
+            <a:endParaRPr/>
+          </a:p>
+          <a:p>
+            <a:pPr indent="-342900" lvl="0" marL="457200" rtl="0" algn="l">
+              <a:spcBef>
+                <a:spcPts val="0"/>
+              </a:spcBef>
+              <a:spcAft>
+                <a:spcPts val="0"/>
+              </a:spcAft>
+              <a:buSzPts val="1800"/>
+              <a:buAutoNum type="arabicPeriod"/>
+            </a:pPr>
+            <a:r>
+              <a:rPr lang="en-US"/>
+              <a:t>Algorithms not sensitive to Imbalance data like DT, Ensemble methods (RF, Bagging, Boosting)</a:t>
+            </a:r>
+            <a:endParaRPr/>
+          </a:p>
+        </p:txBody>
+      </p:sp>
+    </p:spTree>
+  </p:cSld>
+  <p:clrMapOvr>
+    <a:masterClrMapping/>
+  </p:clrMapOvr>
+</p:sld>
+</file>
+
+<file path=ppt/slides/slide25.xml><?xml version="1.0" encoding="utf-8"?>
+<p:sld xmlns:a="http://schemas.openxmlformats.org/drawingml/2006/main" xmlns:r="http://schemas.openxmlformats.org/officeDocument/2006/relationships" xmlns:mc="http://schemas.openxmlformats.org/markup-compatibility/2006" xmlns:mv="urn:schemas-microsoft-com:mac:vml" xmlns:p="http://schemas.openxmlformats.org/presentationml/2006/main" xmlns:c="http://schemas.openxmlformats.org/drawingml/2006/chart" xmlns:dgm="http://schemas.openxmlformats.org/drawingml/2006/diagram" xmlns:o="urn:schemas-microsoft-com:office:office" xmlns:v="urn:schemas-microsoft-com:vml" xmlns:pvml="urn:schemas-microsoft-com:office:powerpoint" xmlns:com="http://schemas.openxmlformats.org/drawingml/2006/compatibility" xmlns:p14="http://schemas.microsoft.com/office/powerpoint/2010/main" xmlns:p15="http://schemas.microsoft.com/office/powerpoint/2012/main">
+  <p:cSld>
+    <p:bg>
+      <p:bgPr>
+        <a:solidFill>
+          <a:schemeClr val="lt1"/>
+        </a:solidFill>
+      </p:bgPr>
+    </p:bg>
+    <p:spTree>
+      <p:nvGrpSpPr>
+        <p:cNvPr id="291" name="Shape 291"/>
+        <p:cNvGrpSpPr/>
+        <p:nvPr/>
+      </p:nvGrpSpPr>
+      <p:grpSpPr>
+        <a:xfrm>
+          <a:off x="0" y="0"/>
+          <a:ext cx="0" cy="0"/>
+          <a:chOff x="0" y="0"/>
+          <a:chExt cx="0" cy="0"/>
+        </a:xfrm>
+      </p:grpSpPr>
+      <p:sp>
+        <p:nvSpPr>
+          <p:cNvPr id="292" name="Google Shape;292;p39"/>
           <p:cNvSpPr/>
           <p:nvPr/>
         </p:nvSpPr>
@@ -27328,7 +27601,7 @@
       </p:sp>
       <p:sp>
         <p:nvSpPr>
-          <p:cNvPr id="287" name="Google Shape;287;p38"/>
+          <p:cNvPr id="293" name="Google Shape;293;p39"/>
           <p:cNvSpPr/>
           <p:nvPr/>
         </p:nvSpPr>
@@ -27393,7 +27666,7 @@
       </p:sp>
       <p:sp>
         <p:nvSpPr>
-          <p:cNvPr id="288" name="Google Shape;288;p38"/>
+          <p:cNvPr id="294" name="Google Shape;294;p39"/>
           <p:cNvSpPr txBox="1"/>
           <p:nvPr>
             <p:ph type="ctrTitle"/>
@@ -27445,7 +27718,7 @@
       </p:sp>
       <p:sp>
         <p:nvSpPr>
-          <p:cNvPr id="289" name="Google Shape;289;p38"/>
+          <p:cNvPr id="295" name="Google Shape;295;p39"/>
           <p:cNvSpPr txBox="1"/>
           <p:nvPr>
             <p:ph idx="1" type="subTitle"/>
@@ -27500,7 +27773,7 @@
       </p:sp>
       <p:cxnSp>
         <p:nvCxnSpPr>
-          <p:cNvPr id="290" name="Google Shape;290;p38"/>
+          <p:cNvPr id="296" name="Google Shape;296;p39"/>
           <p:cNvCxnSpPr/>
           <p:nvPr/>
         </p:nvCxnSpPr>
@@ -27532,12 +27805,12 @@
 </p:sld>
 </file>
 
-<file path=ppt/slides/slide25.xml><?xml version="1.0" encoding="utf-8"?>
+<file path=ppt/slides/slide26.xml><?xml version="1.0" encoding="utf-8"?>
 <p:sld xmlns:a="http://schemas.openxmlformats.org/drawingml/2006/main" xmlns:r="http://schemas.openxmlformats.org/officeDocument/2006/relationships" xmlns:mc="http://schemas.openxmlformats.org/markup-compatibility/2006" xmlns:mv="urn:schemas-microsoft-com:mac:vml" xmlns:p="http://schemas.openxmlformats.org/presentationml/2006/main" xmlns:c="http://schemas.openxmlformats.org/drawingml/2006/chart" xmlns:dgm="http://schemas.openxmlformats.org/drawingml/2006/diagram" xmlns:o="urn:schemas-microsoft-com:office:office" xmlns:v="urn:schemas-microsoft-com:vml" xmlns:pvml="urn:schemas-microsoft-com:office:powerpoint" xmlns:com="http://schemas.openxmlformats.org/drawingml/2006/compatibility" xmlns:p14="http://schemas.microsoft.com/office/powerpoint/2010/main" xmlns:p15="http://schemas.microsoft.com/office/powerpoint/2012/main">
   <p:cSld>
     <p:spTree>
       <p:nvGrpSpPr>
-        <p:cNvPr id="294" name="Shape 294"/>
+        <p:cNvPr id="300" name="Shape 300"/>
         <p:cNvGrpSpPr/>
         <p:nvPr/>
       </p:nvGrpSpPr>
@@ -27551,7 +27824,7 @@
       </p:grpSpPr>
       <p:sp>
         <p:nvSpPr>
-          <p:cNvPr id="295" name="Google Shape;295;p39"/>
+          <p:cNvPr id="301" name="Google Shape;301;p40"/>
           <p:cNvSpPr txBox="1"/>
           <p:nvPr>
             <p:ph type="title"/>
@@ -27599,7 +27872,7 @@
       </p:sp>
       <p:sp>
         <p:nvSpPr>
-          <p:cNvPr id="296" name="Google Shape;296;p39"/>
+          <p:cNvPr id="302" name="Google Shape;302;p40"/>
           <p:cNvSpPr txBox="1"/>
           <p:nvPr>
             <p:ph idx="1" type="body"/>
@@ -27646,7 +27919,7 @@
       </p:sp>
       <p:pic>
         <p:nvPicPr>
-          <p:cNvPr id="297" name="Google Shape;297;p39"/>
+          <p:cNvPr id="303" name="Google Shape;303;p40"/>
           <p:cNvPicPr preferRelativeResize="0"/>
           <p:nvPr/>
         </p:nvPicPr>
@@ -27679,12 +27952,12 @@
 </p:sld>
 </file>
 
-<file path=ppt/slides/slide26.xml><?xml version="1.0" encoding="utf-8"?>
+<file path=ppt/slides/slide27.xml><?xml version="1.0" encoding="utf-8"?>
 <p:sld xmlns:a="http://schemas.openxmlformats.org/drawingml/2006/main" xmlns:r="http://schemas.openxmlformats.org/officeDocument/2006/relationships" xmlns:mc="http://schemas.openxmlformats.org/markup-compatibility/2006" xmlns:mv="urn:schemas-microsoft-com:mac:vml" xmlns:p="http://schemas.openxmlformats.org/presentationml/2006/main" xmlns:c="http://schemas.openxmlformats.org/drawingml/2006/chart" xmlns:dgm="http://schemas.openxmlformats.org/drawingml/2006/diagram" xmlns:o="urn:schemas-microsoft-com:office:office" xmlns:v="urn:schemas-microsoft-com:vml" xmlns:pvml="urn:schemas-microsoft-com:office:powerpoint" xmlns:com="http://schemas.openxmlformats.org/drawingml/2006/compatibility" xmlns:p14="http://schemas.microsoft.com/office/powerpoint/2010/main" xmlns:p15="http://schemas.microsoft.com/office/powerpoint/2012/main">
   <p:cSld>
     <p:spTree>
       <p:nvGrpSpPr>
-        <p:cNvPr id="301" name="Shape 301"/>
+        <p:cNvPr id="307" name="Shape 307"/>
         <p:cNvGrpSpPr/>
         <p:nvPr/>
       </p:nvGrpSpPr>
@@ -27698,7 +27971,7 @@
       </p:grpSpPr>
       <p:sp>
         <p:nvSpPr>
-          <p:cNvPr id="302" name="Google Shape;302;p40"/>
+          <p:cNvPr id="308" name="Google Shape;308;p41"/>
           <p:cNvSpPr txBox="1"/>
           <p:nvPr>
             <p:ph type="title"/>
@@ -27746,7 +28019,7 @@
       </p:sp>
       <p:sp>
         <p:nvSpPr>
-          <p:cNvPr id="303" name="Google Shape;303;p40"/>
+          <p:cNvPr id="309" name="Google Shape;309;p41"/>
           <p:cNvSpPr txBox="1"/>
           <p:nvPr>
             <p:ph idx="1" type="body"/>
@@ -27793,158 +28066,7 @@
       </p:sp>
       <p:pic>
         <p:nvPicPr>
-          <p:cNvPr id="304" name="Google Shape;304;p40"/>
-          <p:cNvPicPr preferRelativeResize="0"/>
-          <p:nvPr/>
-        </p:nvPicPr>
-        <p:blipFill rotWithShape="1">
-          <a:blip r:embed="rId3">
-            <a:alphaModFix/>
-          </a:blip>
-          <a:srcRect b="0" l="0" r="0" t="0"/>
-          <a:stretch/>
-        </p:blipFill>
-        <p:spPr>
-          <a:xfrm>
-            <a:off x="838200" y="1825625"/>
-            <a:ext cx="10515601" cy="4351200"/>
-          </a:xfrm>
-          <a:prstGeom prst="rect">
-            <a:avLst/>
-          </a:prstGeom>
-          <a:noFill/>
-          <a:ln>
-            <a:noFill/>
-          </a:ln>
-        </p:spPr>
-      </p:pic>
-    </p:spTree>
-  </p:cSld>
-  <p:clrMapOvr>
-    <a:masterClrMapping/>
-  </p:clrMapOvr>
-</p:sld>
-</file>
-
-<file path=ppt/slides/slide27.xml><?xml version="1.0" encoding="utf-8"?>
-<p:sld xmlns:a="http://schemas.openxmlformats.org/drawingml/2006/main" xmlns:r="http://schemas.openxmlformats.org/officeDocument/2006/relationships" xmlns:mc="http://schemas.openxmlformats.org/markup-compatibility/2006" xmlns:mv="urn:schemas-microsoft-com:mac:vml" xmlns:p="http://schemas.openxmlformats.org/presentationml/2006/main" xmlns:c="http://schemas.openxmlformats.org/drawingml/2006/chart" xmlns:dgm="http://schemas.openxmlformats.org/drawingml/2006/diagram" xmlns:o="urn:schemas-microsoft-com:office:office" xmlns:v="urn:schemas-microsoft-com:vml" xmlns:pvml="urn:schemas-microsoft-com:office:powerpoint" xmlns:com="http://schemas.openxmlformats.org/drawingml/2006/compatibility" xmlns:p14="http://schemas.microsoft.com/office/powerpoint/2010/main" xmlns:p15="http://schemas.microsoft.com/office/powerpoint/2012/main">
-  <p:cSld>
-    <p:spTree>
-      <p:nvGrpSpPr>
-        <p:cNvPr id="308" name="Shape 308"/>
-        <p:cNvGrpSpPr/>
-        <p:nvPr/>
-      </p:nvGrpSpPr>
-      <p:grpSpPr>
-        <a:xfrm>
-          <a:off x="0" y="0"/>
-          <a:ext cx="0" cy="0"/>
-          <a:chOff x="0" y="0"/>
-          <a:chExt cx="0" cy="0"/>
-        </a:xfrm>
-      </p:grpSpPr>
-      <p:sp>
-        <p:nvSpPr>
-          <p:cNvPr id="309" name="Google Shape;309;p41"/>
-          <p:cNvSpPr txBox="1"/>
-          <p:nvPr>
-            <p:ph type="title"/>
-          </p:nvPr>
-        </p:nvSpPr>
-        <p:spPr>
-          <a:xfrm>
-            <a:off x="838200" y="365125"/>
-            <a:ext cx="10515600" cy="1325700"/>
-          </a:xfrm>
-          <a:prstGeom prst="rect">
-            <a:avLst/>
-          </a:prstGeom>
-          <a:noFill/>
-          <a:ln>
-            <a:noFill/>
-          </a:ln>
-        </p:spPr>
-        <p:txBody>
-          <a:bodyPr anchorCtr="0" anchor="ctr" bIns="45700" lIns="91425" spcFirstLastPara="1" rIns="91425" wrap="square" tIns="45700">
-            <a:noAutofit/>
-          </a:bodyPr>
-          <a:lstStyle/>
-          <a:p>
-            <a:pPr indent="0" lvl="0" marL="0" rtl="0" algn="l">
-              <a:lnSpc>
-                <a:spcPct val="90000"/>
-              </a:lnSpc>
-              <a:spcBef>
-                <a:spcPts val="0"/>
-              </a:spcBef>
-              <a:spcAft>
-                <a:spcPts val="0"/>
-              </a:spcAft>
-              <a:buClr>
-                <a:schemeClr val="dk1"/>
-              </a:buClr>
-              <a:buSzPts val="1100"/>
-              <a:buFont typeface="Arial"/>
-              <a:buNone/>
-            </a:pPr>
-            <a:r>
-              <a:rPr lang="en-US"/>
-              <a:t>Conversion rate by Industry Code- for Test users</a:t>
-            </a:r>
-            <a:endParaRPr/>
-          </a:p>
-        </p:txBody>
-      </p:sp>
-      <p:sp>
-        <p:nvSpPr>
           <p:cNvPr id="310" name="Google Shape;310;p41"/>
-          <p:cNvSpPr txBox="1"/>
-          <p:nvPr>
-            <p:ph idx="1" type="body"/>
-          </p:nvPr>
-        </p:nvSpPr>
-        <p:spPr>
-          <a:xfrm>
-            <a:off x="838200" y="1825625"/>
-            <a:ext cx="10515600" cy="4351200"/>
-          </a:xfrm>
-          <a:prstGeom prst="rect">
-            <a:avLst/>
-          </a:prstGeom>
-          <a:noFill/>
-          <a:ln>
-            <a:noFill/>
-          </a:ln>
-        </p:spPr>
-        <p:txBody>
-          <a:bodyPr anchorCtr="0" anchor="t" bIns="45700" lIns="91425" spcFirstLastPara="1" rIns="91425" wrap="square" tIns="45700">
-            <a:noAutofit/>
-          </a:bodyPr>
-          <a:lstStyle/>
-          <a:p>
-            <a:pPr indent="0" lvl="0" marL="0" rtl="0" algn="l">
-              <a:lnSpc>
-                <a:spcPct val="90000"/>
-              </a:lnSpc>
-              <a:spcBef>
-                <a:spcPts val="1000"/>
-              </a:spcBef>
-              <a:spcAft>
-                <a:spcPts val="0"/>
-              </a:spcAft>
-              <a:buSzPts val="1800"/>
-              <a:buNone/>
-            </a:pPr>
-            <a:r>
-              <a:t/>
-            </a:r>
-            <a:endParaRPr/>
-          </a:p>
-        </p:txBody>
-      </p:sp>
-      <p:pic>
-        <p:nvPicPr>
-          <p:cNvPr id="311" name="Google Shape;311;p41"/>
           <p:cNvPicPr preferRelativeResize="0"/>
           <p:nvPr/>
         </p:nvPicPr>
@@ -27982,7 +28104,7 @@
   <p:cSld>
     <p:spTree>
       <p:nvGrpSpPr>
-        <p:cNvPr id="315" name="Shape 315"/>
+        <p:cNvPr id="314" name="Shape 314"/>
         <p:cNvGrpSpPr/>
         <p:nvPr/>
       </p:nvGrpSpPr>
@@ -27996,7 +28118,7 @@
       </p:grpSpPr>
       <p:sp>
         <p:nvSpPr>
-          <p:cNvPr id="316" name="Google Shape;316;p42"/>
+          <p:cNvPr id="315" name="Google Shape;315;p42"/>
           <p:cNvSpPr txBox="1"/>
           <p:nvPr>
             <p:ph type="title"/>
@@ -28005,7 +28127,7 @@
         <p:spPr>
           <a:xfrm>
             <a:off x="838200" y="365125"/>
-            <a:ext cx="10515600" cy="1325563"/>
+            <a:ext cx="10515600" cy="1325700"/>
           </a:xfrm>
           <a:prstGeom prst="rect">
             <a:avLst/>
@@ -28034,16 +28156,60 @@
               <a:buClr>
                 <a:schemeClr val="dk1"/>
               </a:buClr>
-              <a:buSzPts val="1800"/>
+              <a:buSzPts val="1100"/>
+              <a:buFont typeface="Arial"/>
               <a:buNone/>
             </a:pPr>
             <a:r>
-              <a:rPr lang="en-US" sz="2400"/>
-              <a:t>Conversation rate compared to source distribution: </a:t>
+              <a:rPr lang="en-US"/>
+              <a:t>Conversion rate by Industry Code- for Test users</a:t>
             </a:r>
+            <a:endParaRPr/>
+          </a:p>
+        </p:txBody>
+      </p:sp>
+      <p:sp>
+        <p:nvSpPr>
+          <p:cNvPr id="316" name="Google Shape;316;p42"/>
+          <p:cNvSpPr txBox="1"/>
+          <p:nvPr>
+            <p:ph idx="1" type="body"/>
+          </p:nvPr>
+        </p:nvSpPr>
+        <p:spPr>
+          <a:xfrm>
+            <a:off x="838200" y="1825625"/>
+            <a:ext cx="10515600" cy="4351200"/>
+          </a:xfrm>
+          <a:prstGeom prst="rect">
+            <a:avLst/>
+          </a:prstGeom>
+          <a:noFill/>
+          <a:ln>
+            <a:noFill/>
+          </a:ln>
+        </p:spPr>
+        <p:txBody>
+          <a:bodyPr anchorCtr="0" anchor="t" bIns="45700" lIns="91425" spcFirstLastPara="1" rIns="91425" wrap="square" tIns="45700">
+            <a:noAutofit/>
+          </a:bodyPr>
+          <a:lstStyle/>
+          <a:p>
+            <a:pPr indent="0" lvl="0" marL="0" rtl="0" algn="l">
+              <a:lnSpc>
+                <a:spcPct val="90000"/>
+              </a:lnSpc>
+              <a:spcBef>
+                <a:spcPts val="1000"/>
+              </a:spcBef>
+              <a:spcAft>
+                <a:spcPts val="0"/>
+              </a:spcAft>
+              <a:buSzPts val="1800"/>
+              <a:buNone/>
+            </a:pPr>
             <a:r>
-              <a:rPr lang="en-US" sz="1800"/>
-              <a:t>here we see that most visitors were coming from Facebook and Linkedin but when it comes to converting almost all three sources show a high rate of conversion, hence no additional changes are required from a business point of view.</a:t>
+              <a:t/>
             </a:r>
             <a:endParaRPr/>
           </a:p>
@@ -28064,8 +28230,8 @@
         </p:blipFill>
         <p:spPr>
           <a:xfrm>
-            <a:off x="859773" y="1825625"/>
-            <a:ext cx="9705578" cy="4256637"/>
+            <a:off x="838200" y="1825625"/>
+            <a:ext cx="10515601" cy="4351200"/>
           </a:xfrm>
           <a:prstGeom prst="rect">
             <a:avLst/>
@@ -28146,11 +28312,11 @@
             </a:pPr>
             <a:r>
               <a:rPr lang="en-US" sz="2400"/>
-              <a:t>Conversion rate by industry code: </a:t>
+              <a:t>Conversation rate compared to source distribution: </a:t>
             </a:r>
             <a:r>
               <a:rPr lang="en-US" sz="1800"/>
-              <a:t>In this case we see the highest number of users are coming from MFG industry, close to 10,000 users. However users from SPC and ADR tend to take the lead in converting to paid members. We need investigate further why MFG users are not producing higher conversion rates.</a:t>
+              <a:t>here we see that most visitors were coming from Facebook and Linkedin but when it comes to converting almost all three sources show a high rate of conversion, hence no additional changes are required from a business point of view.</a:t>
             </a:r>
             <a:endParaRPr/>
           </a:p>
@@ -28171,8 +28337,8 @@
         </p:blipFill>
         <p:spPr>
           <a:xfrm>
-            <a:off x="296883" y="2024398"/>
-            <a:ext cx="11566567" cy="4468477"/>
+            <a:off x="859773" y="1825625"/>
+            <a:ext cx="9705578" cy="4256637"/>
           </a:xfrm>
           <a:prstGeom prst="rect">
             <a:avLst/>
@@ -28551,7 +28717,12 @@
               <a:buNone/>
             </a:pPr>
             <a:r>
-              <a:t/>
+              <a:rPr lang="en-US" sz="2400"/>
+              <a:t>Conversion rate by industry code: </a:t>
+            </a:r>
+            <a:r>
+              <a:rPr lang="en-US" sz="1800"/>
+              <a:t>In this case we see the highest number of users are coming from MFG industry, close to 10,000 users. However users from SPC and ADR tend to take the lead in converting to paid members. We need investigate further why MFG users are not producing higher conversion rates.</a:t>
             </a:r>
             <a:endParaRPr/>
           </a:p>
@@ -28560,6 +28731,109 @@
       <p:pic>
         <p:nvPicPr>
           <p:cNvPr id="329" name="Google Shape;329;p44"/>
+          <p:cNvPicPr preferRelativeResize="0"/>
+          <p:nvPr/>
+        </p:nvPicPr>
+        <p:blipFill rotWithShape="1">
+          <a:blip r:embed="rId3">
+            <a:alphaModFix/>
+          </a:blip>
+          <a:srcRect b="0" l="0" r="0" t="0"/>
+          <a:stretch/>
+        </p:blipFill>
+        <p:spPr>
+          <a:xfrm>
+            <a:off x="296883" y="2024398"/>
+            <a:ext cx="11566567" cy="4468477"/>
+          </a:xfrm>
+          <a:prstGeom prst="rect">
+            <a:avLst/>
+          </a:prstGeom>
+          <a:noFill/>
+          <a:ln>
+            <a:noFill/>
+          </a:ln>
+        </p:spPr>
+      </p:pic>
+    </p:spTree>
+  </p:cSld>
+  <p:clrMapOvr>
+    <a:masterClrMapping/>
+  </p:clrMapOvr>
+</p:sld>
+</file>
+
+<file path=ppt/slides/slide31.xml><?xml version="1.0" encoding="utf-8"?>
+<p:sld xmlns:a="http://schemas.openxmlformats.org/drawingml/2006/main" xmlns:r="http://schemas.openxmlformats.org/officeDocument/2006/relationships" xmlns:mc="http://schemas.openxmlformats.org/markup-compatibility/2006" xmlns:mv="urn:schemas-microsoft-com:mac:vml" xmlns:p="http://schemas.openxmlformats.org/presentationml/2006/main" xmlns:c="http://schemas.openxmlformats.org/drawingml/2006/chart" xmlns:dgm="http://schemas.openxmlformats.org/drawingml/2006/diagram" xmlns:o="urn:schemas-microsoft-com:office:office" xmlns:v="urn:schemas-microsoft-com:vml" xmlns:pvml="urn:schemas-microsoft-com:office:powerpoint" xmlns:com="http://schemas.openxmlformats.org/drawingml/2006/compatibility" xmlns:p14="http://schemas.microsoft.com/office/powerpoint/2010/main" xmlns:p15="http://schemas.microsoft.com/office/powerpoint/2012/main">
+  <p:cSld>
+    <p:spTree>
+      <p:nvGrpSpPr>
+        <p:cNvPr id="333" name="Shape 333"/>
+        <p:cNvGrpSpPr/>
+        <p:nvPr/>
+      </p:nvGrpSpPr>
+      <p:grpSpPr>
+        <a:xfrm>
+          <a:off x="0" y="0"/>
+          <a:ext cx="0" cy="0"/>
+          <a:chOff x="0" y="0"/>
+          <a:chExt cx="0" cy="0"/>
+        </a:xfrm>
+      </p:grpSpPr>
+      <p:sp>
+        <p:nvSpPr>
+          <p:cNvPr id="334" name="Google Shape;334;p45"/>
+          <p:cNvSpPr txBox="1"/>
+          <p:nvPr>
+            <p:ph type="title"/>
+          </p:nvPr>
+        </p:nvSpPr>
+        <p:spPr>
+          <a:xfrm>
+            <a:off x="838200" y="365125"/>
+            <a:ext cx="10515600" cy="1325563"/>
+          </a:xfrm>
+          <a:prstGeom prst="rect">
+            <a:avLst/>
+          </a:prstGeom>
+          <a:noFill/>
+          <a:ln>
+            <a:noFill/>
+          </a:ln>
+        </p:spPr>
+        <p:txBody>
+          <a:bodyPr anchorCtr="0" anchor="ctr" bIns="45700" lIns="91425" spcFirstLastPara="1" rIns="91425" wrap="square" tIns="45700">
+            <a:noAutofit/>
+          </a:bodyPr>
+          <a:lstStyle/>
+          <a:p>
+            <a:pPr indent="0" lvl="0" marL="0" rtl="0" algn="l">
+              <a:lnSpc>
+                <a:spcPct val="90000"/>
+              </a:lnSpc>
+              <a:spcBef>
+                <a:spcPts val="0"/>
+              </a:spcBef>
+              <a:spcAft>
+                <a:spcPts val="0"/>
+              </a:spcAft>
+              <a:buClr>
+                <a:schemeClr val="dk1"/>
+              </a:buClr>
+              <a:buSzPts val="1800"/>
+              <a:buNone/>
+            </a:pPr>
+            <a:r>
+              <a:rPr lang="en-US"/>
+              <a:t>Browser</a:t>
+            </a:r>
+            <a:endParaRPr/>
+          </a:p>
+        </p:txBody>
+      </p:sp>
+      <p:pic>
+        <p:nvPicPr>
+          <p:cNvPr id="335" name="Google Shape;335;p45"/>
           <p:cNvPicPr preferRelativeResize="0"/>
           <p:nvPr/>
         </p:nvPicPr>

</xml_diff>

<commit_message>
model comparison and selection
</commit_message>
<xml_diff>
--- a/documents/presentation/Final Presentation.pptx
+++ b/documents/presentation/Final Presentation.pptx
@@ -40,6 +40,9 @@
     <p:sldId id="284" r:id="rId34"/>
     <p:sldId id="285" r:id="rId35"/>
     <p:sldId id="286" r:id="rId36"/>
+    <p:sldId id="287" r:id="rId37"/>
+    <p:sldId id="288" r:id="rId38"/>
+    <p:sldId id="289" r:id="rId39"/>
   </p:sldIdLst>
   <p:sldSz cy="6858000" cx="12192000"/>
   <p:notesSz cx="6858000" cy="9144000"/>
@@ -2617,7 +2620,106 @@
       </p:grpSpPr>
       <p:sp>
         <p:nvSpPr>
-          <p:cNvPr id="276" name="Google Shape;276;p23:notes"/>
+          <p:cNvPr id="276" name="Google Shape;276;g6478606def_0_1:notes"/>
+          <p:cNvSpPr/>
+          <p:nvPr>
+            <p:ph idx="2" type="sldImg"/>
+          </p:nvPr>
+        </p:nvSpPr>
+        <p:spPr>
+          <a:xfrm>
+            <a:off x="1143225" y="685800"/>
+            <a:ext cx="4572300" cy="3429000"/>
+          </a:xfrm>
+          <a:custGeom>
+            <a:rect b="b" l="l" r="r" t="t"/>
+            <a:pathLst>
+              <a:path extrusionOk="0" h="120000" w="120000">
+                <a:moveTo>
+                  <a:pt x="0" y="0"/>
+                </a:moveTo>
+                <a:lnTo>
+                  <a:pt x="120000" y="0"/>
+                </a:lnTo>
+                <a:lnTo>
+                  <a:pt x="120000" y="120000"/>
+                </a:lnTo>
+                <a:lnTo>
+                  <a:pt x="0" y="120000"/>
+                </a:lnTo>
+                <a:close/>
+              </a:path>
+            </a:pathLst>
+          </a:custGeom>
+        </p:spPr>
+      </p:sp>
+      <p:sp>
+        <p:nvSpPr>
+          <p:cNvPr id="277" name="Google Shape;277;g6478606def_0_1:notes"/>
+          <p:cNvSpPr txBox="1"/>
+          <p:nvPr>
+            <p:ph idx="1" type="body"/>
+          </p:nvPr>
+        </p:nvSpPr>
+        <p:spPr>
+          <a:xfrm>
+            <a:off x="685800" y="4343400"/>
+            <a:ext cx="5486400" cy="4114800"/>
+          </a:xfrm>
+          <a:prstGeom prst="rect">
+            <a:avLst/>
+          </a:prstGeom>
+        </p:spPr>
+        <p:txBody>
+          <a:bodyPr anchorCtr="0" anchor="t" bIns="91425" lIns="91425" spcFirstLastPara="1" rIns="91425" wrap="square" tIns="91425">
+            <a:noAutofit/>
+          </a:bodyPr>
+          <a:lstStyle/>
+          <a:p>
+            <a:pPr indent="0" lvl="0" marL="0" rtl="0" algn="l">
+              <a:spcBef>
+                <a:spcPts val="0"/>
+              </a:spcBef>
+              <a:spcAft>
+                <a:spcPts val="0"/>
+              </a:spcAft>
+              <a:buNone/>
+            </a:pPr>
+            <a:r>
+              <a:t/>
+            </a:r>
+            <a:endParaRPr/>
+          </a:p>
+        </p:txBody>
+      </p:sp>
+    </p:spTree>
+  </p:cSld>
+  <p:clrMapOvr>
+    <a:masterClrMapping/>
+  </p:clrMapOvr>
+</p:notes>
+</file>
+
+<file path=ppt/notesSlides/notesSlide24.xml><?xml version="1.0" encoding="utf-8"?>
+<p:notes xmlns:a="http://schemas.openxmlformats.org/drawingml/2006/main" xmlns:r="http://schemas.openxmlformats.org/officeDocument/2006/relationships" xmlns:mc="http://schemas.openxmlformats.org/markup-compatibility/2006" xmlns:mv="urn:schemas-microsoft-com:mac:vml" xmlns:p="http://schemas.openxmlformats.org/presentationml/2006/main" xmlns:c="http://schemas.openxmlformats.org/drawingml/2006/chart" xmlns:dgm="http://schemas.openxmlformats.org/drawingml/2006/diagram" xmlns:o="urn:schemas-microsoft-com:office:office" xmlns:v="urn:schemas-microsoft-com:vml" xmlns:pvml="urn:schemas-microsoft-com:office:powerpoint" xmlns:com="http://schemas.openxmlformats.org/drawingml/2006/compatibility" xmlns:p14="http://schemas.microsoft.com/office/powerpoint/2010/main" xmlns:p15="http://schemas.microsoft.com/office/powerpoint/2012/main" showMasterPhAnim="0" showMasterSp="0">
+  <p:cSld>
+    <p:spTree>
+      <p:nvGrpSpPr>
+        <p:cNvPr id="281" name="Shape 281"/>
+        <p:cNvGrpSpPr/>
+        <p:nvPr/>
+      </p:nvGrpSpPr>
+      <p:grpSpPr>
+        <a:xfrm>
+          <a:off x="0" y="0"/>
+          <a:ext cx="0" cy="0"/>
+          <a:chOff x="0" y="0"/>
+          <a:chExt cx="0" cy="0"/>
+        </a:xfrm>
+      </p:grpSpPr>
+      <p:sp>
+        <p:nvSpPr>
+          <p:cNvPr id="282" name="Google Shape;282;p23:notes"/>
           <p:cNvSpPr txBox="1"/>
           <p:nvPr>
             <p:ph idx="1" type="body"/>
@@ -2664,7 +2766,7 @@
       </p:sp>
       <p:sp>
         <p:nvSpPr>
-          <p:cNvPr id="277" name="Google Shape;277;p23:notes"/>
+          <p:cNvPr id="283" name="Google Shape;283;p23:notes"/>
           <p:cNvSpPr/>
           <p:nvPr>
             <p:ph idx="2" type="sldImg"/>
@@ -2715,12 +2817,12 @@
 </p:notes>
 </file>
 
-<file path=ppt/notesSlides/notesSlide24.xml><?xml version="1.0" encoding="utf-8"?>
+<file path=ppt/notesSlides/notesSlide25.xml><?xml version="1.0" encoding="utf-8"?>
 <p:notes xmlns:a="http://schemas.openxmlformats.org/drawingml/2006/main" xmlns:r="http://schemas.openxmlformats.org/officeDocument/2006/relationships" xmlns:mc="http://schemas.openxmlformats.org/markup-compatibility/2006" xmlns:mv="urn:schemas-microsoft-com:mac:vml" xmlns:p="http://schemas.openxmlformats.org/presentationml/2006/main" xmlns:c="http://schemas.openxmlformats.org/drawingml/2006/chart" xmlns:dgm="http://schemas.openxmlformats.org/drawingml/2006/diagram" xmlns:o="urn:schemas-microsoft-com:office:office" xmlns:v="urn:schemas-microsoft-com:vml" xmlns:pvml="urn:schemas-microsoft-com:office:powerpoint" xmlns:com="http://schemas.openxmlformats.org/drawingml/2006/compatibility" xmlns:p14="http://schemas.microsoft.com/office/powerpoint/2010/main" xmlns:p15="http://schemas.microsoft.com/office/powerpoint/2012/main" showMasterPhAnim="0" showMasterSp="0">
   <p:cSld>
     <p:spTree>
       <p:nvGrpSpPr>
-        <p:cNvPr id="282" name="Shape 282"/>
+        <p:cNvPr id="288" name="Shape 288"/>
         <p:cNvGrpSpPr/>
         <p:nvPr/>
       </p:nvGrpSpPr>
@@ -2734,7 +2836,7 @@
       </p:grpSpPr>
       <p:sp>
         <p:nvSpPr>
-          <p:cNvPr id="283" name="Google Shape;283;g6478606def_0_1:notes"/>
+          <p:cNvPr id="289" name="Google Shape;289;g64f3853fb2_0_1:notes"/>
           <p:cNvSpPr/>
           <p:nvPr>
             <p:ph idx="2" type="sldImg"/>
@@ -2769,7 +2871,7 @@
       </p:sp>
       <p:sp>
         <p:nvSpPr>
-          <p:cNvPr id="284" name="Google Shape;284;g6478606def_0_1:notes"/>
+          <p:cNvPr id="290" name="Google Shape;290;g64f3853fb2_0_1:notes"/>
           <p:cNvSpPr txBox="1"/>
           <p:nvPr>
             <p:ph idx="1" type="body"/>
@@ -2814,12 +2916,12 @@
 </p:notes>
 </file>
 
-<file path=ppt/notesSlides/notesSlide25.xml><?xml version="1.0" encoding="utf-8"?>
+<file path=ppt/notesSlides/notesSlide26.xml><?xml version="1.0" encoding="utf-8"?>
 <p:notes xmlns:a="http://schemas.openxmlformats.org/drawingml/2006/main" xmlns:r="http://schemas.openxmlformats.org/officeDocument/2006/relationships" xmlns:mc="http://schemas.openxmlformats.org/markup-compatibility/2006" xmlns:mv="urn:schemas-microsoft-com:mac:vml" xmlns:p="http://schemas.openxmlformats.org/presentationml/2006/main" xmlns:c="http://schemas.openxmlformats.org/drawingml/2006/chart" xmlns:dgm="http://schemas.openxmlformats.org/drawingml/2006/diagram" xmlns:o="urn:schemas-microsoft-com:office:office" xmlns:v="urn:schemas-microsoft-com:vml" xmlns:pvml="urn:schemas-microsoft-com:office:powerpoint" xmlns:com="http://schemas.openxmlformats.org/drawingml/2006/compatibility" xmlns:p14="http://schemas.microsoft.com/office/powerpoint/2010/main" xmlns:p15="http://schemas.microsoft.com/office/powerpoint/2012/main" showMasterPhAnim="0" showMasterSp="0">
   <p:cSld>
     <p:spTree>
       <p:nvGrpSpPr>
-        <p:cNvPr id="288" name="Shape 288"/>
+        <p:cNvPr id="295" name="Shape 295"/>
         <p:cNvGrpSpPr/>
         <p:nvPr/>
       </p:nvGrpSpPr>
@@ -2833,7 +2935,7 @@
       </p:grpSpPr>
       <p:sp>
         <p:nvSpPr>
-          <p:cNvPr id="289" name="Google Shape;289;p24:notes"/>
+          <p:cNvPr id="296" name="Google Shape;296;g633ae4aafd_0_2:notes"/>
           <p:cNvSpPr txBox="1"/>
           <p:nvPr>
             <p:ph idx="1" type="body"/>
@@ -2880,7 +2982,7 @@
       </p:sp>
       <p:sp>
         <p:nvSpPr>
-          <p:cNvPr id="290" name="Google Shape;290;p24:notes"/>
+          <p:cNvPr id="297" name="Google Shape;297;g633ae4aafd_0_2:notes"/>
           <p:cNvSpPr/>
           <p:nvPr>
             <p:ph idx="2" type="sldImg"/>
@@ -2931,12 +3033,12 @@
 </p:notes>
 </file>
 
-<file path=ppt/notesSlides/notesSlide26.xml><?xml version="1.0" encoding="utf-8"?>
+<file path=ppt/notesSlides/notesSlide27.xml><?xml version="1.0" encoding="utf-8"?>
 <p:notes xmlns:a="http://schemas.openxmlformats.org/drawingml/2006/main" xmlns:r="http://schemas.openxmlformats.org/officeDocument/2006/relationships" xmlns:mc="http://schemas.openxmlformats.org/markup-compatibility/2006" xmlns:mv="urn:schemas-microsoft-com:mac:vml" xmlns:p="http://schemas.openxmlformats.org/presentationml/2006/main" xmlns:c="http://schemas.openxmlformats.org/drawingml/2006/chart" xmlns:dgm="http://schemas.openxmlformats.org/drawingml/2006/diagram" xmlns:o="urn:schemas-microsoft-com:office:office" xmlns:v="urn:schemas-microsoft-com:vml" xmlns:pvml="urn:schemas-microsoft-com:office:powerpoint" xmlns:com="http://schemas.openxmlformats.org/drawingml/2006/compatibility" xmlns:p14="http://schemas.microsoft.com/office/powerpoint/2010/main" xmlns:p15="http://schemas.microsoft.com/office/powerpoint/2012/main" showMasterPhAnim="0" showMasterSp="0">
   <p:cSld>
     <p:spTree>
       <p:nvGrpSpPr>
-        <p:cNvPr id="297" name="Shape 297"/>
+        <p:cNvPr id="302" name="Shape 302"/>
         <p:cNvGrpSpPr/>
         <p:nvPr/>
       </p:nvGrpSpPr>
@@ -2950,7 +3052,223 @@
       </p:grpSpPr>
       <p:sp>
         <p:nvSpPr>
-          <p:cNvPr id="298" name="Google Shape;298;p25:notes"/>
+          <p:cNvPr id="303" name="Google Shape;303;g633ae4aafd_0_9:notes"/>
+          <p:cNvSpPr/>
+          <p:nvPr>
+            <p:ph idx="2" type="sldImg"/>
+          </p:nvPr>
+        </p:nvSpPr>
+        <p:spPr>
+          <a:xfrm>
+            <a:off x="1143225" y="685800"/>
+            <a:ext cx="4572300" cy="3429000"/>
+          </a:xfrm>
+          <a:custGeom>
+            <a:rect b="b" l="l" r="r" t="t"/>
+            <a:pathLst>
+              <a:path extrusionOk="0" h="120000" w="120000">
+                <a:moveTo>
+                  <a:pt x="0" y="0"/>
+                </a:moveTo>
+                <a:lnTo>
+                  <a:pt x="120000" y="0"/>
+                </a:lnTo>
+                <a:lnTo>
+                  <a:pt x="120000" y="120000"/>
+                </a:lnTo>
+                <a:lnTo>
+                  <a:pt x="0" y="120000"/>
+                </a:lnTo>
+                <a:close/>
+              </a:path>
+            </a:pathLst>
+          </a:custGeom>
+        </p:spPr>
+      </p:sp>
+      <p:sp>
+        <p:nvSpPr>
+          <p:cNvPr id="304" name="Google Shape;304;g633ae4aafd_0_9:notes"/>
+          <p:cNvSpPr txBox="1"/>
+          <p:nvPr>
+            <p:ph idx="1" type="body"/>
+          </p:nvPr>
+        </p:nvSpPr>
+        <p:spPr>
+          <a:xfrm>
+            <a:off x="685800" y="4343400"/>
+            <a:ext cx="5486400" cy="4114800"/>
+          </a:xfrm>
+          <a:prstGeom prst="rect">
+            <a:avLst/>
+          </a:prstGeom>
+        </p:spPr>
+        <p:txBody>
+          <a:bodyPr anchorCtr="0" anchor="t" bIns="91425" lIns="91425" spcFirstLastPara="1" rIns="91425" wrap="square" tIns="91425">
+            <a:noAutofit/>
+          </a:bodyPr>
+          <a:lstStyle/>
+          <a:p>
+            <a:pPr indent="0" lvl="0" marL="0" rtl="0" algn="l">
+              <a:spcBef>
+                <a:spcPts val="0"/>
+              </a:spcBef>
+              <a:spcAft>
+                <a:spcPts val="0"/>
+              </a:spcAft>
+              <a:buNone/>
+            </a:pPr>
+            <a:r>
+              <a:t/>
+            </a:r>
+            <a:endParaRPr/>
+          </a:p>
+        </p:txBody>
+      </p:sp>
+    </p:spTree>
+  </p:cSld>
+  <p:clrMapOvr>
+    <a:masterClrMapping/>
+  </p:clrMapOvr>
+</p:notes>
+</file>
+
+<file path=ppt/notesSlides/notesSlide28.xml><?xml version="1.0" encoding="utf-8"?>
+<p:notes xmlns:a="http://schemas.openxmlformats.org/drawingml/2006/main" xmlns:r="http://schemas.openxmlformats.org/officeDocument/2006/relationships" xmlns:mc="http://schemas.openxmlformats.org/markup-compatibility/2006" xmlns:mv="urn:schemas-microsoft-com:mac:vml" xmlns:p="http://schemas.openxmlformats.org/presentationml/2006/main" xmlns:c="http://schemas.openxmlformats.org/drawingml/2006/chart" xmlns:dgm="http://schemas.openxmlformats.org/drawingml/2006/diagram" xmlns:o="urn:schemas-microsoft-com:office:office" xmlns:v="urn:schemas-microsoft-com:vml" xmlns:pvml="urn:schemas-microsoft-com:office:powerpoint" xmlns:com="http://schemas.openxmlformats.org/drawingml/2006/compatibility" xmlns:p14="http://schemas.microsoft.com/office/powerpoint/2010/main" xmlns:p15="http://schemas.microsoft.com/office/powerpoint/2012/main" showMasterPhAnim="0" showMasterSp="0">
+  <p:cSld>
+    <p:spTree>
+      <p:nvGrpSpPr>
+        <p:cNvPr id="309" name="Shape 309"/>
+        <p:cNvGrpSpPr/>
+        <p:nvPr/>
+      </p:nvGrpSpPr>
+      <p:grpSpPr>
+        <a:xfrm>
+          <a:off x="0" y="0"/>
+          <a:ext cx="0" cy="0"/>
+          <a:chOff x="0" y="0"/>
+          <a:chExt cx="0" cy="0"/>
+        </a:xfrm>
+      </p:grpSpPr>
+      <p:sp>
+        <p:nvSpPr>
+          <p:cNvPr id="310" name="Google Shape;310;p24:notes"/>
+          <p:cNvSpPr txBox="1"/>
+          <p:nvPr>
+            <p:ph idx="1" type="body"/>
+          </p:nvPr>
+        </p:nvSpPr>
+        <p:spPr>
+          <a:xfrm>
+            <a:off x="685800" y="4343400"/>
+            <a:ext cx="5486400" cy="4114800"/>
+          </a:xfrm>
+          <a:prstGeom prst="rect">
+            <a:avLst/>
+          </a:prstGeom>
+          <a:noFill/>
+          <a:ln>
+            <a:noFill/>
+          </a:ln>
+        </p:spPr>
+        <p:txBody>
+          <a:bodyPr anchorCtr="0" anchor="t" bIns="91425" lIns="91425" spcFirstLastPara="1" rIns="91425" wrap="square" tIns="91425">
+            <a:noAutofit/>
+          </a:bodyPr>
+          <a:lstStyle/>
+          <a:p>
+            <a:pPr indent="0" lvl="0" marL="0" rtl="0" algn="l">
+              <a:lnSpc>
+                <a:spcPct val="100000"/>
+              </a:lnSpc>
+              <a:spcBef>
+                <a:spcPts val="0"/>
+              </a:spcBef>
+              <a:spcAft>
+                <a:spcPts val="0"/>
+              </a:spcAft>
+              <a:buSzPts val="1100"/>
+              <a:buNone/>
+            </a:pPr>
+            <a:r>
+              <a:t/>
+            </a:r>
+            <a:endParaRPr/>
+          </a:p>
+        </p:txBody>
+      </p:sp>
+      <p:sp>
+        <p:nvSpPr>
+          <p:cNvPr id="311" name="Google Shape;311;p24:notes"/>
+          <p:cNvSpPr/>
+          <p:nvPr>
+            <p:ph idx="2" type="sldImg"/>
+          </p:nvPr>
+        </p:nvSpPr>
+        <p:spPr>
+          <a:xfrm>
+            <a:off x="1143225" y="685800"/>
+            <a:ext cx="4572300" cy="3429000"/>
+          </a:xfrm>
+          <a:custGeom>
+            <a:rect b="b" l="l" r="r" t="t"/>
+            <a:pathLst>
+              <a:path extrusionOk="0" h="120000" w="120000">
+                <a:moveTo>
+                  <a:pt x="0" y="0"/>
+                </a:moveTo>
+                <a:lnTo>
+                  <a:pt x="120000" y="0"/>
+                </a:lnTo>
+                <a:lnTo>
+                  <a:pt x="120000" y="120000"/>
+                </a:lnTo>
+                <a:lnTo>
+                  <a:pt x="0" y="120000"/>
+                </a:lnTo>
+                <a:close/>
+              </a:path>
+            </a:pathLst>
+          </a:custGeom>
+          <a:noFill/>
+          <a:ln cap="flat" cmpd="sng" w="9525">
+            <a:solidFill>
+              <a:srgbClr val="000000"/>
+            </a:solidFill>
+            <a:prstDash val="solid"/>
+            <a:round/>
+            <a:headEnd len="sm" w="sm" type="none"/>
+            <a:tailEnd len="sm" w="sm" type="none"/>
+          </a:ln>
+        </p:spPr>
+      </p:sp>
+    </p:spTree>
+  </p:cSld>
+  <p:clrMapOvr>
+    <a:masterClrMapping/>
+  </p:clrMapOvr>
+</p:notes>
+</file>
+
+<file path=ppt/notesSlides/notesSlide29.xml><?xml version="1.0" encoding="utf-8"?>
+<p:notes xmlns:a="http://schemas.openxmlformats.org/drawingml/2006/main" xmlns:r="http://schemas.openxmlformats.org/officeDocument/2006/relationships" xmlns:mc="http://schemas.openxmlformats.org/markup-compatibility/2006" xmlns:mv="urn:schemas-microsoft-com:mac:vml" xmlns:p="http://schemas.openxmlformats.org/presentationml/2006/main" xmlns:c="http://schemas.openxmlformats.org/drawingml/2006/chart" xmlns:dgm="http://schemas.openxmlformats.org/drawingml/2006/diagram" xmlns:o="urn:schemas-microsoft-com:office:office" xmlns:v="urn:schemas-microsoft-com:vml" xmlns:pvml="urn:schemas-microsoft-com:office:powerpoint" xmlns:com="http://schemas.openxmlformats.org/drawingml/2006/compatibility" xmlns:p14="http://schemas.microsoft.com/office/powerpoint/2010/main" xmlns:p15="http://schemas.microsoft.com/office/powerpoint/2012/main" showMasterPhAnim="0" showMasterSp="0">
+  <p:cSld>
+    <p:spTree>
+      <p:nvGrpSpPr>
+        <p:cNvPr id="318" name="Shape 318"/>
+        <p:cNvGrpSpPr/>
+        <p:nvPr/>
+      </p:nvGrpSpPr>
+      <p:grpSpPr>
+        <a:xfrm>
+          <a:off x="0" y="0"/>
+          <a:ext cx="0" cy="0"/>
+          <a:chOff x="0" y="0"/>
+          <a:chExt cx="0" cy="0"/>
+        </a:xfrm>
+      </p:grpSpPr>
+      <p:sp>
+        <p:nvSpPr>
+          <p:cNvPr id="319" name="Google Shape;319;p25:notes"/>
           <p:cNvSpPr/>
           <p:nvPr>
             <p:ph idx="2" type="sldImg"/>
@@ -2995,7 +3313,7 @@
       </p:sp>
       <p:sp>
         <p:nvSpPr>
-          <p:cNvPr id="299" name="Google Shape;299;p25:notes"/>
+          <p:cNvPr id="320" name="Google Shape;320;p25:notes"/>
           <p:cNvSpPr txBox="1"/>
           <p:nvPr>
             <p:ph idx="1" type="body"/>
@@ -3039,339 +3357,6 @@
             <a:endParaRPr/>
           </a:p>
         </p:txBody>
-      </p:sp>
-    </p:spTree>
-  </p:cSld>
-  <p:clrMapOvr>
-    <a:masterClrMapping/>
-  </p:clrMapOvr>
-</p:notes>
-</file>
-
-<file path=ppt/notesSlides/notesSlide27.xml><?xml version="1.0" encoding="utf-8"?>
-<p:notes xmlns:a="http://schemas.openxmlformats.org/drawingml/2006/main" xmlns:r="http://schemas.openxmlformats.org/officeDocument/2006/relationships" xmlns:mc="http://schemas.openxmlformats.org/markup-compatibility/2006" xmlns:mv="urn:schemas-microsoft-com:mac:vml" xmlns:p="http://schemas.openxmlformats.org/presentationml/2006/main" xmlns:c="http://schemas.openxmlformats.org/drawingml/2006/chart" xmlns:dgm="http://schemas.openxmlformats.org/drawingml/2006/diagram" xmlns:o="urn:schemas-microsoft-com:office:office" xmlns:v="urn:schemas-microsoft-com:vml" xmlns:pvml="urn:schemas-microsoft-com:office:powerpoint" xmlns:com="http://schemas.openxmlformats.org/drawingml/2006/compatibility" xmlns:p14="http://schemas.microsoft.com/office/powerpoint/2010/main" xmlns:p15="http://schemas.microsoft.com/office/powerpoint/2012/main" showMasterPhAnim="0" showMasterSp="0">
-  <p:cSld>
-    <p:spTree>
-      <p:nvGrpSpPr>
-        <p:cNvPr id="304" name="Shape 304"/>
-        <p:cNvGrpSpPr/>
-        <p:nvPr/>
-      </p:nvGrpSpPr>
-      <p:grpSpPr>
-        <a:xfrm>
-          <a:off x="0" y="0"/>
-          <a:ext cx="0" cy="0"/>
-          <a:chOff x="0" y="0"/>
-          <a:chExt cx="0" cy="0"/>
-        </a:xfrm>
-      </p:grpSpPr>
-      <p:sp>
-        <p:nvSpPr>
-          <p:cNvPr id="305" name="Google Shape;305;p26:notes"/>
-          <p:cNvSpPr/>
-          <p:nvPr>
-            <p:ph idx="2" type="sldImg"/>
-          </p:nvPr>
-        </p:nvSpPr>
-        <p:spPr>
-          <a:xfrm>
-            <a:off x="1143225" y="685800"/>
-            <a:ext cx="4572300" cy="3429000"/>
-          </a:xfrm>
-          <a:custGeom>
-            <a:rect b="b" l="l" r="r" t="t"/>
-            <a:pathLst>
-              <a:path extrusionOk="0" h="120000" w="120000">
-                <a:moveTo>
-                  <a:pt x="0" y="0"/>
-                </a:moveTo>
-                <a:lnTo>
-                  <a:pt x="120000" y="0"/>
-                </a:lnTo>
-                <a:lnTo>
-                  <a:pt x="120000" y="120000"/>
-                </a:lnTo>
-                <a:lnTo>
-                  <a:pt x="0" y="120000"/>
-                </a:lnTo>
-                <a:close/>
-              </a:path>
-            </a:pathLst>
-          </a:custGeom>
-          <a:noFill/>
-          <a:ln cap="flat" cmpd="sng" w="9525">
-            <a:solidFill>
-              <a:srgbClr val="000000"/>
-            </a:solidFill>
-            <a:prstDash val="solid"/>
-            <a:round/>
-            <a:headEnd len="sm" w="sm" type="none"/>
-            <a:tailEnd len="sm" w="sm" type="none"/>
-          </a:ln>
-        </p:spPr>
-      </p:sp>
-      <p:sp>
-        <p:nvSpPr>
-          <p:cNvPr id="306" name="Google Shape;306;p26:notes"/>
-          <p:cNvSpPr txBox="1"/>
-          <p:nvPr>
-            <p:ph idx="1" type="body"/>
-          </p:nvPr>
-        </p:nvSpPr>
-        <p:spPr>
-          <a:xfrm>
-            <a:off x="685800" y="4343400"/>
-            <a:ext cx="5486400" cy="4114800"/>
-          </a:xfrm>
-          <a:prstGeom prst="rect">
-            <a:avLst/>
-          </a:prstGeom>
-          <a:noFill/>
-          <a:ln>
-            <a:noFill/>
-          </a:ln>
-        </p:spPr>
-        <p:txBody>
-          <a:bodyPr anchorCtr="0" anchor="t" bIns="91425" lIns="91425" spcFirstLastPara="1" rIns="91425" wrap="square" tIns="91425">
-            <a:noAutofit/>
-          </a:bodyPr>
-          <a:lstStyle/>
-          <a:p>
-            <a:pPr indent="0" lvl="0" marL="0" rtl="0" algn="l">
-              <a:lnSpc>
-                <a:spcPct val="100000"/>
-              </a:lnSpc>
-              <a:spcBef>
-                <a:spcPts val="0"/>
-              </a:spcBef>
-              <a:spcAft>
-                <a:spcPts val="0"/>
-              </a:spcAft>
-              <a:buSzPts val="1100"/>
-              <a:buNone/>
-            </a:pPr>
-            <a:r>
-              <a:t/>
-            </a:r>
-            <a:endParaRPr/>
-          </a:p>
-        </p:txBody>
-      </p:sp>
-    </p:spTree>
-  </p:cSld>
-  <p:clrMapOvr>
-    <a:masterClrMapping/>
-  </p:clrMapOvr>
-</p:notes>
-</file>
-
-<file path=ppt/notesSlides/notesSlide28.xml><?xml version="1.0" encoding="utf-8"?>
-<p:notes xmlns:a="http://schemas.openxmlformats.org/drawingml/2006/main" xmlns:r="http://schemas.openxmlformats.org/officeDocument/2006/relationships" xmlns:mc="http://schemas.openxmlformats.org/markup-compatibility/2006" xmlns:mv="urn:schemas-microsoft-com:mac:vml" xmlns:p="http://schemas.openxmlformats.org/presentationml/2006/main" xmlns:c="http://schemas.openxmlformats.org/drawingml/2006/chart" xmlns:dgm="http://schemas.openxmlformats.org/drawingml/2006/diagram" xmlns:o="urn:schemas-microsoft-com:office:office" xmlns:v="urn:schemas-microsoft-com:vml" xmlns:pvml="urn:schemas-microsoft-com:office:powerpoint" xmlns:com="http://schemas.openxmlformats.org/drawingml/2006/compatibility" xmlns:p14="http://schemas.microsoft.com/office/powerpoint/2010/main" xmlns:p15="http://schemas.microsoft.com/office/powerpoint/2012/main" showMasterPhAnim="0" showMasterSp="0">
-  <p:cSld>
-    <p:spTree>
-      <p:nvGrpSpPr>
-        <p:cNvPr id="311" name="Shape 311"/>
-        <p:cNvGrpSpPr/>
-        <p:nvPr/>
-      </p:nvGrpSpPr>
-      <p:grpSpPr>
-        <a:xfrm>
-          <a:off x="0" y="0"/>
-          <a:ext cx="0" cy="0"/>
-          <a:chOff x="0" y="0"/>
-          <a:chExt cx="0" cy="0"/>
-        </a:xfrm>
-      </p:grpSpPr>
-      <p:sp>
-        <p:nvSpPr>
-          <p:cNvPr id="312" name="Google Shape;312;p27:notes"/>
-          <p:cNvSpPr/>
-          <p:nvPr>
-            <p:ph idx="2" type="sldImg"/>
-          </p:nvPr>
-        </p:nvSpPr>
-        <p:spPr>
-          <a:xfrm>
-            <a:off x="1143225" y="685800"/>
-            <a:ext cx="4572300" cy="3429000"/>
-          </a:xfrm>
-          <a:custGeom>
-            <a:rect b="b" l="l" r="r" t="t"/>
-            <a:pathLst>
-              <a:path extrusionOk="0" h="120000" w="120000">
-                <a:moveTo>
-                  <a:pt x="0" y="0"/>
-                </a:moveTo>
-                <a:lnTo>
-                  <a:pt x="120000" y="0"/>
-                </a:lnTo>
-                <a:lnTo>
-                  <a:pt x="120000" y="120000"/>
-                </a:lnTo>
-                <a:lnTo>
-                  <a:pt x="0" y="120000"/>
-                </a:lnTo>
-                <a:close/>
-              </a:path>
-            </a:pathLst>
-          </a:custGeom>
-          <a:noFill/>
-          <a:ln cap="flat" cmpd="sng" w="9525">
-            <a:solidFill>
-              <a:srgbClr val="000000"/>
-            </a:solidFill>
-            <a:prstDash val="solid"/>
-            <a:round/>
-            <a:headEnd len="sm" w="sm" type="none"/>
-            <a:tailEnd len="sm" w="sm" type="none"/>
-          </a:ln>
-        </p:spPr>
-      </p:sp>
-      <p:sp>
-        <p:nvSpPr>
-          <p:cNvPr id="313" name="Google Shape;313;p27:notes"/>
-          <p:cNvSpPr txBox="1"/>
-          <p:nvPr>
-            <p:ph idx="1" type="body"/>
-          </p:nvPr>
-        </p:nvSpPr>
-        <p:spPr>
-          <a:xfrm>
-            <a:off x="685800" y="4343400"/>
-            <a:ext cx="5486400" cy="4114800"/>
-          </a:xfrm>
-          <a:prstGeom prst="rect">
-            <a:avLst/>
-          </a:prstGeom>
-          <a:noFill/>
-          <a:ln>
-            <a:noFill/>
-          </a:ln>
-        </p:spPr>
-        <p:txBody>
-          <a:bodyPr anchorCtr="0" anchor="t" bIns="91425" lIns="91425" spcFirstLastPara="1" rIns="91425" wrap="square" tIns="91425">
-            <a:noAutofit/>
-          </a:bodyPr>
-          <a:lstStyle/>
-          <a:p>
-            <a:pPr indent="0" lvl="0" marL="0" rtl="0" algn="l">
-              <a:lnSpc>
-                <a:spcPct val="100000"/>
-              </a:lnSpc>
-              <a:spcBef>
-                <a:spcPts val="0"/>
-              </a:spcBef>
-              <a:spcAft>
-                <a:spcPts val="0"/>
-              </a:spcAft>
-              <a:buSzPts val="1100"/>
-              <a:buNone/>
-            </a:pPr>
-            <a:r>
-              <a:t/>
-            </a:r>
-            <a:endParaRPr/>
-          </a:p>
-        </p:txBody>
-      </p:sp>
-    </p:spTree>
-  </p:cSld>
-  <p:clrMapOvr>
-    <a:masterClrMapping/>
-  </p:clrMapOvr>
-</p:notes>
-</file>
-
-<file path=ppt/notesSlides/notesSlide29.xml><?xml version="1.0" encoding="utf-8"?>
-<p:notes xmlns:a="http://schemas.openxmlformats.org/drawingml/2006/main" xmlns:r="http://schemas.openxmlformats.org/officeDocument/2006/relationships" xmlns:mc="http://schemas.openxmlformats.org/markup-compatibility/2006" xmlns:mv="urn:schemas-microsoft-com:mac:vml" xmlns:p="http://schemas.openxmlformats.org/presentationml/2006/main" xmlns:c="http://schemas.openxmlformats.org/drawingml/2006/chart" xmlns:dgm="http://schemas.openxmlformats.org/drawingml/2006/diagram" xmlns:o="urn:schemas-microsoft-com:office:office" xmlns:v="urn:schemas-microsoft-com:vml" xmlns:pvml="urn:schemas-microsoft-com:office:powerpoint" xmlns:com="http://schemas.openxmlformats.org/drawingml/2006/compatibility" xmlns:p14="http://schemas.microsoft.com/office/powerpoint/2010/main" xmlns:p15="http://schemas.microsoft.com/office/powerpoint/2012/main" showMasterPhAnim="0" showMasterSp="0">
-  <p:cSld>
-    <p:spTree>
-      <p:nvGrpSpPr>
-        <p:cNvPr id="318" name="Shape 318"/>
-        <p:cNvGrpSpPr/>
-        <p:nvPr/>
-      </p:nvGrpSpPr>
-      <p:grpSpPr>
-        <a:xfrm>
-          <a:off x="0" y="0"/>
-          <a:ext cx="0" cy="0"/>
-          <a:chOff x="0" y="0"/>
-          <a:chExt cx="0" cy="0"/>
-        </a:xfrm>
-      </p:grpSpPr>
-      <p:sp>
-        <p:nvSpPr>
-          <p:cNvPr id="319" name="Google Shape;319;p28:notes"/>
-          <p:cNvSpPr txBox="1"/>
-          <p:nvPr>
-            <p:ph idx="1" type="body"/>
-          </p:nvPr>
-        </p:nvSpPr>
-        <p:spPr>
-          <a:xfrm>
-            <a:off x="685800" y="4343400"/>
-            <a:ext cx="5486400" cy="4114800"/>
-          </a:xfrm>
-          <a:prstGeom prst="rect">
-            <a:avLst/>
-          </a:prstGeom>
-        </p:spPr>
-        <p:txBody>
-          <a:bodyPr anchorCtr="0" anchor="t" bIns="91425" lIns="91425" spcFirstLastPara="1" rIns="91425" wrap="square" tIns="91425">
-            <a:noAutofit/>
-          </a:bodyPr>
-          <a:lstStyle/>
-          <a:p>
-            <a:pPr indent="0" lvl="0" marL="0" rtl="0" algn="l">
-              <a:spcBef>
-                <a:spcPts val="0"/>
-              </a:spcBef>
-              <a:spcAft>
-                <a:spcPts val="0"/>
-              </a:spcAft>
-              <a:buNone/>
-            </a:pPr>
-            <a:r>
-              <a:t/>
-            </a:r>
-            <a:endParaRPr/>
-          </a:p>
-        </p:txBody>
-      </p:sp>
-      <p:sp>
-        <p:nvSpPr>
-          <p:cNvPr id="320" name="Google Shape;320;p28:notes"/>
-          <p:cNvSpPr/>
-          <p:nvPr>
-            <p:ph idx="2" type="sldImg"/>
-          </p:nvPr>
-        </p:nvSpPr>
-        <p:spPr>
-          <a:xfrm>
-            <a:off x="1143225" y="685800"/>
-            <a:ext cx="4572225" cy="3429000"/>
-          </a:xfrm>
-          <a:custGeom>
-            <a:rect b="b" l="l" r="r" t="t"/>
-            <a:pathLst>
-              <a:path extrusionOk="0" h="120000" w="120000">
-                <a:moveTo>
-                  <a:pt x="0" y="0"/>
-                </a:moveTo>
-                <a:lnTo>
-                  <a:pt x="120000" y="0"/>
-                </a:lnTo>
-                <a:lnTo>
-                  <a:pt x="120000" y="120000"/>
-                </a:lnTo>
-                <a:lnTo>
-                  <a:pt x="0" y="120000"/>
-                </a:lnTo>
-                <a:close/>
-              </a:path>
-            </a:pathLst>
-          </a:custGeom>
-        </p:spPr>
       </p:sp>
     </p:spTree>
   </p:cSld>
@@ -3503,7 +3488,7 @@
   <p:cSld>
     <p:spTree>
       <p:nvGrpSpPr>
-        <p:cNvPr id="324" name="Shape 324"/>
+        <p:cNvPr id="325" name="Shape 325"/>
         <p:cNvGrpSpPr/>
         <p:nvPr/>
       </p:nvGrpSpPr>
@@ -3517,7 +3502,241 @@
       </p:grpSpPr>
       <p:sp>
         <p:nvSpPr>
-          <p:cNvPr id="325" name="Google Shape;325;p29:notes"/>
+          <p:cNvPr id="326" name="Google Shape;326;p26:notes"/>
+          <p:cNvSpPr/>
+          <p:nvPr>
+            <p:ph idx="2" type="sldImg"/>
+          </p:nvPr>
+        </p:nvSpPr>
+        <p:spPr>
+          <a:xfrm>
+            <a:off x="1143225" y="685800"/>
+            <a:ext cx="4572300" cy="3429000"/>
+          </a:xfrm>
+          <a:custGeom>
+            <a:rect b="b" l="l" r="r" t="t"/>
+            <a:pathLst>
+              <a:path extrusionOk="0" h="120000" w="120000">
+                <a:moveTo>
+                  <a:pt x="0" y="0"/>
+                </a:moveTo>
+                <a:lnTo>
+                  <a:pt x="120000" y="0"/>
+                </a:lnTo>
+                <a:lnTo>
+                  <a:pt x="120000" y="120000"/>
+                </a:lnTo>
+                <a:lnTo>
+                  <a:pt x="0" y="120000"/>
+                </a:lnTo>
+                <a:close/>
+              </a:path>
+            </a:pathLst>
+          </a:custGeom>
+          <a:noFill/>
+          <a:ln cap="flat" cmpd="sng" w="9525">
+            <a:solidFill>
+              <a:srgbClr val="000000"/>
+            </a:solidFill>
+            <a:prstDash val="solid"/>
+            <a:round/>
+            <a:headEnd len="sm" w="sm" type="none"/>
+            <a:tailEnd len="sm" w="sm" type="none"/>
+          </a:ln>
+        </p:spPr>
+      </p:sp>
+      <p:sp>
+        <p:nvSpPr>
+          <p:cNvPr id="327" name="Google Shape;327;p26:notes"/>
+          <p:cNvSpPr txBox="1"/>
+          <p:nvPr>
+            <p:ph idx="1" type="body"/>
+          </p:nvPr>
+        </p:nvSpPr>
+        <p:spPr>
+          <a:xfrm>
+            <a:off x="685800" y="4343400"/>
+            <a:ext cx="5486400" cy="4114800"/>
+          </a:xfrm>
+          <a:prstGeom prst="rect">
+            <a:avLst/>
+          </a:prstGeom>
+          <a:noFill/>
+          <a:ln>
+            <a:noFill/>
+          </a:ln>
+        </p:spPr>
+        <p:txBody>
+          <a:bodyPr anchorCtr="0" anchor="t" bIns="91425" lIns="91425" spcFirstLastPara="1" rIns="91425" wrap="square" tIns="91425">
+            <a:noAutofit/>
+          </a:bodyPr>
+          <a:lstStyle/>
+          <a:p>
+            <a:pPr indent="0" lvl="0" marL="0" rtl="0" algn="l">
+              <a:lnSpc>
+                <a:spcPct val="100000"/>
+              </a:lnSpc>
+              <a:spcBef>
+                <a:spcPts val="0"/>
+              </a:spcBef>
+              <a:spcAft>
+                <a:spcPts val="0"/>
+              </a:spcAft>
+              <a:buSzPts val="1100"/>
+              <a:buNone/>
+            </a:pPr>
+            <a:r>
+              <a:t/>
+            </a:r>
+            <a:endParaRPr/>
+          </a:p>
+        </p:txBody>
+      </p:sp>
+    </p:spTree>
+  </p:cSld>
+  <p:clrMapOvr>
+    <a:masterClrMapping/>
+  </p:clrMapOvr>
+</p:notes>
+</file>
+
+<file path=ppt/notesSlides/notesSlide31.xml><?xml version="1.0" encoding="utf-8"?>
+<p:notes xmlns:a="http://schemas.openxmlformats.org/drawingml/2006/main" xmlns:r="http://schemas.openxmlformats.org/officeDocument/2006/relationships" xmlns:mc="http://schemas.openxmlformats.org/markup-compatibility/2006" xmlns:mv="urn:schemas-microsoft-com:mac:vml" xmlns:p="http://schemas.openxmlformats.org/presentationml/2006/main" xmlns:c="http://schemas.openxmlformats.org/drawingml/2006/chart" xmlns:dgm="http://schemas.openxmlformats.org/drawingml/2006/diagram" xmlns:o="urn:schemas-microsoft-com:office:office" xmlns:v="urn:schemas-microsoft-com:vml" xmlns:pvml="urn:schemas-microsoft-com:office:powerpoint" xmlns:com="http://schemas.openxmlformats.org/drawingml/2006/compatibility" xmlns:p14="http://schemas.microsoft.com/office/powerpoint/2010/main" xmlns:p15="http://schemas.microsoft.com/office/powerpoint/2012/main" showMasterPhAnim="0" showMasterSp="0">
+  <p:cSld>
+    <p:spTree>
+      <p:nvGrpSpPr>
+        <p:cNvPr id="332" name="Shape 332"/>
+        <p:cNvGrpSpPr/>
+        <p:nvPr/>
+      </p:nvGrpSpPr>
+      <p:grpSpPr>
+        <a:xfrm>
+          <a:off x="0" y="0"/>
+          <a:ext cx="0" cy="0"/>
+          <a:chOff x="0" y="0"/>
+          <a:chExt cx="0" cy="0"/>
+        </a:xfrm>
+      </p:grpSpPr>
+      <p:sp>
+        <p:nvSpPr>
+          <p:cNvPr id="333" name="Google Shape;333;p27:notes"/>
+          <p:cNvSpPr/>
+          <p:nvPr>
+            <p:ph idx="2" type="sldImg"/>
+          </p:nvPr>
+        </p:nvSpPr>
+        <p:spPr>
+          <a:xfrm>
+            <a:off x="1143225" y="685800"/>
+            <a:ext cx="4572300" cy="3429000"/>
+          </a:xfrm>
+          <a:custGeom>
+            <a:rect b="b" l="l" r="r" t="t"/>
+            <a:pathLst>
+              <a:path extrusionOk="0" h="120000" w="120000">
+                <a:moveTo>
+                  <a:pt x="0" y="0"/>
+                </a:moveTo>
+                <a:lnTo>
+                  <a:pt x="120000" y="0"/>
+                </a:lnTo>
+                <a:lnTo>
+                  <a:pt x="120000" y="120000"/>
+                </a:lnTo>
+                <a:lnTo>
+                  <a:pt x="0" y="120000"/>
+                </a:lnTo>
+                <a:close/>
+              </a:path>
+            </a:pathLst>
+          </a:custGeom>
+          <a:noFill/>
+          <a:ln cap="flat" cmpd="sng" w="9525">
+            <a:solidFill>
+              <a:srgbClr val="000000"/>
+            </a:solidFill>
+            <a:prstDash val="solid"/>
+            <a:round/>
+            <a:headEnd len="sm" w="sm" type="none"/>
+            <a:tailEnd len="sm" w="sm" type="none"/>
+          </a:ln>
+        </p:spPr>
+      </p:sp>
+      <p:sp>
+        <p:nvSpPr>
+          <p:cNvPr id="334" name="Google Shape;334;p27:notes"/>
+          <p:cNvSpPr txBox="1"/>
+          <p:nvPr>
+            <p:ph idx="1" type="body"/>
+          </p:nvPr>
+        </p:nvSpPr>
+        <p:spPr>
+          <a:xfrm>
+            <a:off x="685800" y="4343400"/>
+            <a:ext cx="5486400" cy="4114800"/>
+          </a:xfrm>
+          <a:prstGeom prst="rect">
+            <a:avLst/>
+          </a:prstGeom>
+          <a:noFill/>
+          <a:ln>
+            <a:noFill/>
+          </a:ln>
+        </p:spPr>
+        <p:txBody>
+          <a:bodyPr anchorCtr="0" anchor="t" bIns="91425" lIns="91425" spcFirstLastPara="1" rIns="91425" wrap="square" tIns="91425">
+            <a:noAutofit/>
+          </a:bodyPr>
+          <a:lstStyle/>
+          <a:p>
+            <a:pPr indent="0" lvl="0" marL="0" rtl="0" algn="l">
+              <a:lnSpc>
+                <a:spcPct val="100000"/>
+              </a:lnSpc>
+              <a:spcBef>
+                <a:spcPts val="0"/>
+              </a:spcBef>
+              <a:spcAft>
+                <a:spcPts val="0"/>
+              </a:spcAft>
+              <a:buSzPts val="1100"/>
+              <a:buNone/>
+            </a:pPr>
+            <a:r>
+              <a:t/>
+            </a:r>
+            <a:endParaRPr/>
+          </a:p>
+        </p:txBody>
+      </p:sp>
+    </p:spTree>
+  </p:cSld>
+  <p:clrMapOvr>
+    <a:masterClrMapping/>
+  </p:clrMapOvr>
+</p:notes>
+</file>
+
+<file path=ppt/notesSlides/notesSlide32.xml><?xml version="1.0" encoding="utf-8"?>
+<p:notes xmlns:a="http://schemas.openxmlformats.org/drawingml/2006/main" xmlns:r="http://schemas.openxmlformats.org/officeDocument/2006/relationships" xmlns:mc="http://schemas.openxmlformats.org/markup-compatibility/2006" xmlns:mv="urn:schemas-microsoft-com:mac:vml" xmlns:p="http://schemas.openxmlformats.org/presentationml/2006/main" xmlns:c="http://schemas.openxmlformats.org/drawingml/2006/chart" xmlns:dgm="http://schemas.openxmlformats.org/drawingml/2006/diagram" xmlns:o="urn:schemas-microsoft-com:office:office" xmlns:v="urn:schemas-microsoft-com:vml" xmlns:pvml="urn:schemas-microsoft-com:office:powerpoint" xmlns:com="http://schemas.openxmlformats.org/drawingml/2006/compatibility" xmlns:p14="http://schemas.microsoft.com/office/powerpoint/2010/main" xmlns:p15="http://schemas.microsoft.com/office/powerpoint/2012/main" showMasterPhAnim="0" showMasterSp="0">
+  <p:cSld>
+    <p:spTree>
+      <p:nvGrpSpPr>
+        <p:cNvPr id="339" name="Shape 339"/>
+        <p:cNvGrpSpPr/>
+        <p:nvPr/>
+      </p:nvGrpSpPr>
+      <p:grpSpPr>
+        <a:xfrm>
+          <a:off x="0" y="0"/>
+          <a:ext cx="0" cy="0"/>
+          <a:chOff x="0" y="0"/>
+          <a:chExt cx="0" cy="0"/>
+        </a:xfrm>
+      </p:grpSpPr>
+      <p:sp>
+        <p:nvSpPr>
+          <p:cNvPr id="340" name="Google Shape;340;p28:notes"/>
           <p:cNvSpPr txBox="1"/>
           <p:nvPr>
             <p:ph idx="1" type="body"/>
@@ -3556,7 +3775,7 @@
       </p:sp>
       <p:sp>
         <p:nvSpPr>
-          <p:cNvPr id="326" name="Google Shape;326;p29:notes"/>
+          <p:cNvPr id="341" name="Google Shape;341;p28:notes"/>
           <p:cNvSpPr/>
           <p:nvPr>
             <p:ph idx="2" type="sldImg"/>
@@ -3597,12 +3816,12 @@
 </p:notes>
 </file>
 
-<file path=ppt/notesSlides/notesSlide31.xml><?xml version="1.0" encoding="utf-8"?>
+<file path=ppt/notesSlides/notesSlide33.xml><?xml version="1.0" encoding="utf-8"?>
 <p:notes xmlns:a="http://schemas.openxmlformats.org/drawingml/2006/main" xmlns:r="http://schemas.openxmlformats.org/officeDocument/2006/relationships" xmlns:mc="http://schemas.openxmlformats.org/markup-compatibility/2006" xmlns:mv="urn:schemas-microsoft-com:mac:vml" xmlns:p="http://schemas.openxmlformats.org/presentationml/2006/main" xmlns:c="http://schemas.openxmlformats.org/drawingml/2006/chart" xmlns:dgm="http://schemas.openxmlformats.org/drawingml/2006/diagram" xmlns:o="urn:schemas-microsoft-com:office:office" xmlns:v="urn:schemas-microsoft-com:vml" xmlns:pvml="urn:schemas-microsoft-com:office:powerpoint" xmlns:com="http://schemas.openxmlformats.org/drawingml/2006/compatibility" xmlns:p14="http://schemas.microsoft.com/office/powerpoint/2010/main" xmlns:p15="http://schemas.microsoft.com/office/powerpoint/2012/main" showMasterPhAnim="0" showMasterSp="0">
   <p:cSld>
     <p:spTree>
       <p:nvGrpSpPr>
-        <p:cNvPr id="330" name="Shape 330"/>
+        <p:cNvPr id="345" name="Shape 345"/>
         <p:cNvGrpSpPr/>
         <p:nvPr/>
       </p:nvGrpSpPr>
@@ -3616,7 +3835,7 @@
       </p:grpSpPr>
       <p:sp>
         <p:nvSpPr>
-          <p:cNvPr id="331" name="Google Shape;331;p31:notes"/>
+          <p:cNvPr id="346" name="Google Shape;346;p29:notes"/>
           <p:cNvSpPr txBox="1"/>
           <p:nvPr>
             <p:ph idx="1" type="body"/>
@@ -3655,7 +3874,106 @@
       </p:sp>
       <p:sp>
         <p:nvSpPr>
-          <p:cNvPr id="332" name="Google Shape;332;p31:notes"/>
+          <p:cNvPr id="347" name="Google Shape;347;p29:notes"/>
+          <p:cNvSpPr/>
+          <p:nvPr>
+            <p:ph idx="2" type="sldImg"/>
+          </p:nvPr>
+        </p:nvSpPr>
+        <p:spPr>
+          <a:xfrm>
+            <a:off x="1143225" y="685800"/>
+            <a:ext cx="4572225" cy="3429000"/>
+          </a:xfrm>
+          <a:custGeom>
+            <a:rect b="b" l="l" r="r" t="t"/>
+            <a:pathLst>
+              <a:path extrusionOk="0" h="120000" w="120000">
+                <a:moveTo>
+                  <a:pt x="0" y="0"/>
+                </a:moveTo>
+                <a:lnTo>
+                  <a:pt x="120000" y="0"/>
+                </a:lnTo>
+                <a:lnTo>
+                  <a:pt x="120000" y="120000"/>
+                </a:lnTo>
+                <a:lnTo>
+                  <a:pt x="0" y="120000"/>
+                </a:lnTo>
+                <a:close/>
+              </a:path>
+            </a:pathLst>
+          </a:custGeom>
+        </p:spPr>
+      </p:sp>
+    </p:spTree>
+  </p:cSld>
+  <p:clrMapOvr>
+    <a:masterClrMapping/>
+  </p:clrMapOvr>
+</p:notes>
+</file>
+
+<file path=ppt/notesSlides/notesSlide34.xml><?xml version="1.0" encoding="utf-8"?>
+<p:notes xmlns:a="http://schemas.openxmlformats.org/drawingml/2006/main" xmlns:r="http://schemas.openxmlformats.org/officeDocument/2006/relationships" xmlns:mc="http://schemas.openxmlformats.org/markup-compatibility/2006" xmlns:mv="urn:schemas-microsoft-com:mac:vml" xmlns:p="http://schemas.openxmlformats.org/presentationml/2006/main" xmlns:c="http://schemas.openxmlformats.org/drawingml/2006/chart" xmlns:dgm="http://schemas.openxmlformats.org/drawingml/2006/diagram" xmlns:o="urn:schemas-microsoft-com:office:office" xmlns:v="urn:schemas-microsoft-com:vml" xmlns:pvml="urn:schemas-microsoft-com:office:powerpoint" xmlns:com="http://schemas.openxmlformats.org/drawingml/2006/compatibility" xmlns:p14="http://schemas.microsoft.com/office/powerpoint/2010/main" xmlns:p15="http://schemas.microsoft.com/office/powerpoint/2012/main" showMasterPhAnim="0" showMasterSp="0">
+  <p:cSld>
+    <p:spTree>
+      <p:nvGrpSpPr>
+        <p:cNvPr id="351" name="Shape 351"/>
+        <p:cNvGrpSpPr/>
+        <p:nvPr/>
+      </p:nvGrpSpPr>
+      <p:grpSpPr>
+        <a:xfrm>
+          <a:off x="0" y="0"/>
+          <a:ext cx="0" cy="0"/>
+          <a:chOff x="0" y="0"/>
+          <a:chExt cx="0" cy="0"/>
+        </a:xfrm>
+      </p:grpSpPr>
+      <p:sp>
+        <p:nvSpPr>
+          <p:cNvPr id="352" name="Google Shape;352;p31:notes"/>
+          <p:cNvSpPr txBox="1"/>
+          <p:nvPr>
+            <p:ph idx="1" type="body"/>
+          </p:nvPr>
+        </p:nvSpPr>
+        <p:spPr>
+          <a:xfrm>
+            <a:off x="685800" y="4343400"/>
+            <a:ext cx="5486400" cy="4114800"/>
+          </a:xfrm>
+          <a:prstGeom prst="rect">
+            <a:avLst/>
+          </a:prstGeom>
+        </p:spPr>
+        <p:txBody>
+          <a:bodyPr anchorCtr="0" anchor="t" bIns="91425" lIns="91425" spcFirstLastPara="1" rIns="91425" wrap="square" tIns="91425">
+            <a:noAutofit/>
+          </a:bodyPr>
+          <a:lstStyle/>
+          <a:p>
+            <a:pPr indent="0" lvl="0" marL="0" rtl="0" algn="l">
+              <a:spcBef>
+                <a:spcPts val="0"/>
+              </a:spcBef>
+              <a:spcAft>
+                <a:spcPts val="0"/>
+              </a:spcAft>
+              <a:buNone/>
+            </a:pPr>
+            <a:r>
+              <a:t/>
+            </a:r>
+            <a:endParaRPr/>
+          </a:p>
+        </p:txBody>
+      </p:sp>
+      <p:sp>
+        <p:nvSpPr>
+          <p:cNvPr id="353" name="Google Shape;353;p31:notes"/>
           <p:cNvSpPr/>
           <p:nvPr>
             <p:ph idx="2" type="sldImg"/>
@@ -24837,9 +25155,29 @@
             </a:pPr>
             <a:r>
               <a:rPr lang="en-US" sz="1600"/>
-              <a:t>Except Age all features are categorical and shows very low correlation. Highest corr = 0.023 (Industry) &amp; -0.026 (group)</a:t>
+              <a:t>Except Age, user_id all features are categorical and shows very low correlation. Highest corr = 0.023 (Industry) &amp; -0.026 (group)</a:t>
             </a:r>
-            <a:endParaRPr/>
+            <a:endParaRPr sz="1600"/>
+          </a:p>
+          <a:p>
+            <a:pPr indent="-228600" lvl="0" marL="228600" rtl="0" algn="l">
+              <a:lnSpc>
+                <a:spcPct val="90000"/>
+              </a:lnSpc>
+              <a:spcBef>
+                <a:spcPts val="0"/>
+              </a:spcBef>
+              <a:spcAft>
+                <a:spcPts val="0"/>
+              </a:spcAft>
+              <a:buSzPts val="1600"/>
+              <a:buChar char="•"/>
+            </a:pPr>
+            <a:r>
+              <a:rPr lang="en-US" sz="1600"/>
+              <a:t>Data is NOT linearly separable</a:t>
+            </a:r>
+            <a:endParaRPr sz="1600"/>
           </a:p>
         </p:txBody>
       </p:sp>
@@ -24849,17 +25187,18 @@
           <p:cNvPicPr preferRelativeResize="0"/>
           <p:nvPr/>
         </p:nvPicPr>
-        <p:blipFill rotWithShape="1">
+        <p:blipFill>
           <a:blip r:embed="rId3">
             <a:alphaModFix/>
           </a:blip>
-          <a:srcRect b="0" l="0" r="0" t="0"/>
-          <a:stretch/>
+          <a:stretch>
+            <a:fillRect/>
+          </a:stretch>
         </p:blipFill>
         <p:spPr>
           <a:xfrm>
-            <a:off x="4662102" y="1089252"/>
-            <a:ext cx="6903723" cy="4556458"/>
+            <a:off x="4212332" y="152400"/>
+            <a:ext cx="7827269" cy="5966615"/>
           </a:xfrm>
           <a:prstGeom prst="rect">
             <a:avLst/>
@@ -27166,13 +27505,6 @@
 <file path=ppt/slides/slide23.xml><?xml version="1.0" encoding="utf-8"?>
 <p:sld xmlns:a="http://schemas.openxmlformats.org/drawingml/2006/main" xmlns:r="http://schemas.openxmlformats.org/officeDocument/2006/relationships" xmlns:mc="http://schemas.openxmlformats.org/markup-compatibility/2006" xmlns:mv="urn:schemas-microsoft-com:mac:vml" xmlns:p="http://schemas.openxmlformats.org/presentationml/2006/main" xmlns:c="http://schemas.openxmlformats.org/drawingml/2006/chart" xmlns:dgm="http://schemas.openxmlformats.org/drawingml/2006/diagram" xmlns:o="urn:schemas-microsoft-com:office:office" xmlns:v="urn:schemas-microsoft-com:vml" xmlns:pvml="urn:schemas-microsoft-com:office:powerpoint" xmlns:com="http://schemas.openxmlformats.org/drawingml/2006/compatibility" xmlns:p14="http://schemas.microsoft.com/office/powerpoint/2010/main" xmlns:p15="http://schemas.microsoft.com/office/powerpoint/2012/main">
   <p:cSld>
-    <p:bg>
-      <p:bgPr>
-        <a:solidFill>
-          <a:schemeClr val="lt1"/>
-        </a:solidFill>
-      </p:bgPr>
-    </p:bg>
     <p:spTree>
       <p:nvGrpSpPr>
         <p:cNvPr id="278" name="Shape 278"/>
@@ -27190,6 +27522,187 @@
       <p:sp>
         <p:nvSpPr>
           <p:cNvPr id="279" name="Google Shape;279;p37"/>
+          <p:cNvSpPr txBox="1"/>
+          <p:nvPr>
+            <p:ph type="title"/>
+          </p:nvPr>
+        </p:nvSpPr>
+        <p:spPr>
+          <a:xfrm>
+            <a:off x="838200" y="365125"/>
+            <a:ext cx="10515600" cy="1325700"/>
+          </a:xfrm>
+          <a:prstGeom prst="rect">
+            <a:avLst/>
+          </a:prstGeom>
+        </p:spPr>
+        <p:txBody>
+          <a:bodyPr anchorCtr="0" anchor="ctr" bIns="45700" lIns="91425" spcFirstLastPara="1" rIns="91425" wrap="square" tIns="45700">
+            <a:noAutofit/>
+          </a:bodyPr>
+          <a:lstStyle/>
+          <a:p>
+            <a:pPr indent="0" lvl="0" marL="0" rtl="0" algn="l">
+              <a:spcBef>
+                <a:spcPts val="0"/>
+              </a:spcBef>
+              <a:spcAft>
+                <a:spcPts val="0"/>
+              </a:spcAft>
+              <a:buNone/>
+            </a:pPr>
+            <a:r>
+              <a:rPr lang="en-US"/>
+              <a:t>Tactics to deal Imbalance data</a:t>
+            </a:r>
+            <a:endParaRPr/>
+          </a:p>
+        </p:txBody>
+      </p:sp>
+      <p:sp>
+        <p:nvSpPr>
+          <p:cNvPr id="280" name="Google Shape;280;p37"/>
+          <p:cNvSpPr txBox="1"/>
+          <p:nvPr>
+            <p:ph idx="1" type="body"/>
+          </p:nvPr>
+        </p:nvSpPr>
+        <p:spPr>
+          <a:xfrm>
+            <a:off x="838200" y="1825625"/>
+            <a:ext cx="10515600" cy="4351200"/>
+          </a:xfrm>
+          <a:prstGeom prst="rect">
+            <a:avLst/>
+          </a:prstGeom>
+        </p:spPr>
+        <p:txBody>
+          <a:bodyPr anchorCtr="0" anchor="t" bIns="45700" lIns="91425" spcFirstLastPara="1" rIns="91425" wrap="square" tIns="45700">
+            <a:noAutofit/>
+          </a:bodyPr>
+          <a:lstStyle/>
+          <a:p>
+            <a:pPr indent="-342900" lvl="0" marL="457200" rtl="0" algn="l">
+              <a:spcBef>
+                <a:spcPts val="1000"/>
+              </a:spcBef>
+              <a:spcAft>
+                <a:spcPts val="0"/>
+              </a:spcAft>
+              <a:buSzPts val="1800"/>
+              <a:buAutoNum type="arabicPeriod"/>
+            </a:pPr>
+            <a:r>
+              <a:rPr lang="en-US"/>
+              <a:t>Recollect data if possible (may get more minority class observations)</a:t>
+            </a:r>
+            <a:endParaRPr/>
+          </a:p>
+          <a:p>
+            <a:pPr indent="-342900" lvl="0" marL="457200" rtl="0" algn="l">
+              <a:spcBef>
+                <a:spcPts val="0"/>
+              </a:spcBef>
+              <a:spcAft>
+                <a:spcPts val="0"/>
+              </a:spcAft>
+              <a:buSzPts val="1800"/>
+              <a:buAutoNum type="arabicPeriod"/>
+            </a:pPr>
+            <a:r>
+              <a:rPr lang="en-US"/>
+              <a:t>Over Sampling (Increase minority to level of majority class)</a:t>
+            </a:r>
+            <a:endParaRPr/>
+          </a:p>
+          <a:p>
+            <a:pPr indent="-342900" lvl="0" marL="457200" rtl="0" algn="l">
+              <a:spcBef>
+                <a:spcPts val="0"/>
+              </a:spcBef>
+              <a:spcAft>
+                <a:spcPts val="0"/>
+              </a:spcAft>
+              <a:buSzPts val="1800"/>
+              <a:buAutoNum type="arabicPeriod"/>
+            </a:pPr>
+            <a:r>
+              <a:rPr lang="en-US"/>
+              <a:t>Under Sampling (Take random samples of majority to match  minority class)</a:t>
+            </a:r>
+            <a:endParaRPr/>
+          </a:p>
+          <a:p>
+            <a:pPr indent="-342900" lvl="0" marL="457200" rtl="0" algn="l">
+              <a:spcBef>
+                <a:spcPts val="0"/>
+              </a:spcBef>
+              <a:spcAft>
+                <a:spcPts val="0"/>
+              </a:spcAft>
+              <a:buSzPts val="1800"/>
+              <a:buAutoNum type="arabicPeriod"/>
+            </a:pPr>
+            <a:r>
+              <a:rPr lang="en-US"/>
+              <a:t>Change Evaluation/Assessment Measure - ROCR/AUROC</a:t>
+            </a:r>
+            <a:endParaRPr/>
+          </a:p>
+          <a:p>
+            <a:pPr indent="-342900" lvl="0" marL="457200" rtl="0" algn="l">
+              <a:spcBef>
+                <a:spcPts val="0"/>
+              </a:spcBef>
+              <a:spcAft>
+                <a:spcPts val="0"/>
+              </a:spcAft>
+              <a:buSzPts val="1800"/>
+              <a:buAutoNum type="arabicPeriod"/>
+            </a:pPr>
+            <a:r>
+              <a:rPr lang="en-US"/>
+              <a:t>Algorithms not sensitive to Imbalance data like DT, Ensemble methods (RF, Bagging, Boosting)</a:t>
+            </a:r>
+            <a:endParaRPr/>
+          </a:p>
+        </p:txBody>
+      </p:sp>
+    </p:spTree>
+  </p:cSld>
+  <p:clrMapOvr>
+    <a:masterClrMapping/>
+  </p:clrMapOvr>
+</p:sld>
+</file>
+
+<file path=ppt/slides/slide24.xml><?xml version="1.0" encoding="utf-8"?>
+<p:sld xmlns:a="http://schemas.openxmlformats.org/drawingml/2006/main" xmlns:r="http://schemas.openxmlformats.org/officeDocument/2006/relationships" xmlns:mc="http://schemas.openxmlformats.org/markup-compatibility/2006" xmlns:mv="urn:schemas-microsoft-com:mac:vml" xmlns:p="http://schemas.openxmlformats.org/presentationml/2006/main" xmlns:c="http://schemas.openxmlformats.org/drawingml/2006/chart" xmlns:dgm="http://schemas.openxmlformats.org/drawingml/2006/diagram" xmlns:o="urn:schemas-microsoft-com:office:office" xmlns:v="urn:schemas-microsoft-com:vml" xmlns:pvml="urn:schemas-microsoft-com:office:powerpoint" xmlns:com="http://schemas.openxmlformats.org/drawingml/2006/compatibility" xmlns:p14="http://schemas.microsoft.com/office/powerpoint/2010/main" xmlns:p15="http://schemas.microsoft.com/office/powerpoint/2012/main">
+  <p:cSld>
+    <p:bg>
+      <p:bgPr>
+        <a:solidFill>
+          <a:schemeClr val="lt1"/>
+        </a:solidFill>
+      </p:bgPr>
+    </p:bg>
+    <p:spTree>
+      <p:nvGrpSpPr>
+        <p:cNvPr id="284" name="Shape 284"/>
+        <p:cNvGrpSpPr/>
+        <p:nvPr/>
+      </p:nvGrpSpPr>
+      <p:grpSpPr>
+        <a:xfrm>
+          <a:off x="0" y="0"/>
+          <a:ext cx="0" cy="0"/>
+          <a:chOff x="0" y="0"/>
+          <a:chExt cx="0" cy="0"/>
+        </a:xfrm>
+      </p:grpSpPr>
+      <p:sp>
+        <p:nvSpPr>
+          <p:cNvPr id="285" name="Google Shape;285;p38"/>
           <p:cNvSpPr/>
           <p:nvPr/>
         </p:nvSpPr>
@@ -27248,7 +27761,7 @@
       </p:sp>
       <p:sp>
         <p:nvSpPr>
-          <p:cNvPr id="280" name="Google Shape;280;p37"/>
+          <p:cNvPr id="286" name="Google Shape;286;p38"/>
           <p:cNvSpPr txBox="1"/>
           <p:nvPr>
             <p:ph type="title"/>
@@ -27300,7 +27813,7 @@
                 <a:cs typeface="Calibri"/>
                 <a:sym typeface="Calibri"/>
               </a:rPr>
-              <a:t>Model Comparison (Choose Best Model)</a:t>
+              <a:t>Model Comparison (Choose Best Model - Control)</a:t>
             </a:r>
             <a:endParaRPr/>
           </a:p>
@@ -27308,7 +27821,7 @@
       </p:sp>
       <p:pic>
         <p:nvPicPr>
-          <p:cNvPr id="281" name="Google Shape;281;p37"/>
+          <p:cNvPr id="287" name="Google Shape;287;p38"/>
           <p:cNvPicPr preferRelativeResize="0"/>
           <p:nvPr/>
         </p:nvPicPr>
@@ -27322,8 +27835,8 @@
         </p:blipFill>
         <p:spPr>
           <a:xfrm>
-            <a:off x="1295400" y="1616903"/>
-            <a:ext cx="9420225" cy="4514850"/>
+            <a:off x="1219200" y="1921703"/>
+            <a:ext cx="9677400" cy="4124325"/>
           </a:xfrm>
           <a:prstGeom prst="rect">
             <a:avLst/>
@@ -27342,12 +27855,12 @@
 </p:sld>
 </file>
 
-<file path=ppt/slides/slide24.xml><?xml version="1.0" encoding="utf-8"?>
+<file path=ppt/slides/slide25.xml><?xml version="1.0" encoding="utf-8"?>
 <p:sld xmlns:a="http://schemas.openxmlformats.org/drawingml/2006/main" xmlns:r="http://schemas.openxmlformats.org/officeDocument/2006/relationships" xmlns:mc="http://schemas.openxmlformats.org/markup-compatibility/2006" xmlns:mv="urn:schemas-microsoft-com:mac:vml" xmlns:p="http://schemas.openxmlformats.org/presentationml/2006/main" xmlns:c="http://schemas.openxmlformats.org/drawingml/2006/chart" xmlns:dgm="http://schemas.openxmlformats.org/drawingml/2006/diagram" xmlns:o="urn:schemas-microsoft-com:office:office" xmlns:v="urn:schemas-microsoft-com:vml" xmlns:pvml="urn:schemas-microsoft-com:office:powerpoint" xmlns:com="http://schemas.openxmlformats.org/drawingml/2006/compatibility" xmlns:p14="http://schemas.microsoft.com/office/powerpoint/2010/main" xmlns:p15="http://schemas.microsoft.com/office/powerpoint/2012/main">
   <p:cSld>
     <p:spTree>
       <p:nvGrpSpPr>
-        <p:cNvPr id="285" name="Shape 285"/>
+        <p:cNvPr id="291" name="Shape 291"/>
         <p:cNvGrpSpPr/>
         <p:nvPr/>
       </p:nvGrpSpPr>
@@ -27361,7 +27874,7 @@
       </p:grpSpPr>
       <p:sp>
         <p:nvSpPr>
-          <p:cNvPr id="286" name="Google Shape;286;p38"/>
+          <p:cNvPr id="292" name="Google Shape;292;p39"/>
           <p:cNvSpPr txBox="1"/>
           <p:nvPr>
             <p:ph type="title"/>
@@ -27393,7 +27906,7 @@
             </a:pPr>
             <a:r>
               <a:rPr lang="en-US"/>
-              <a:t>Tactics to deal Imbalance data</a:t>
+              <a:t>ROC curve - Model comparsion (Control)</a:t>
             </a:r>
             <a:endParaRPr/>
           </a:p>
@@ -27401,7 +27914,7 @@
       </p:sp>
       <p:sp>
         <p:nvSpPr>
-          <p:cNvPr id="287" name="Google Shape;287;p38"/>
+          <p:cNvPr id="293" name="Google Shape;293;p39"/>
           <p:cNvSpPr txBox="1"/>
           <p:nvPr>
             <p:ph idx="1" type="body"/>
@@ -27422,92 +27935,50 @@
           </a:bodyPr>
           <a:lstStyle/>
           <a:p>
-            <a:pPr indent="-342900" lvl="0" marL="457200" rtl="0" algn="l">
+            <a:pPr indent="0" lvl="0" marL="0" rtl="0" algn="l">
               <a:spcBef>
                 <a:spcPts val="1000"/>
               </a:spcBef>
               <a:spcAft>
                 <a:spcPts val="0"/>
               </a:spcAft>
-              <a:buSzPts val="1800"/>
-              <a:buAutoNum type="arabicPeriod"/>
+              <a:buNone/>
             </a:pPr>
             <a:r>
-              <a:rPr lang="en-US"/>
-              <a:t>Recollect data if possible (may get more minority class observations)</a:t>
-            </a:r>
-            <a:endParaRPr/>
-          </a:p>
-          <a:p>
-            <a:pPr indent="-342900" lvl="0" marL="457200" rtl="0" algn="l">
-              <a:spcBef>
-                <a:spcPts val="0"/>
-              </a:spcBef>
-              <a:spcAft>
-                <a:spcPts val="0"/>
-              </a:spcAft>
-              <a:buSzPts val="1800"/>
-              <a:buAutoNum type="arabicPeriod"/>
-            </a:pPr>
-            <a:r>
-              <a:rPr lang="en-US"/>
-              <a:t>Over Sampling (Increase minority to level of majority class)</a:t>
-            </a:r>
-            <a:endParaRPr/>
-          </a:p>
-          <a:p>
-            <a:pPr indent="-342900" lvl="0" marL="457200" rtl="0" algn="l">
-              <a:spcBef>
-                <a:spcPts val="0"/>
-              </a:spcBef>
-              <a:spcAft>
-                <a:spcPts val="0"/>
-              </a:spcAft>
-              <a:buSzPts val="1800"/>
-              <a:buAutoNum type="arabicPeriod"/>
-            </a:pPr>
-            <a:r>
-              <a:rPr lang="en-US"/>
-              <a:t>Under Sampling (Take random samples of majority to match  minority class)</a:t>
-            </a:r>
-            <a:endParaRPr/>
-          </a:p>
-          <a:p>
-            <a:pPr indent="-342900" lvl="0" marL="457200" rtl="0" algn="l">
-              <a:spcBef>
-                <a:spcPts val="0"/>
-              </a:spcBef>
-              <a:spcAft>
-                <a:spcPts val="0"/>
-              </a:spcAft>
-              <a:buSzPts val="1800"/>
-              <a:buAutoNum type="arabicPeriod"/>
-            </a:pPr>
-            <a:r>
-              <a:rPr lang="en-US"/>
-              <a:t>Change Evaluation/Assessment Measure - ROCR/AUROC</a:t>
-            </a:r>
-            <a:endParaRPr/>
-          </a:p>
-          <a:p>
-            <a:pPr indent="-342900" lvl="0" marL="457200" rtl="0" algn="l">
-              <a:spcBef>
-                <a:spcPts val="0"/>
-              </a:spcBef>
-              <a:spcAft>
-                <a:spcPts val="0"/>
-              </a:spcAft>
-              <a:buSzPts val="1800"/>
-              <a:buAutoNum type="arabicPeriod"/>
-            </a:pPr>
-            <a:r>
-              <a:rPr lang="en-US"/>
-              <a:t>Algorithms not sensitive to Imbalance data like DT, Ensemble methods (RF, Bagging, Boosting)</a:t>
+              <a:t/>
             </a:r>
             <a:endParaRPr/>
           </a:p>
         </p:txBody>
       </p:sp>
+      <p:pic>
+        <p:nvPicPr>
+          <p:cNvPr id="294" name="Google Shape;294;p39"/>
+          <p:cNvPicPr preferRelativeResize="0"/>
+          <p:nvPr/>
+        </p:nvPicPr>
+        <p:blipFill>
+          <a:blip r:embed="rId3">
+            <a:alphaModFix/>
+          </a:blip>
+          <a:stretch>
+            <a:fillRect/>
+          </a:stretch>
+        </p:blipFill>
+        <p:spPr>
+          <a:xfrm>
+            <a:off x="838200" y="1639025"/>
+            <a:ext cx="5219700" cy="4724400"/>
+          </a:xfrm>
+          <a:prstGeom prst="rect">
+            <a:avLst/>
+          </a:prstGeom>
+          <a:noFill/>
+          <a:ln>
+            <a:noFill/>
+          </a:ln>
+        </p:spPr>
+      </p:pic>
     </p:spTree>
   </p:cSld>
   <p:clrMapOvr>
@@ -27516,7 +27987,7 @@
 </p:sld>
 </file>
 
-<file path=ppt/slides/slide25.xml><?xml version="1.0" encoding="utf-8"?>
+<file path=ppt/slides/slide26.xml><?xml version="1.0" encoding="utf-8"?>
 <p:sld xmlns:a="http://schemas.openxmlformats.org/drawingml/2006/main" xmlns:r="http://schemas.openxmlformats.org/officeDocument/2006/relationships" xmlns:mc="http://schemas.openxmlformats.org/markup-compatibility/2006" xmlns:mv="urn:schemas-microsoft-com:mac:vml" xmlns:p="http://schemas.openxmlformats.org/presentationml/2006/main" xmlns:c="http://schemas.openxmlformats.org/drawingml/2006/chart" xmlns:dgm="http://schemas.openxmlformats.org/drawingml/2006/diagram" xmlns:o="urn:schemas-microsoft-com:office:office" xmlns:v="urn:schemas-microsoft-com:vml" xmlns:pvml="urn:schemas-microsoft-com:office:powerpoint" xmlns:com="http://schemas.openxmlformats.org/drawingml/2006/compatibility" xmlns:p14="http://schemas.microsoft.com/office/powerpoint/2010/main" xmlns:p15="http://schemas.microsoft.com/office/powerpoint/2012/main">
   <p:cSld>
     <p:bg>
@@ -27528,7 +27999,7 @@
     </p:bg>
     <p:spTree>
       <p:nvGrpSpPr>
-        <p:cNvPr id="291" name="Shape 291"/>
+        <p:cNvPr id="298" name="Shape 298"/>
         <p:cNvGrpSpPr/>
         <p:nvPr/>
       </p:nvGrpSpPr>
@@ -27542,7 +28013,338 @@
       </p:grpSpPr>
       <p:sp>
         <p:nvSpPr>
-          <p:cNvPr id="292" name="Google Shape;292;p39"/>
+          <p:cNvPr id="299" name="Google Shape;299;p40"/>
+          <p:cNvSpPr/>
+          <p:nvPr/>
+        </p:nvSpPr>
+        <p:spPr>
+          <a:xfrm>
+            <a:off x="0" y="651752"/>
+            <a:ext cx="12192000" cy="736500"/>
+          </a:xfrm>
+          <a:prstGeom prst="rect">
+            <a:avLst/>
+          </a:prstGeom>
+          <a:solidFill>
+            <a:schemeClr val="dk1"/>
+          </a:solidFill>
+          <a:ln>
+            <a:noFill/>
+          </a:ln>
+        </p:spPr>
+        <p:txBody>
+          <a:bodyPr anchorCtr="0" anchor="ctr" bIns="45700" lIns="91425" spcFirstLastPara="1" rIns="91425" wrap="square" tIns="45700">
+            <a:noAutofit/>
+          </a:bodyPr>
+          <a:lstStyle/>
+          <a:p>
+            <a:pPr indent="0" lvl="0" marL="0" marR="0" rtl="0" algn="ctr">
+              <a:lnSpc>
+                <a:spcPct val="100000"/>
+              </a:lnSpc>
+              <a:spcBef>
+                <a:spcPts val="0"/>
+              </a:spcBef>
+              <a:spcAft>
+                <a:spcPts val="0"/>
+              </a:spcAft>
+              <a:buClr>
+                <a:srgbClr val="000000"/>
+              </a:buClr>
+              <a:buSzPts val="1800"/>
+              <a:buFont typeface="Arial"/>
+              <a:buNone/>
+            </a:pPr>
+            <a:r>
+              <a:t/>
+            </a:r>
+            <a:endParaRPr b="0" i="0" sz="1800" u="none" cap="none" strike="noStrike">
+              <a:solidFill>
+                <a:schemeClr val="lt1"/>
+              </a:solidFill>
+              <a:latin typeface="Calibri"/>
+              <a:ea typeface="Calibri"/>
+              <a:cs typeface="Calibri"/>
+              <a:sym typeface="Calibri"/>
+            </a:endParaRPr>
+          </a:p>
+        </p:txBody>
+      </p:sp>
+      <p:sp>
+        <p:nvSpPr>
+          <p:cNvPr id="300" name="Google Shape;300;p40"/>
+          <p:cNvSpPr txBox="1"/>
+          <p:nvPr>
+            <p:ph type="title"/>
+          </p:nvPr>
+        </p:nvSpPr>
+        <p:spPr>
+          <a:xfrm>
+            <a:off x="556532" y="643467"/>
+            <a:ext cx="11211000" cy="744900"/>
+          </a:xfrm>
+          <a:prstGeom prst="rect">
+            <a:avLst/>
+          </a:prstGeom>
+          <a:noFill/>
+          <a:ln>
+            <a:noFill/>
+          </a:ln>
+        </p:spPr>
+        <p:txBody>
+          <a:bodyPr anchorCtr="0" anchor="ctr" bIns="45700" lIns="91425" spcFirstLastPara="1" rIns="91425" wrap="square" tIns="45700">
+            <a:noAutofit/>
+          </a:bodyPr>
+          <a:lstStyle/>
+          <a:p>
+            <a:pPr indent="0" lvl="0" marL="0" rtl="0" algn="ctr">
+              <a:lnSpc>
+                <a:spcPct val="90000"/>
+              </a:lnSpc>
+              <a:spcBef>
+                <a:spcPts val="0"/>
+              </a:spcBef>
+              <a:spcAft>
+                <a:spcPts val="0"/>
+              </a:spcAft>
+              <a:buClr>
+                <a:schemeClr val="lt1"/>
+              </a:buClr>
+              <a:buSzPts val="3200"/>
+              <a:buFont typeface="Calibri"/>
+              <a:buNone/>
+            </a:pPr>
+            <a:r>
+              <a:rPr lang="en-US" sz="3200">
+                <a:solidFill>
+                  <a:schemeClr val="lt1"/>
+                </a:solidFill>
+                <a:latin typeface="Calibri"/>
+                <a:ea typeface="Calibri"/>
+                <a:cs typeface="Calibri"/>
+                <a:sym typeface="Calibri"/>
+              </a:rPr>
+              <a:t>Model Comparison (Choose Best Model - </a:t>
+            </a:r>
+            <a:r>
+              <a:rPr lang="en-US" sz="3200">
+                <a:solidFill>
+                  <a:schemeClr val="lt1"/>
+                </a:solidFill>
+              </a:rPr>
+              <a:t>Test</a:t>
+            </a:r>
+            <a:r>
+              <a:rPr lang="en-US" sz="3200">
+                <a:solidFill>
+                  <a:schemeClr val="lt1"/>
+                </a:solidFill>
+                <a:latin typeface="Calibri"/>
+                <a:ea typeface="Calibri"/>
+                <a:cs typeface="Calibri"/>
+                <a:sym typeface="Calibri"/>
+              </a:rPr>
+              <a:t>)</a:t>
+            </a:r>
+            <a:endParaRPr/>
+          </a:p>
+        </p:txBody>
+      </p:sp>
+      <p:pic>
+        <p:nvPicPr>
+          <p:cNvPr id="301" name="Google Shape;301;p40"/>
+          <p:cNvPicPr preferRelativeResize="0"/>
+          <p:nvPr/>
+        </p:nvPicPr>
+        <p:blipFill>
+          <a:blip r:embed="rId3">
+            <a:alphaModFix/>
+          </a:blip>
+          <a:stretch>
+            <a:fillRect/>
+          </a:stretch>
+        </p:blipFill>
+        <p:spPr>
+          <a:xfrm>
+            <a:off x="1066800" y="1921767"/>
+            <a:ext cx="9925050" cy="3981450"/>
+          </a:xfrm>
+          <a:prstGeom prst="rect">
+            <a:avLst/>
+          </a:prstGeom>
+          <a:noFill/>
+          <a:ln>
+            <a:noFill/>
+          </a:ln>
+        </p:spPr>
+      </p:pic>
+    </p:spTree>
+  </p:cSld>
+  <p:clrMapOvr>
+    <a:masterClrMapping/>
+  </p:clrMapOvr>
+</p:sld>
+</file>
+
+<file path=ppt/slides/slide27.xml><?xml version="1.0" encoding="utf-8"?>
+<p:sld xmlns:a="http://schemas.openxmlformats.org/drawingml/2006/main" xmlns:r="http://schemas.openxmlformats.org/officeDocument/2006/relationships" xmlns:mc="http://schemas.openxmlformats.org/markup-compatibility/2006" xmlns:mv="urn:schemas-microsoft-com:mac:vml" xmlns:p="http://schemas.openxmlformats.org/presentationml/2006/main" xmlns:c="http://schemas.openxmlformats.org/drawingml/2006/chart" xmlns:dgm="http://schemas.openxmlformats.org/drawingml/2006/diagram" xmlns:o="urn:schemas-microsoft-com:office:office" xmlns:v="urn:schemas-microsoft-com:vml" xmlns:pvml="urn:schemas-microsoft-com:office:powerpoint" xmlns:com="http://schemas.openxmlformats.org/drawingml/2006/compatibility" xmlns:p14="http://schemas.microsoft.com/office/powerpoint/2010/main" xmlns:p15="http://schemas.microsoft.com/office/powerpoint/2012/main">
+  <p:cSld>
+    <p:spTree>
+      <p:nvGrpSpPr>
+        <p:cNvPr id="305" name="Shape 305"/>
+        <p:cNvGrpSpPr/>
+        <p:nvPr/>
+      </p:nvGrpSpPr>
+      <p:grpSpPr>
+        <a:xfrm>
+          <a:off x="0" y="0"/>
+          <a:ext cx="0" cy="0"/>
+          <a:chOff x="0" y="0"/>
+          <a:chExt cx="0" cy="0"/>
+        </a:xfrm>
+      </p:grpSpPr>
+      <p:sp>
+        <p:nvSpPr>
+          <p:cNvPr id="306" name="Google Shape;306;p41"/>
+          <p:cNvSpPr txBox="1"/>
+          <p:nvPr>
+            <p:ph type="title"/>
+          </p:nvPr>
+        </p:nvSpPr>
+        <p:spPr>
+          <a:xfrm>
+            <a:off x="838200" y="365125"/>
+            <a:ext cx="10515600" cy="1325700"/>
+          </a:xfrm>
+          <a:prstGeom prst="rect">
+            <a:avLst/>
+          </a:prstGeom>
+        </p:spPr>
+        <p:txBody>
+          <a:bodyPr anchorCtr="0" anchor="ctr" bIns="45700" lIns="91425" spcFirstLastPara="1" rIns="91425" wrap="square" tIns="45700">
+            <a:noAutofit/>
+          </a:bodyPr>
+          <a:lstStyle/>
+          <a:p>
+            <a:pPr indent="0" lvl="0" marL="0" rtl="0" algn="l">
+              <a:spcBef>
+                <a:spcPts val="0"/>
+              </a:spcBef>
+              <a:spcAft>
+                <a:spcPts val="0"/>
+              </a:spcAft>
+              <a:buNone/>
+            </a:pPr>
+            <a:r>
+              <a:rPr lang="en-US"/>
+              <a:t>ROC curve - Model comparsion (Test)</a:t>
+            </a:r>
+            <a:endParaRPr/>
+          </a:p>
+        </p:txBody>
+      </p:sp>
+      <p:sp>
+        <p:nvSpPr>
+          <p:cNvPr id="307" name="Google Shape;307;p41"/>
+          <p:cNvSpPr txBox="1"/>
+          <p:nvPr>
+            <p:ph idx="1" type="body"/>
+          </p:nvPr>
+        </p:nvSpPr>
+        <p:spPr>
+          <a:xfrm>
+            <a:off x="838200" y="1825625"/>
+            <a:ext cx="10515600" cy="4351200"/>
+          </a:xfrm>
+          <a:prstGeom prst="rect">
+            <a:avLst/>
+          </a:prstGeom>
+        </p:spPr>
+        <p:txBody>
+          <a:bodyPr anchorCtr="0" anchor="t" bIns="45700" lIns="91425" spcFirstLastPara="1" rIns="91425" wrap="square" tIns="45700">
+            <a:noAutofit/>
+          </a:bodyPr>
+          <a:lstStyle/>
+          <a:p>
+            <a:pPr indent="0" lvl="0" marL="0" rtl="0" algn="l">
+              <a:spcBef>
+                <a:spcPts val="1000"/>
+              </a:spcBef>
+              <a:spcAft>
+                <a:spcPts val="0"/>
+              </a:spcAft>
+              <a:buNone/>
+            </a:pPr>
+            <a:r>
+              <a:t/>
+            </a:r>
+            <a:endParaRPr/>
+          </a:p>
+        </p:txBody>
+      </p:sp>
+      <p:pic>
+        <p:nvPicPr>
+          <p:cNvPr id="308" name="Google Shape;308;p41"/>
+          <p:cNvPicPr preferRelativeResize="0"/>
+          <p:nvPr/>
+        </p:nvPicPr>
+        <p:blipFill>
+          <a:blip r:embed="rId3">
+            <a:alphaModFix/>
+          </a:blip>
+          <a:stretch>
+            <a:fillRect/>
+          </a:stretch>
+        </p:blipFill>
+        <p:spPr>
+          <a:xfrm>
+            <a:off x="857250" y="1657350"/>
+            <a:ext cx="5295900" cy="4762500"/>
+          </a:xfrm>
+          <a:prstGeom prst="rect">
+            <a:avLst/>
+          </a:prstGeom>
+          <a:noFill/>
+          <a:ln>
+            <a:noFill/>
+          </a:ln>
+        </p:spPr>
+      </p:pic>
+    </p:spTree>
+  </p:cSld>
+  <p:clrMapOvr>
+    <a:masterClrMapping/>
+  </p:clrMapOvr>
+</p:sld>
+</file>
+
+<file path=ppt/slides/slide28.xml><?xml version="1.0" encoding="utf-8"?>
+<p:sld xmlns:a="http://schemas.openxmlformats.org/drawingml/2006/main" xmlns:r="http://schemas.openxmlformats.org/officeDocument/2006/relationships" xmlns:mc="http://schemas.openxmlformats.org/markup-compatibility/2006" xmlns:mv="urn:schemas-microsoft-com:mac:vml" xmlns:p="http://schemas.openxmlformats.org/presentationml/2006/main" xmlns:c="http://schemas.openxmlformats.org/drawingml/2006/chart" xmlns:dgm="http://schemas.openxmlformats.org/drawingml/2006/diagram" xmlns:o="urn:schemas-microsoft-com:office:office" xmlns:v="urn:schemas-microsoft-com:vml" xmlns:pvml="urn:schemas-microsoft-com:office:powerpoint" xmlns:com="http://schemas.openxmlformats.org/drawingml/2006/compatibility" xmlns:p14="http://schemas.microsoft.com/office/powerpoint/2010/main" xmlns:p15="http://schemas.microsoft.com/office/powerpoint/2012/main">
+  <p:cSld>
+    <p:bg>
+      <p:bgPr>
+        <a:solidFill>
+          <a:schemeClr val="lt1"/>
+        </a:solidFill>
+      </p:bgPr>
+    </p:bg>
+    <p:spTree>
+      <p:nvGrpSpPr>
+        <p:cNvPr id="312" name="Shape 312"/>
+        <p:cNvGrpSpPr/>
+        <p:nvPr/>
+      </p:nvGrpSpPr>
+      <p:grpSpPr>
+        <a:xfrm>
+          <a:off x="0" y="0"/>
+          <a:ext cx="0" cy="0"/>
+          <a:chOff x="0" y="0"/>
+          <a:chExt cx="0" cy="0"/>
+        </a:xfrm>
+      </p:grpSpPr>
+      <p:sp>
+        <p:nvSpPr>
+          <p:cNvPr id="313" name="Google Shape;313;p42"/>
           <p:cNvSpPr/>
           <p:nvPr/>
         </p:nvSpPr>
@@ -27601,7 +28403,7 @@
       </p:sp>
       <p:sp>
         <p:nvSpPr>
-          <p:cNvPr id="293" name="Google Shape;293;p39"/>
+          <p:cNvPr id="314" name="Google Shape;314;p42"/>
           <p:cNvSpPr/>
           <p:nvPr/>
         </p:nvSpPr>
@@ -27666,7 +28468,7 @@
       </p:sp>
       <p:sp>
         <p:nvSpPr>
-          <p:cNvPr id="294" name="Google Shape;294;p39"/>
+          <p:cNvPr id="315" name="Google Shape;315;p42"/>
           <p:cNvSpPr txBox="1"/>
           <p:nvPr>
             <p:ph type="ctrTitle"/>
@@ -27718,7 +28520,7 @@
       </p:sp>
       <p:sp>
         <p:nvSpPr>
-          <p:cNvPr id="295" name="Google Shape;295;p39"/>
+          <p:cNvPr id="316" name="Google Shape;316;p42"/>
           <p:cNvSpPr txBox="1"/>
           <p:nvPr>
             <p:ph idx="1" type="subTitle"/>
@@ -27765,7 +28567,7 @@
                   <a:schemeClr val="accent1"/>
                 </a:solidFill>
               </a:rPr>
-              <a:t>Use Tableau to visualize data</a:t>
+              <a:t>Use Tableau &amp; python to visualize data</a:t>
             </a:r>
             <a:endParaRPr/>
           </a:p>
@@ -27773,7 +28575,7 @@
       </p:sp>
       <p:cxnSp>
         <p:nvCxnSpPr>
-          <p:cNvPr id="296" name="Google Shape;296;p39"/>
+          <p:cNvPr id="317" name="Google Shape;317;p42"/>
           <p:cNvCxnSpPr/>
           <p:nvPr/>
         </p:nvCxnSpPr>
@@ -27797,451 +28599,6 @@
           </a:ln>
         </p:spPr>
       </p:cxnSp>
-    </p:spTree>
-  </p:cSld>
-  <p:clrMapOvr>
-    <a:masterClrMapping/>
-  </p:clrMapOvr>
-</p:sld>
-</file>
-
-<file path=ppt/slides/slide26.xml><?xml version="1.0" encoding="utf-8"?>
-<p:sld xmlns:a="http://schemas.openxmlformats.org/drawingml/2006/main" xmlns:r="http://schemas.openxmlformats.org/officeDocument/2006/relationships" xmlns:mc="http://schemas.openxmlformats.org/markup-compatibility/2006" xmlns:mv="urn:schemas-microsoft-com:mac:vml" xmlns:p="http://schemas.openxmlformats.org/presentationml/2006/main" xmlns:c="http://schemas.openxmlformats.org/drawingml/2006/chart" xmlns:dgm="http://schemas.openxmlformats.org/drawingml/2006/diagram" xmlns:o="urn:schemas-microsoft-com:office:office" xmlns:v="urn:schemas-microsoft-com:vml" xmlns:pvml="urn:schemas-microsoft-com:office:powerpoint" xmlns:com="http://schemas.openxmlformats.org/drawingml/2006/compatibility" xmlns:p14="http://schemas.microsoft.com/office/powerpoint/2010/main" xmlns:p15="http://schemas.microsoft.com/office/powerpoint/2012/main">
-  <p:cSld>
-    <p:spTree>
-      <p:nvGrpSpPr>
-        <p:cNvPr id="300" name="Shape 300"/>
-        <p:cNvGrpSpPr/>
-        <p:nvPr/>
-      </p:nvGrpSpPr>
-      <p:grpSpPr>
-        <a:xfrm>
-          <a:off x="0" y="0"/>
-          <a:ext cx="0" cy="0"/>
-          <a:chOff x="0" y="0"/>
-          <a:chExt cx="0" cy="0"/>
-        </a:xfrm>
-      </p:grpSpPr>
-      <p:sp>
-        <p:nvSpPr>
-          <p:cNvPr id="301" name="Google Shape;301;p40"/>
-          <p:cNvSpPr txBox="1"/>
-          <p:nvPr>
-            <p:ph type="title"/>
-          </p:nvPr>
-        </p:nvSpPr>
-        <p:spPr>
-          <a:xfrm>
-            <a:off x="838200" y="365125"/>
-            <a:ext cx="10515600" cy="1325700"/>
-          </a:xfrm>
-          <a:prstGeom prst="rect">
-            <a:avLst/>
-          </a:prstGeom>
-          <a:noFill/>
-          <a:ln>
-            <a:noFill/>
-          </a:ln>
-        </p:spPr>
-        <p:txBody>
-          <a:bodyPr anchorCtr="0" anchor="ctr" bIns="45700" lIns="91425" spcFirstLastPara="1" rIns="91425" wrap="square" tIns="45700">
-            <a:noAutofit/>
-          </a:bodyPr>
-          <a:lstStyle/>
-          <a:p>
-            <a:pPr indent="0" lvl="0" marL="0" rtl="0" algn="l">
-              <a:lnSpc>
-                <a:spcPct val="90000"/>
-              </a:lnSpc>
-              <a:spcBef>
-                <a:spcPts val="0"/>
-              </a:spcBef>
-              <a:spcAft>
-                <a:spcPts val="0"/>
-              </a:spcAft>
-              <a:buSzPts val="1800"/>
-              <a:buNone/>
-            </a:pPr>
-            <a:r>
-              <a:rPr lang="en-US"/>
-              <a:t>Determine which sources/devices/industries have the highest conversion rates</a:t>
-            </a:r>
-            <a:endParaRPr/>
-          </a:p>
-        </p:txBody>
-      </p:sp>
-      <p:sp>
-        <p:nvSpPr>
-          <p:cNvPr id="302" name="Google Shape;302;p40"/>
-          <p:cNvSpPr txBox="1"/>
-          <p:nvPr>
-            <p:ph idx="1" type="body"/>
-          </p:nvPr>
-        </p:nvSpPr>
-        <p:spPr>
-          <a:xfrm>
-            <a:off x="838200" y="1825625"/>
-            <a:ext cx="10515600" cy="4351200"/>
-          </a:xfrm>
-          <a:prstGeom prst="rect">
-            <a:avLst/>
-          </a:prstGeom>
-          <a:noFill/>
-          <a:ln>
-            <a:noFill/>
-          </a:ln>
-        </p:spPr>
-        <p:txBody>
-          <a:bodyPr anchorCtr="0" anchor="t" bIns="45700" lIns="91425" spcFirstLastPara="1" rIns="91425" wrap="square" tIns="45700">
-            <a:noAutofit/>
-          </a:bodyPr>
-          <a:lstStyle/>
-          <a:p>
-            <a:pPr indent="0" lvl="0" marL="0" rtl="0" algn="l">
-              <a:lnSpc>
-                <a:spcPct val="90000"/>
-              </a:lnSpc>
-              <a:spcBef>
-                <a:spcPts val="1000"/>
-              </a:spcBef>
-              <a:spcAft>
-                <a:spcPts val="0"/>
-              </a:spcAft>
-              <a:buSzPts val="1800"/>
-              <a:buNone/>
-            </a:pPr>
-            <a:r>
-              <a:t/>
-            </a:r>
-            <a:endParaRPr/>
-          </a:p>
-        </p:txBody>
-      </p:sp>
-      <p:pic>
-        <p:nvPicPr>
-          <p:cNvPr id="303" name="Google Shape;303;p40"/>
-          <p:cNvPicPr preferRelativeResize="0"/>
-          <p:nvPr/>
-        </p:nvPicPr>
-        <p:blipFill rotWithShape="1">
-          <a:blip r:embed="rId3">
-            <a:alphaModFix/>
-          </a:blip>
-          <a:srcRect b="0" l="0" r="0" t="0"/>
-          <a:stretch/>
-        </p:blipFill>
-        <p:spPr>
-          <a:xfrm>
-            <a:off x="838200" y="1825625"/>
-            <a:ext cx="10515600" cy="4351200"/>
-          </a:xfrm>
-          <a:prstGeom prst="rect">
-            <a:avLst/>
-          </a:prstGeom>
-          <a:noFill/>
-          <a:ln>
-            <a:noFill/>
-          </a:ln>
-        </p:spPr>
-      </p:pic>
-    </p:spTree>
-  </p:cSld>
-  <p:clrMapOvr>
-    <a:masterClrMapping/>
-  </p:clrMapOvr>
-</p:sld>
-</file>
-
-<file path=ppt/slides/slide27.xml><?xml version="1.0" encoding="utf-8"?>
-<p:sld xmlns:a="http://schemas.openxmlformats.org/drawingml/2006/main" xmlns:r="http://schemas.openxmlformats.org/officeDocument/2006/relationships" xmlns:mc="http://schemas.openxmlformats.org/markup-compatibility/2006" xmlns:mv="urn:schemas-microsoft-com:mac:vml" xmlns:p="http://schemas.openxmlformats.org/presentationml/2006/main" xmlns:c="http://schemas.openxmlformats.org/drawingml/2006/chart" xmlns:dgm="http://schemas.openxmlformats.org/drawingml/2006/diagram" xmlns:o="urn:schemas-microsoft-com:office:office" xmlns:v="urn:schemas-microsoft-com:vml" xmlns:pvml="urn:schemas-microsoft-com:office:powerpoint" xmlns:com="http://schemas.openxmlformats.org/drawingml/2006/compatibility" xmlns:p14="http://schemas.microsoft.com/office/powerpoint/2010/main" xmlns:p15="http://schemas.microsoft.com/office/powerpoint/2012/main">
-  <p:cSld>
-    <p:spTree>
-      <p:nvGrpSpPr>
-        <p:cNvPr id="307" name="Shape 307"/>
-        <p:cNvGrpSpPr/>
-        <p:nvPr/>
-      </p:nvGrpSpPr>
-      <p:grpSpPr>
-        <a:xfrm>
-          <a:off x="0" y="0"/>
-          <a:ext cx="0" cy="0"/>
-          <a:chOff x="0" y="0"/>
-          <a:chExt cx="0" cy="0"/>
-        </a:xfrm>
-      </p:grpSpPr>
-      <p:sp>
-        <p:nvSpPr>
-          <p:cNvPr id="308" name="Google Shape;308;p41"/>
-          <p:cNvSpPr txBox="1"/>
-          <p:nvPr>
-            <p:ph type="title"/>
-          </p:nvPr>
-        </p:nvSpPr>
-        <p:spPr>
-          <a:xfrm>
-            <a:off x="838200" y="365125"/>
-            <a:ext cx="10515600" cy="1325700"/>
-          </a:xfrm>
-          <a:prstGeom prst="rect">
-            <a:avLst/>
-          </a:prstGeom>
-          <a:noFill/>
-          <a:ln>
-            <a:noFill/>
-          </a:ln>
-        </p:spPr>
-        <p:txBody>
-          <a:bodyPr anchorCtr="0" anchor="ctr" bIns="45700" lIns="91425" spcFirstLastPara="1" rIns="91425" wrap="square" tIns="45700">
-            <a:noAutofit/>
-          </a:bodyPr>
-          <a:lstStyle/>
-          <a:p>
-            <a:pPr indent="0" lvl="0" marL="0" rtl="0" algn="l">
-              <a:lnSpc>
-                <a:spcPct val="90000"/>
-              </a:lnSpc>
-              <a:spcBef>
-                <a:spcPts val="0"/>
-              </a:spcBef>
-              <a:spcAft>
-                <a:spcPts val="0"/>
-              </a:spcAft>
-              <a:buSzPts val="1800"/>
-              <a:buNone/>
-            </a:pPr>
-            <a:r>
-              <a:rPr lang="en-US"/>
-              <a:t>Conversion rate by Industry Code- for Control users</a:t>
-            </a:r>
-            <a:endParaRPr/>
-          </a:p>
-        </p:txBody>
-      </p:sp>
-      <p:sp>
-        <p:nvSpPr>
-          <p:cNvPr id="309" name="Google Shape;309;p41"/>
-          <p:cNvSpPr txBox="1"/>
-          <p:nvPr>
-            <p:ph idx="1" type="body"/>
-          </p:nvPr>
-        </p:nvSpPr>
-        <p:spPr>
-          <a:xfrm>
-            <a:off x="838200" y="1825625"/>
-            <a:ext cx="10515600" cy="4351200"/>
-          </a:xfrm>
-          <a:prstGeom prst="rect">
-            <a:avLst/>
-          </a:prstGeom>
-          <a:noFill/>
-          <a:ln>
-            <a:noFill/>
-          </a:ln>
-        </p:spPr>
-        <p:txBody>
-          <a:bodyPr anchorCtr="0" anchor="t" bIns="45700" lIns="91425" spcFirstLastPara="1" rIns="91425" wrap="square" tIns="45700">
-            <a:noAutofit/>
-          </a:bodyPr>
-          <a:lstStyle/>
-          <a:p>
-            <a:pPr indent="0" lvl="0" marL="0" rtl="0" algn="l">
-              <a:lnSpc>
-                <a:spcPct val="90000"/>
-              </a:lnSpc>
-              <a:spcBef>
-                <a:spcPts val="1000"/>
-              </a:spcBef>
-              <a:spcAft>
-                <a:spcPts val="0"/>
-              </a:spcAft>
-              <a:buSzPts val="1800"/>
-              <a:buNone/>
-            </a:pPr>
-            <a:r>
-              <a:t/>
-            </a:r>
-            <a:endParaRPr/>
-          </a:p>
-        </p:txBody>
-      </p:sp>
-      <p:pic>
-        <p:nvPicPr>
-          <p:cNvPr id="310" name="Google Shape;310;p41"/>
-          <p:cNvPicPr preferRelativeResize="0"/>
-          <p:nvPr/>
-        </p:nvPicPr>
-        <p:blipFill rotWithShape="1">
-          <a:blip r:embed="rId3">
-            <a:alphaModFix/>
-          </a:blip>
-          <a:srcRect b="0" l="0" r="0" t="0"/>
-          <a:stretch/>
-        </p:blipFill>
-        <p:spPr>
-          <a:xfrm>
-            <a:off x="838200" y="1825625"/>
-            <a:ext cx="10515601" cy="4351200"/>
-          </a:xfrm>
-          <a:prstGeom prst="rect">
-            <a:avLst/>
-          </a:prstGeom>
-          <a:noFill/>
-          <a:ln>
-            <a:noFill/>
-          </a:ln>
-        </p:spPr>
-      </p:pic>
-    </p:spTree>
-  </p:cSld>
-  <p:clrMapOvr>
-    <a:masterClrMapping/>
-  </p:clrMapOvr>
-</p:sld>
-</file>
-
-<file path=ppt/slides/slide28.xml><?xml version="1.0" encoding="utf-8"?>
-<p:sld xmlns:a="http://schemas.openxmlformats.org/drawingml/2006/main" xmlns:r="http://schemas.openxmlformats.org/officeDocument/2006/relationships" xmlns:mc="http://schemas.openxmlformats.org/markup-compatibility/2006" xmlns:mv="urn:schemas-microsoft-com:mac:vml" xmlns:p="http://schemas.openxmlformats.org/presentationml/2006/main" xmlns:c="http://schemas.openxmlformats.org/drawingml/2006/chart" xmlns:dgm="http://schemas.openxmlformats.org/drawingml/2006/diagram" xmlns:o="urn:schemas-microsoft-com:office:office" xmlns:v="urn:schemas-microsoft-com:vml" xmlns:pvml="urn:schemas-microsoft-com:office:powerpoint" xmlns:com="http://schemas.openxmlformats.org/drawingml/2006/compatibility" xmlns:p14="http://schemas.microsoft.com/office/powerpoint/2010/main" xmlns:p15="http://schemas.microsoft.com/office/powerpoint/2012/main">
-  <p:cSld>
-    <p:spTree>
-      <p:nvGrpSpPr>
-        <p:cNvPr id="314" name="Shape 314"/>
-        <p:cNvGrpSpPr/>
-        <p:nvPr/>
-      </p:nvGrpSpPr>
-      <p:grpSpPr>
-        <a:xfrm>
-          <a:off x="0" y="0"/>
-          <a:ext cx="0" cy="0"/>
-          <a:chOff x="0" y="0"/>
-          <a:chExt cx="0" cy="0"/>
-        </a:xfrm>
-      </p:grpSpPr>
-      <p:sp>
-        <p:nvSpPr>
-          <p:cNvPr id="315" name="Google Shape;315;p42"/>
-          <p:cNvSpPr txBox="1"/>
-          <p:nvPr>
-            <p:ph type="title"/>
-          </p:nvPr>
-        </p:nvSpPr>
-        <p:spPr>
-          <a:xfrm>
-            <a:off x="838200" y="365125"/>
-            <a:ext cx="10515600" cy="1325700"/>
-          </a:xfrm>
-          <a:prstGeom prst="rect">
-            <a:avLst/>
-          </a:prstGeom>
-          <a:noFill/>
-          <a:ln>
-            <a:noFill/>
-          </a:ln>
-        </p:spPr>
-        <p:txBody>
-          <a:bodyPr anchorCtr="0" anchor="ctr" bIns="45700" lIns="91425" spcFirstLastPara="1" rIns="91425" wrap="square" tIns="45700">
-            <a:noAutofit/>
-          </a:bodyPr>
-          <a:lstStyle/>
-          <a:p>
-            <a:pPr indent="0" lvl="0" marL="0" rtl="0" algn="l">
-              <a:lnSpc>
-                <a:spcPct val="90000"/>
-              </a:lnSpc>
-              <a:spcBef>
-                <a:spcPts val="0"/>
-              </a:spcBef>
-              <a:spcAft>
-                <a:spcPts val="0"/>
-              </a:spcAft>
-              <a:buClr>
-                <a:schemeClr val="dk1"/>
-              </a:buClr>
-              <a:buSzPts val="1100"/>
-              <a:buFont typeface="Arial"/>
-              <a:buNone/>
-            </a:pPr>
-            <a:r>
-              <a:rPr lang="en-US"/>
-              <a:t>Conversion rate by Industry Code- for Test users</a:t>
-            </a:r>
-            <a:endParaRPr/>
-          </a:p>
-        </p:txBody>
-      </p:sp>
-      <p:sp>
-        <p:nvSpPr>
-          <p:cNvPr id="316" name="Google Shape;316;p42"/>
-          <p:cNvSpPr txBox="1"/>
-          <p:nvPr>
-            <p:ph idx="1" type="body"/>
-          </p:nvPr>
-        </p:nvSpPr>
-        <p:spPr>
-          <a:xfrm>
-            <a:off x="838200" y="1825625"/>
-            <a:ext cx="10515600" cy="4351200"/>
-          </a:xfrm>
-          <a:prstGeom prst="rect">
-            <a:avLst/>
-          </a:prstGeom>
-          <a:noFill/>
-          <a:ln>
-            <a:noFill/>
-          </a:ln>
-        </p:spPr>
-        <p:txBody>
-          <a:bodyPr anchorCtr="0" anchor="t" bIns="45700" lIns="91425" spcFirstLastPara="1" rIns="91425" wrap="square" tIns="45700">
-            <a:noAutofit/>
-          </a:bodyPr>
-          <a:lstStyle/>
-          <a:p>
-            <a:pPr indent="0" lvl="0" marL="0" rtl="0" algn="l">
-              <a:lnSpc>
-                <a:spcPct val="90000"/>
-              </a:lnSpc>
-              <a:spcBef>
-                <a:spcPts val="1000"/>
-              </a:spcBef>
-              <a:spcAft>
-                <a:spcPts val="0"/>
-              </a:spcAft>
-              <a:buSzPts val="1800"/>
-              <a:buNone/>
-            </a:pPr>
-            <a:r>
-              <a:t/>
-            </a:r>
-            <a:endParaRPr/>
-          </a:p>
-        </p:txBody>
-      </p:sp>
-      <p:pic>
-        <p:nvPicPr>
-          <p:cNvPr id="317" name="Google Shape;317;p42"/>
-          <p:cNvPicPr preferRelativeResize="0"/>
-          <p:nvPr/>
-        </p:nvPicPr>
-        <p:blipFill rotWithShape="1">
-          <a:blip r:embed="rId3">
-            <a:alphaModFix/>
-          </a:blip>
-          <a:srcRect b="0" l="0" r="0" t="0"/>
-          <a:stretch/>
-        </p:blipFill>
-        <p:spPr>
-          <a:xfrm>
-            <a:off x="838200" y="1825625"/>
-            <a:ext cx="10515601" cy="4351200"/>
-          </a:xfrm>
-          <a:prstGeom prst="rect">
-            <a:avLst/>
-          </a:prstGeom>
-          <a:noFill/>
-          <a:ln>
-            <a:noFill/>
-          </a:ln>
-        </p:spPr>
-      </p:pic>
     </p:spTree>
   </p:cSld>
   <p:clrMapOvr>
@@ -28278,7 +28635,7 @@
         <p:spPr>
           <a:xfrm>
             <a:off x="838200" y="365125"/>
-            <a:ext cx="10515600" cy="1325563"/>
+            <a:ext cx="10515600" cy="1325700"/>
           </a:xfrm>
           <a:prstGeom prst="rect">
             <a:avLst/>
@@ -28304,19 +28661,59 @@
               <a:spcAft>
                 <a:spcPts val="0"/>
               </a:spcAft>
-              <a:buClr>
-                <a:schemeClr val="dk1"/>
-              </a:buClr>
               <a:buSzPts val="1800"/>
               <a:buNone/>
             </a:pPr>
             <a:r>
-              <a:rPr lang="en-US" sz="2400"/>
-              <a:t>Conversation rate compared to source distribution: </a:t>
+              <a:rPr lang="en-US"/>
+              <a:t>Determine which sources/devices/industries have the highest conversion rates</a:t>
             </a:r>
+            <a:endParaRPr/>
+          </a:p>
+        </p:txBody>
+      </p:sp>
+      <p:sp>
+        <p:nvSpPr>
+          <p:cNvPr id="323" name="Google Shape;323;p43"/>
+          <p:cNvSpPr txBox="1"/>
+          <p:nvPr>
+            <p:ph idx="1" type="body"/>
+          </p:nvPr>
+        </p:nvSpPr>
+        <p:spPr>
+          <a:xfrm>
+            <a:off x="838200" y="1825625"/>
+            <a:ext cx="10515600" cy="4351200"/>
+          </a:xfrm>
+          <a:prstGeom prst="rect">
+            <a:avLst/>
+          </a:prstGeom>
+          <a:noFill/>
+          <a:ln>
+            <a:noFill/>
+          </a:ln>
+        </p:spPr>
+        <p:txBody>
+          <a:bodyPr anchorCtr="0" anchor="t" bIns="45700" lIns="91425" spcFirstLastPara="1" rIns="91425" wrap="square" tIns="45700">
+            <a:noAutofit/>
+          </a:bodyPr>
+          <a:lstStyle/>
+          <a:p>
+            <a:pPr indent="0" lvl="0" marL="0" rtl="0" algn="l">
+              <a:lnSpc>
+                <a:spcPct val="90000"/>
+              </a:lnSpc>
+              <a:spcBef>
+                <a:spcPts val="1000"/>
+              </a:spcBef>
+              <a:spcAft>
+                <a:spcPts val="0"/>
+              </a:spcAft>
+              <a:buSzPts val="1800"/>
+              <a:buNone/>
+            </a:pPr>
             <a:r>
-              <a:rPr lang="en-US" sz="1800"/>
-              <a:t>here we see that most visitors were coming from Facebook and Linkedin but when it comes to converting almost all three sources show a high rate of conversion, hence no additional changes are required from a business point of view.</a:t>
+              <a:t/>
             </a:r>
             <a:endParaRPr/>
           </a:p>
@@ -28324,7 +28721,7 @@
       </p:sp>
       <p:pic>
         <p:nvPicPr>
-          <p:cNvPr id="323" name="Google Shape;323;p43"/>
+          <p:cNvPr id="324" name="Google Shape;324;p43"/>
           <p:cNvPicPr preferRelativeResize="0"/>
           <p:nvPr/>
         </p:nvPicPr>
@@ -28337,8 +28734,8 @@
         </p:blipFill>
         <p:spPr>
           <a:xfrm>
-            <a:off x="859773" y="1825625"/>
-            <a:ext cx="9705578" cy="4256637"/>
+            <a:off x="838200" y="1825625"/>
+            <a:ext cx="10515600" cy="4351200"/>
           </a:xfrm>
           <a:prstGeom prst="rect">
             <a:avLst/>
@@ -28661,7 +29058,7 @@
   <p:cSld>
     <p:spTree>
       <p:nvGrpSpPr>
-        <p:cNvPr id="327" name="Shape 327"/>
+        <p:cNvPr id="328" name="Shape 328"/>
         <p:cNvGrpSpPr/>
         <p:nvPr/>
       </p:nvGrpSpPr>
@@ -28675,7 +29072,307 @@
       </p:grpSpPr>
       <p:sp>
         <p:nvSpPr>
-          <p:cNvPr id="328" name="Google Shape;328;p44"/>
+          <p:cNvPr id="329" name="Google Shape;329;p44"/>
+          <p:cNvSpPr txBox="1"/>
+          <p:nvPr>
+            <p:ph type="title"/>
+          </p:nvPr>
+        </p:nvSpPr>
+        <p:spPr>
+          <a:xfrm>
+            <a:off x="838200" y="365125"/>
+            <a:ext cx="10515600" cy="1325700"/>
+          </a:xfrm>
+          <a:prstGeom prst="rect">
+            <a:avLst/>
+          </a:prstGeom>
+          <a:noFill/>
+          <a:ln>
+            <a:noFill/>
+          </a:ln>
+        </p:spPr>
+        <p:txBody>
+          <a:bodyPr anchorCtr="0" anchor="ctr" bIns="45700" lIns="91425" spcFirstLastPara="1" rIns="91425" wrap="square" tIns="45700">
+            <a:noAutofit/>
+          </a:bodyPr>
+          <a:lstStyle/>
+          <a:p>
+            <a:pPr indent="0" lvl="0" marL="0" rtl="0" algn="l">
+              <a:lnSpc>
+                <a:spcPct val="90000"/>
+              </a:lnSpc>
+              <a:spcBef>
+                <a:spcPts val="0"/>
+              </a:spcBef>
+              <a:spcAft>
+                <a:spcPts val="0"/>
+              </a:spcAft>
+              <a:buSzPts val="1800"/>
+              <a:buNone/>
+            </a:pPr>
+            <a:r>
+              <a:rPr lang="en-US"/>
+              <a:t>Conversion rate by Industry Code- for Control users</a:t>
+            </a:r>
+            <a:endParaRPr/>
+          </a:p>
+        </p:txBody>
+      </p:sp>
+      <p:sp>
+        <p:nvSpPr>
+          <p:cNvPr id="330" name="Google Shape;330;p44"/>
+          <p:cNvSpPr txBox="1"/>
+          <p:nvPr>
+            <p:ph idx="1" type="body"/>
+          </p:nvPr>
+        </p:nvSpPr>
+        <p:spPr>
+          <a:xfrm>
+            <a:off x="838200" y="1825625"/>
+            <a:ext cx="10515600" cy="4351200"/>
+          </a:xfrm>
+          <a:prstGeom prst="rect">
+            <a:avLst/>
+          </a:prstGeom>
+          <a:noFill/>
+          <a:ln>
+            <a:noFill/>
+          </a:ln>
+        </p:spPr>
+        <p:txBody>
+          <a:bodyPr anchorCtr="0" anchor="t" bIns="45700" lIns="91425" spcFirstLastPara="1" rIns="91425" wrap="square" tIns="45700">
+            <a:noAutofit/>
+          </a:bodyPr>
+          <a:lstStyle/>
+          <a:p>
+            <a:pPr indent="0" lvl="0" marL="0" rtl="0" algn="l">
+              <a:lnSpc>
+                <a:spcPct val="90000"/>
+              </a:lnSpc>
+              <a:spcBef>
+                <a:spcPts val="1000"/>
+              </a:spcBef>
+              <a:spcAft>
+                <a:spcPts val="0"/>
+              </a:spcAft>
+              <a:buSzPts val="1800"/>
+              <a:buNone/>
+            </a:pPr>
+            <a:r>
+              <a:t/>
+            </a:r>
+            <a:endParaRPr/>
+          </a:p>
+        </p:txBody>
+      </p:sp>
+      <p:pic>
+        <p:nvPicPr>
+          <p:cNvPr id="331" name="Google Shape;331;p44"/>
+          <p:cNvPicPr preferRelativeResize="0"/>
+          <p:nvPr/>
+        </p:nvPicPr>
+        <p:blipFill>
+          <a:blip r:embed="rId3">
+            <a:alphaModFix/>
+          </a:blip>
+          <a:stretch>
+            <a:fillRect/>
+          </a:stretch>
+        </p:blipFill>
+        <p:spPr>
+          <a:xfrm>
+            <a:off x="838200" y="1690825"/>
+            <a:ext cx="10515600" cy="4495800"/>
+          </a:xfrm>
+          <a:prstGeom prst="rect">
+            <a:avLst/>
+          </a:prstGeom>
+          <a:noFill/>
+          <a:ln>
+            <a:noFill/>
+          </a:ln>
+        </p:spPr>
+      </p:pic>
+    </p:spTree>
+  </p:cSld>
+  <p:clrMapOvr>
+    <a:masterClrMapping/>
+  </p:clrMapOvr>
+</p:sld>
+</file>
+
+<file path=ppt/slides/slide31.xml><?xml version="1.0" encoding="utf-8"?>
+<p:sld xmlns:a="http://schemas.openxmlformats.org/drawingml/2006/main" xmlns:r="http://schemas.openxmlformats.org/officeDocument/2006/relationships" xmlns:mc="http://schemas.openxmlformats.org/markup-compatibility/2006" xmlns:mv="urn:schemas-microsoft-com:mac:vml" xmlns:p="http://schemas.openxmlformats.org/presentationml/2006/main" xmlns:c="http://schemas.openxmlformats.org/drawingml/2006/chart" xmlns:dgm="http://schemas.openxmlformats.org/drawingml/2006/diagram" xmlns:o="urn:schemas-microsoft-com:office:office" xmlns:v="urn:schemas-microsoft-com:vml" xmlns:pvml="urn:schemas-microsoft-com:office:powerpoint" xmlns:com="http://schemas.openxmlformats.org/drawingml/2006/compatibility" xmlns:p14="http://schemas.microsoft.com/office/powerpoint/2010/main" xmlns:p15="http://schemas.microsoft.com/office/powerpoint/2012/main">
+  <p:cSld>
+    <p:spTree>
+      <p:nvGrpSpPr>
+        <p:cNvPr id="335" name="Shape 335"/>
+        <p:cNvGrpSpPr/>
+        <p:nvPr/>
+      </p:nvGrpSpPr>
+      <p:grpSpPr>
+        <a:xfrm>
+          <a:off x="0" y="0"/>
+          <a:ext cx="0" cy="0"/>
+          <a:chOff x="0" y="0"/>
+          <a:chExt cx="0" cy="0"/>
+        </a:xfrm>
+      </p:grpSpPr>
+      <p:sp>
+        <p:nvSpPr>
+          <p:cNvPr id="336" name="Google Shape;336;p45"/>
+          <p:cNvSpPr txBox="1"/>
+          <p:nvPr>
+            <p:ph type="title"/>
+          </p:nvPr>
+        </p:nvSpPr>
+        <p:spPr>
+          <a:xfrm>
+            <a:off x="838200" y="365125"/>
+            <a:ext cx="10515600" cy="1325700"/>
+          </a:xfrm>
+          <a:prstGeom prst="rect">
+            <a:avLst/>
+          </a:prstGeom>
+          <a:noFill/>
+          <a:ln>
+            <a:noFill/>
+          </a:ln>
+        </p:spPr>
+        <p:txBody>
+          <a:bodyPr anchorCtr="0" anchor="ctr" bIns="45700" lIns="91425" spcFirstLastPara="1" rIns="91425" wrap="square" tIns="45700">
+            <a:noAutofit/>
+          </a:bodyPr>
+          <a:lstStyle/>
+          <a:p>
+            <a:pPr indent="0" lvl="0" marL="0" rtl="0" algn="l">
+              <a:lnSpc>
+                <a:spcPct val="90000"/>
+              </a:lnSpc>
+              <a:spcBef>
+                <a:spcPts val="0"/>
+              </a:spcBef>
+              <a:spcAft>
+                <a:spcPts val="0"/>
+              </a:spcAft>
+              <a:buClr>
+                <a:schemeClr val="dk1"/>
+              </a:buClr>
+              <a:buSzPts val="1100"/>
+              <a:buFont typeface="Arial"/>
+              <a:buNone/>
+            </a:pPr>
+            <a:r>
+              <a:rPr lang="en-US"/>
+              <a:t>Conversion rate by Industry Code- for Test users</a:t>
+            </a:r>
+            <a:endParaRPr/>
+          </a:p>
+        </p:txBody>
+      </p:sp>
+      <p:sp>
+        <p:nvSpPr>
+          <p:cNvPr id="337" name="Google Shape;337;p45"/>
+          <p:cNvSpPr txBox="1"/>
+          <p:nvPr>
+            <p:ph idx="1" type="body"/>
+          </p:nvPr>
+        </p:nvSpPr>
+        <p:spPr>
+          <a:xfrm>
+            <a:off x="838200" y="1825625"/>
+            <a:ext cx="10515600" cy="4351200"/>
+          </a:xfrm>
+          <a:prstGeom prst="rect">
+            <a:avLst/>
+          </a:prstGeom>
+          <a:noFill/>
+          <a:ln>
+            <a:noFill/>
+          </a:ln>
+        </p:spPr>
+        <p:txBody>
+          <a:bodyPr anchorCtr="0" anchor="t" bIns="45700" lIns="91425" spcFirstLastPara="1" rIns="91425" wrap="square" tIns="45700">
+            <a:noAutofit/>
+          </a:bodyPr>
+          <a:lstStyle/>
+          <a:p>
+            <a:pPr indent="0" lvl="0" marL="0" rtl="0" algn="l">
+              <a:lnSpc>
+                <a:spcPct val="90000"/>
+              </a:lnSpc>
+              <a:spcBef>
+                <a:spcPts val="1000"/>
+              </a:spcBef>
+              <a:spcAft>
+                <a:spcPts val="0"/>
+              </a:spcAft>
+              <a:buSzPts val="1800"/>
+              <a:buNone/>
+            </a:pPr>
+            <a:r>
+              <a:t/>
+            </a:r>
+            <a:endParaRPr/>
+          </a:p>
+        </p:txBody>
+      </p:sp>
+      <p:pic>
+        <p:nvPicPr>
+          <p:cNvPr id="338" name="Google Shape;338;p45"/>
+          <p:cNvPicPr preferRelativeResize="0"/>
+          <p:nvPr/>
+        </p:nvPicPr>
+        <p:blipFill>
+          <a:blip r:embed="rId3">
+            <a:alphaModFix/>
+          </a:blip>
+          <a:stretch>
+            <a:fillRect/>
+          </a:stretch>
+        </p:blipFill>
+        <p:spPr>
+          <a:xfrm>
+            <a:off x="838200" y="1690825"/>
+            <a:ext cx="10515600" cy="4476750"/>
+          </a:xfrm>
+          <a:prstGeom prst="rect">
+            <a:avLst/>
+          </a:prstGeom>
+          <a:noFill/>
+          <a:ln>
+            <a:noFill/>
+          </a:ln>
+        </p:spPr>
+      </p:pic>
+    </p:spTree>
+  </p:cSld>
+  <p:clrMapOvr>
+    <a:masterClrMapping/>
+  </p:clrMapOvr>
+</p:sld>
+</file>
+
+<file path=ppt/slides/slide32.xml><?xml version="1.0" encoding="utf-8"?>
+<p:sld xmlns:a="http://schemas.openxmlformats.org/drawingml/2006/main" xmlns:r="http://schemas.openxmlformats.org/officeDocument/2006/relationships" xmlns:mc="http://schemas.openxmlformats.org/markup-compatibility/2006" xmlns:mv="urn:schemas-microsoft-com:mac:vml" xmlns:p="http://schemas.openxmlformats.org/presentationml/2006/main" xmlns:c="http://schemas.openxmlformats.org/drawingml/2006/chart" xmlns:dgm="http://schemas.openxmlformats.org/drawingml/2006/diagram" xmlns:o="urn:schemas-microsoft-com:office:office" xmlns:v="urn:schemas-microsoft-com:vml" xmlns:pvml="urn:schemas-microsoft-com:office:powerpoint" xmlns:com="http://schemas.openxmlformats.org/drawingml/2006/compatibility" xmlns:p14="http://schemas.microsoft.com/office/powerpoint/2010/main" xmlns:p15="http://schemas.microsoft.com/office/powerpoint/2012/main">
+  <p:cSld>
+    <p:spTree>
+      <p:nvGrpSpPr>
+        <p:cNvPr id="342" name="Shape 342"/>
+        <p:cNvGrpSpPr/>
+        <p:nvPr/>
+      </p:nvGrpSpPr>
+      <p:grpSpPr>
+        <a:xfrm>
+          <a:off x="0" y="0"/>
+          <a:ext cx="0" cy="0"/>
+          <a:chOff x="0" y="0"/>
+          <a:chExt cx="0" cy="0"/>
+        </a:xfrm>
+      </p:grpSpPr>
+      <p:sp>
+        <p:nvSpPr>
+          <p:cNvPr id="343" name="Google Shape;343;p46"/>
           <p:cNvSpPr txBox="1"/>
           <p:nvPr>
             <p:ph type="title"/>
@@ -28718,6 +29415,113 @@
             </a:pPr>
             <a:r>
               <a:rPr lang="en-US" sz="2400"/>
+              <a:t>Conversation rate compared to source distribution: </a:t>
+            </a:r>
+            <a:r>
+              <a:rPr lang="en-US" sz="1800"/>
+              <a:t>here we see that most visitors were coming from Facebook and Linkedin but when it comes to converting almost all three sources show a high rate of conversion, hence no additional changes are required from a business point of view.</a:t>
+            </a:r>
+            <a:endParaRPr/>
+          </a:p>
+        </p:txBody>
+      </p:sp>
+      <p:pic>
+        <p:nvPicPr>
+          <p:cNvPr id="344" name="Google Shape;344;p46"/>
+          <p:cNvPicPr preferRelativeResize="0"/>
+          <p:nvPr/>
+        </p:nvPicPr>
+        <p:blipFill rotWithShape="1">
+          <a:blip r:embed="rId3">
+            <a:alphaModFix/>
+          </a:blip>
+          <a:srcRect b="0" l="0" r="0" t="0"/>
+          <a:stretch/>
+        </p:blipFill>
+        <p:spPr>
+          <a:xfrm>
+            <a:off x="859773" y="1825625"/>
+            <a:ext cx="9705578" cy="4256637"/>
+          </a:xfrm>
+          <a:prstGeom prst="rect">
+            <a:avLst/>
+          </a:prstGeom>
+          <a:noFill/>
+          <a:ln>
+            <a:noFill/>
+          </a:ln>
+        </p:spPr>
+      </p:pic>
+    </p:spTree>
+  </p:cSld>
+  <p:clrMapOvr>
+    <a:masterClrMapping/>
+  </p:clrMapOvr>
+</p:sld>
+</file>
+
+<file path=ppt/slides/slide33.xml><?xml version="1.0" encoding="utf-8"?>
+<p:sld xmlns:a="http://schemas.openxmlformats.org/drawingml/2006/main" xmlns:r="http://schemas.openxmlformats.org/officeDocument/2006/relationships" xmlns:mc="http://schemas.openxmlformats.org/markup-compatibility/2006" xmlns:mv="urn:schemas-microsoft-com:mac:vml" xmlns:p="http://schemas.openxmlformats.org/presentationml/2006/main" xmlns:c="http://schemas.openxmlformats.org/drawingml/2006/chart" xmlns:dgm="http://schemas.openxmlformats.org/drawingml/2006/diagram" xmlns:o="urn:schemas-microsoft-com:office:office" xmlns:v="urn:schemas-microsoft-com:vml" xmlns:pvml="urn:schemas-microsoft-com:office:powerpoint" xmlns:com="http://schemas.openxmlformats.org/drawingml/2006/compatibility" xmlns:p14="http://schemas.microsoft.com/office/powerpoint/2010/main" xmlns:p15="http://schemas.microsoft.com/office/powerpoint/2012/main">
+  <p:cSld>
+    <p:spTree>
+      <p:nvGrpSpPr>
+        <p:cNvPr id="348" name="Shape 348"/>
+        <p:cNvGrpSpPr/>
+        <p:nvPr/>
+      </p:nvGrpSpPr>
+      <p:grpSpPr>
+        <a:xfrm>
+          <a:off x="0" y="0"/>
+          <a:ext cx="0" cy="0"/>
+          <a:chOff x="0" y="0"/>
+          <a:chExt cx="0" cy="0"/>
+        </a:xfrm>
+      </p:grpSpPr>
+      <p:sp>
+        <p:nvSpPr>
+          <p:cNvPr id="349" name="Google Shape;349;p47"/>
+          <p:cNvSpPr txBox="1"/>
+          <p:nvPr>
+            <p:ph type="title"/>
+          </p:nvPr>
+        </p:nvSpPr>
+        <p:spPr>
+          <a:xfrm>
+            <a:off x="838200" y="365125"/>
+            <a:ext cx="10515600" cy="1325563"/>
+          </a:xfrm>
+          <a:prstGeom prst="rect">
+            <a:avLst/>
+          </a:prstGeom>
+          <a:noFill/>
+          <a:ln>
+            <a:noFill/>
+          </a:ln>
+        </p:spPr>
+        <p:txBody>
+          <a:bodyPr anchorCtr="0" anchor="ctr" bIns="45700" lIns="91425" spcFirstLastPara="1" rIns="91425" wrap="square" tIns="45700">
+            <a:noAutofit/>
+          </a:bodyPr>
+          <a:lstStyle/>
+          <a:p>
+            <a:pPr indent="0" lvl="0" marL="0" rtl="0" algn="l">
+              <a:lnSpc>
+                <a:spcPct val="90000"/>
+              </a:lnSpc>
+              <a:spcBef>
+                <a:spcPts val="0"/>
+              </a:spcBef>
+              <a:spcAft>
+                <a:spcPts val="0"/>
+              </a:spcAft>
+              <a:buClr>
+                <a:schemeClr val="dk1"/>
+              </a:buClr>
+              <a:buSzPts val="1800"/>
+              <a:buNone/>
+            </a:pPr>
+            <a:r>
+              <a:rPr lang="en-US" sz="2400"/>
               <a:t>Conversion rate by industry code: </a:t>
             </a:r>
             <a:r>
@@ -28730,7 +29534,7 @@
       </p:sp>
       <p:pic>
         <p:nvPicPr>
-          <p:cNvPr id="329" name="Google Shape;329;p44"/>
+          <p:cNvPr id="350" name="Google Shape;350;p47"/>
           <p:cNvPicPr preferRelativeResize="0"/>
           <p:nvPr/>
         </p:nvPicPr>
@@ -28763,12 +29567,12 @@
 </p:sld>
 </file>
 
-<file path=ppt/slides/slide31.xml><?xml version="1.0" encoding="utf-8"?>
+<file path=ppt/slides/slide34.xml><?xml version="1.0" encoding="utf-8"?>
 <p:sld xmlns:a="http://schemas.openxmlformats.org/drawingml/2006/main" xmlns:r="http://schemas.openxmlformats.org/officeDocument/2006/relationships" xmlns:mc="http://schemas.openxmlformats.org/markup-compatibility/2006" xmlns:mv="urn:schemas-microsoft-com:mac:vml" xmlns:p="http://schemas.openxmlformats.org/presentationml/2006/main" xmlns:c="http://schemas.openxmlformats.org/drawingml/2006/chart" xmlns:dgm="http://schemas.openxmlformats.org/drawingml/2006/diagram" xmlns:o="urn:schemas-microsoft-com:office:office" xmlns:v="urn:schemas-microsoft-com:vml" xmlns:pvml="urn:schemas-microsoft-com:office:powerpoint" xmlns:com="http://schemas.openxmlformats.org/drawingml/2006/compatibility" xmlns:p14="http://schemas.microsoft.com/office/powerpoint/2010/main" xmlns:p15="http://schemas.microsoft.com/office/powerpoint/2012/main">
   <p:cSld>
     <p:spTree>
       <p:nvGrpSpPr>
-        <p:cNvPr id="333" name="Shape 333"/>
+        <p:cNvPr id="354" name="Shape 354"/>
         <p:cNvGrpSpPr/>
         <p:nvPr/>
       </p:nvGrpSpPr>
@@ -28782,7 +29586,7 @@
       </p:grpSpPr>
       <p:sp>
         <p:nvSpPr>
-          <p:cNvPr id="334" name="Google Shape;334;p45"/>
+          <p:cNvPr id="355" name="Google Shape;355;p48"/>
           <p:cNvSpPr txBox="1"/>
           <p:nvPr>
             <p:ph type="title"/>
@@ -28833,7 +29637,7 @@
       </p:sp>
       <p:pic>
         <p:nvPicPr>
-          <p:cNvPr id="335" name="Google Shape;335;p45"/>
+          <p:cNvPr id="356" name="Google Shape;356;p48"/>
           <p:cNvPicPr preferRelativeResize="0"/>
           <p:nvPr/>
         </p:nvPicPr>
@@ -31296,6 +32100,285 @@
 </file>
 
 <file path=ppt/theme/theme2.xml><?xml version="1.0" encoding="utf-8"?>
+<a:theme xmlns:a="http://schemas.openxmlformats.org/drawingml/2006/main" xmlns:r="http://schemas.openxmlformats.org/officeDocument/2006/relationships" name="Office Theme">
+  <a:themeElements>
+    <a:clrScheme name="Office">
+      <a:dk1>
+        <a:srgbClr val="000000"/>
+      </a:dk1>
+      <a:lt1>
+        <a:srgbClr val="FFFFFF"/>
+      </a:lt1>
+      <a:dk2>
+        <a:srgbClr val="44546A"/>
+      </a:dk2>
+      <a:lt2>
+        <a:srgbClr val="E7E6E6"/>
+      </a:lt2>
+      <a:accent1>
+        <a:srgbClr val="4472C4"/>
+      </a:accent1>
+      <a:accent2>
+        <a:srgbClr val="ED7D31"/>
+      </a:accent2>
+      <a:accent3>
+        <a:srgbClr val="A5A5A5"/>
+      </a:accent3>
+      <a:accent4>
+        <a:srgbClr val="FFC000"/>
+      </a:accent4>
+      <a:accent5>
+        <a:srgbClr val="5B9BD5"/>
+      </a:accent5>
+      <a:accent6>
+        <a:srgbClr val="70AD47"/>
+      </a:accent6>
+      <a:hlink>
+        <a:srgbClr val="0563C1"/>
+      </a:hlink>
+      <a:folHlink>
+        <a:srgbClr val="954F72"/>
+      </a:folHlink>
+    </a:clrScheme>
+    <a:fontScheme name="Office">
+      <a:majorFont>
+        <a:latin typeface="Arial"/>
+        <a:ea typeface=""/>
+        <a:cs typeface=""/>
+        <a:font script="Jpan" typeface="ＭＳ Ｐゴシック"/>
+        <a:font script="Hang" typeface="맑은 고딕"/>
+        <a:font script="Hans" typeface="宋体"/>
+        <a:font script="Hant" typeface="新細明體"/>
+        <a:font script="Arab" typeface="Times New Roman"/>
+        <a:font script="Hebr" typeface="Times New Roman"/>
+        <a:font script="Thai" typeface="Angsana New"/>
+        <a:font script="Ethi" typeface="Nyala"/>
+        <a:font script="Beng" typeface="Vrinda"/>
+        <a:font script="Gujr" typeface="Shruti"/>
+        <a:font script="Khmr" typeface="MoolBoran"/>
+        <a:font script="Knda" typeface="Tunga"/>
+        <a:font script="Guru" typeface="Raavi"/>
+        <a:font script="Cans" typeface="Euphemia"/>
+        <a:font script="Cher" typeface="Plantagenet Cherokee"/>
+        <a:font script="Yiii" typeface="Microsoft Yi Baiti"/>
+        <a:font script="Tibt" typeface="Microsoft Himalaya"/>
+        <a:font script="Thaa" typeface="MV Boli"/>
+        <a:font script="Deva" typeface="Mangal"/>
+        <a:font script="Telu" typeface="Gautami"/>
+        <a:font script="Taml" typeface="Latha"/>
+        <a:font script="Syrc" typeface="Estrangelo Edessa"/>
+        <a:font script="Orya" typeface="Kalinga"/>
+        <a:font script="Mlym" typeface="Kartika"/>
+        <a:font script="Laoo" typeface="DokChampa"/>
+        <a:font script="Sinh" typeface="Iskoola Pota"/>
+        <a:font script="Mong" typeface="Mongolian Baiti"/>
+        <a:font script="Viet" typeface="Times New Roman"/>
+        <a:font script="Uigh" typeface="Microsoft Uighur"/>
+        <a:font script="Geor" typeface="Sylfaen"/>
+      </a:majorFont>
+      <a:minorFont>
+        <a:latin typeface="Arial"/>
+        <a:ea typeface=""/>
+        <a:cs typeface=""/>
+        <a:font script="Jpan" typeface="ＭＳ Ｐゴシック"/>
+        <a:font script="Hang" typeface="맑은 고딕"/>
+        <a:font script="Hans" typeface="宋体"/>
+        <a:font script="Hant" typeface="新細明體"/>
+        <a:font script="Arab" typeface="Arial"/>
+        <a:font script="Hebr" typeface="Arial"/>
+        <a:font script="Thai" typeface="Cordia New"/>
+        <a:font script="Ethi" typeface="Nyala"/>
+        <a:font script="Beng" typeface="Vrinda"/>
+        <a:font script="Gujr" typeface="Shruti"/>
+        <a:font script="Khmr" typeface="DaunPenh"/>
+        <a:font script="Knda" typeface="Tunga"/>
+        <a:font script="Guru" typeface="Raavi"/>
+        <a:font script="Cans" typeface="Euphemia"/>
+        <a:font script="Cher" typeface="Plantagenet Cherokee"/>
+        <a:font script="Yiii" typeface="Microsoft Yi Baiti"/>
+        <a:font script="Tibt" typeface="Microsoft Himalaya"/>
+        <a:font script="Thaa" typeface="MV Boli"/>
+        <a:font script="Deva" typeface="Mangal"/>
+        <a:font script="Telu" typeface="Gautami"/>
+        <a:font script="Taml" typeface="Latha"/>
+        <a:font script="Syrc" typeface="Estrangelo Edessa"/>
+        <a:font script="Orya" typeface="Kalinga"/>
+        <a:font script="Mlym" typeface="Kartika"/>
+        <a:font script="Laoo" typeface="DokChampa"/>
+        <a:font script="Sinh" typeface="Iskoola Pota"/>
+        <a:font script="Mong" typeface="Mongolian Baiti"/>
+        <a:font script="Viet" typeface="Arial"/>
+        <a:font script="Uigh" typeface="Microsoft Uighur"/>
+        <a:font script="Geor" typeface="Sylfaen"/>
+      </a:minorFont>
+    </a:fontScheme>
+    <a:fmtScheme name="Office">
+      <a:fillStyleLst>
+        <a:solidFill>
+          <a:schemeClr val="phClr"/>
+        </a:solidFill>
+        <a:gradFill rotWithShape="1">
+          <a:gsLst>
+            <a:gs pos="0">
+              <a:schemeClr val="phClr">
+                <a:tint val="50000"/>
+                <a:satMod val="300000"/>
+              </a:schemeClr>
+            </a:gs>
+            <a:gs pos="35000">
+              <a:schemeClr val="phClr">
+                <a:tint val="37000"/>
+                <a:satMod val="300000"/>
+              </a:schemeClr>
+            </a:gs>
+            <a:gs pos="100000">
+              <a:schemeClr val="phClr">
+                <a:tint val="15000"/>
+                <a:satMod val="350000"/>
+              </a:schemeClr>
+            </a:gs>
+          </a:gsLst>
+          <a:lin ang="16200000" scaled="1"/>
+        </a:gradFill>
+        <a:gradFill rotWithShape="1">
+          <a:gsLst>
+            <a:gs pos="0">
+              <a:schemeClr val="phClr">
+                <a:tint val="100000"/>
+                <a:shade val="100000"/>
+                <a:satMod val="130000"/>
+              </a:schemeClr>
+            </a:gs>
+            <a:gs pos="100000">
+              <a:schemeClr val="phClr">
+                <a:tint val="50000"/>
+                <a:shade val="100000"/>
+                <a:satMod val="350000"/>
+              </a:schemeClr>
+            </a:gs>
+          </a:gsLst>
+          <a:lin ang="16200000" scaled="0"/>
+        </a:gradFill>
+      </a:fillStyleLst>
+      <a:lnStyleLst>
+        <a:ln w="9525" cap="flat" cmpd="sng" algn="ctr">
+          <a:solidFill>
+            <a:schemeClr val="phClr">
+              <a:shade val="95000"/>
+              <a:satMod val="105000"/>
+            </a:schemeClr>
+          </a:solidFill>
+          <a:prstDash val="solid"/>
+        </a:ln>
+        <a:ln w="25400" cap="flat" cmpd="sng" algn="ctr">
+          <a:solidFill>
+            <a:schemeClr val="phClr"/>
+          </a:solidFill>
+          <a:prstDash val="solid"/>
+        </a:ln>
+        <a:ln w="38100" cap="flat" cmpd="sng" algn="ctr">
+          <a:solidFill>
+            <a:schemeClr val="phClr"/>
+          </a:solidFill>
+          <a:prstDash val="solid"/>
+        </a:ln>
+      </a:lnStyleLst>
+      <a:effectStyleLst>
+        <a:effectStyle>
+          <a:effectLst>
+            <a:outerShdw blurRad="40000" dist="20000" dir="5400000" rotWithShape="0">
+              <a:srgbClr val="000000">
+                <a:alpha val="38000"/>
+              </a:srgbClr>
+            </a:outerShdw>
+          </a:effectLst>
+        </a:effectStyle>
+        <a:effectStyle>
+          <a:effectLst>
+            <a:outerShdw blurRad="40000" dist="23000" dir="5400000" rotWithShape="0">
+              <a:srgbClr val="000000">
+                <a:alpha val="35000"/>
+              </a:srgbClr>
+            </a:outerShdw>
+          </a:effectLst>
+        </a:effectStyle>
+        <a:effectStyle>
+          <a:effectLst>
+            <a:outerShdw blurRad="40000" dist="23000" dir="5400000" rotWithShape="0">
+              <a:srgbClr val="000000">
+                <a:alpha val="35000"/>
+              </a:srgbClr>
+            </a:outerShdw>
+          </a:effectLst>
+          <a:scene3d>
+            <a:camera prst="orthographicFront">
+              <a:rot lat="0" lon="0" rev="0"/>
+            </a:camera>
+            <a:lightRig rig="threePt" dir="t">
+              <a:rot lat="0" lon="0" rev="1200000"/>
+            </a:lightRig>
+          </a:scene3d>
+          <a:sp3d>
+            <a:bevelT w="63500" h="25400"/>
+          </a:sp3d>
+        </a:effectStyle>
+      </a:effectStyleLst>
+      <a:bgFillStyleLst>
+        <a:solidFill>
+          <a:schemeClr val="phClr"/>
+        </a:solidFill>
+        <a:gradFill rotWithShape="1">
+          <a:gsLst>
+            <a:gs pos="0">
+              <a:schemeClr val="phClr">
+                <a:tint val="40000"/>
+                <a:satMod val="350000"/>
+              </a:schemeClr>
+            </a:gs>
+            <a:gs pos="40000">
+              <a:schemeClr val="phClr">
+                <a:tint val="45000"/>
+                <a:shade val="99000"/>
+                <a:satMod val="350000"/>
+              </a:schemeClr>
+            </a:gs>
+            <a:gs pos="100000">
+              <a:schemeClr val="phClr">
+                <a:shade val="20000"/>
+                <a:satMod val="255000"/>
+              </a:schemeClr>
+            </a:gs>
+          </a:gsLst>
+          <a:path path="circle">
+            <a:fillToRect l="50000" t="-80000" r="50000" b="180000"/>
+          </a:path>
+        </a:gradFill>
+        <a:gradFill rotWithShape="1">
+          <a:gsLst>
+            <a:gs pos="0">
+              <a:schemeClr val="phClr">
+                <a:tint val="80000"/>
+                <a:satMod val="300000"/>
+              </a:schemeClr>
+            </a:gs>
+            <a:gs pos="100000">
+              <a:schemeClr val="phClr">
+                <a:shade val="30000"/>
+                <a:satMod val="200000"/>
+              </a:schemeClr>
+            </a:gs>
+          </a:gsLst>
+          <a:path path="circle">
+            <a:fillToRect l="50000" t="50000" r="50000" b="50000"/>
+          </a:path>
+        </a:gradFill>
+      </a:bgFillStyleLst>
+    </a:fmtScheme>
+  </a:themeElements>
+</a:theme>
+</file>
+
+<file path=ppt/theme/theme3.xml><?xml version="1.0" encoding="utf-8"?>
 <a:theme xmlns:a="http://schemas.openxmlformats.org/drawingml/2006/main" xmlns:r="http://schemas.openxmlformats.org/officeDocument/2006/relationships">
   <a:themeElements>
     <a:clrScheme name="Default">
@@ -31572,283 +32655,4 @@
     </a:fmtScheme>
   </a:themeElements>
 </a:theme>
-</file>
-
-<file path=ppt/theme/theme3.xml><?xml version="1.0" encoding="utf-8"?>
-<a:theme xmlns:a="http://schemas.openxmlformats.org/drawingml/2006/main" xmlns:r="http://schemas.openxmlformats.org/officeDocument/2006/relationships" name="Office Theme">
-  <a:themeElements>
-    <a:clrScheme name="Office">
-      <a:dk1>
-        <a:srgbClr val="000000"/>
-      </a:dk1>
-      <a:lt1>
-        <a:srgbClr val="FFFFFF"/>
-      </a:lt1>
-      <a:dk2>
-        <a:srgbClr val="44546A"/>
-      </a:dk2>
-      <a:lt2>
-        <a:srgbClr val="E7E6E6"/>
-      </a:lt2>
-      <a:accent1>
-        <a:srgbClr val="4472C4"/>
-      </a:accent1>
-      <a:accent2>
-        <a:srgbClr val="ED7D31"/>
-      </a:accent2>
-      <a:accent3>
-        <a:srgbClr val="A5A5A5"/>
-      </a:accent3>
-      <a:accent4>
-        <a:srgbClr val="FFC000"/>
-      </a:accent4>
-      <a:accent5>
-        <a:srgbClr val="5B9BD5"/>
-      </a:accent5>
-      <a:accent6>
-        <a:srgbClr val="70AD47"/>
-      </a:accent6>
-      <a:hlink>
-        <a:srgbClr val="0563C1"/>
-      </a:hlink>
-      <a:folHlink>
-        <a:srgbClr val="954F72"/>
-      </a:folHlink>
-    </a:clrScheme>
-    <a:fontScheme name="Office">
-      <a:majorFont>
-        <a:latin typeface="Arial"/>
-        <a:ea typeface=""/>
-        <a:cs typeface=""/>
-        <a:font script="Jpan" typeface="ＭＳ Ｐゴシック"/>
-        <a:font script="Hang" typeface="맑은 고딕"/>
-        <a:font script="Hans" typeface="宋体"/>
-        <a:font script="Hant" typeface="新細明體"/>
-        <a:font script="Arab" typeface="Times New Roman"/>
-        <a:font script="Hebr" typeface="Times New Roman"/>
-        <a:font script="Thai" typeface="Angsana New"/>
-        <a:font script="Ethi" typeface="Nyala"/>
-        <a:font script="Beng" typeface="Vrinda"/>
-        <a:font script="Gujr" typeface="Shruti"/>
-        <a:font script="Khmr" typeface="MoolBoran"/>
-        <a:font script="Knda" typeface="Tunga"/>
-        <a:font script="Guru" typeface="Raavi"/>
-        <a:font script="Cans" typeface="Euphemia"/>
-        <a:font script="Cher" typeface="Plantagenet Cherokee"/>
-        <a:font script="Yiii" typeface="Microsoft Yi Baiti"/>
-        <a:font script="Tibt" typeface="Microsoft Himalaya"/>
-        <a:font script="Thaa" typeface="MV Boli"/>
-        <a:font script="Deva" typeface="Mangal"/>
-        <a:font script="Telu" typeface="Gautami"/>
-        <a:font script="Taml" typeface="Latha"/>
-        <a:font script="Syrc" typeface="Estrangelo Edessa"/>
-        <a:font script="Orya" typeface="Kalinga"/>
-        <a:font script="Mlym" typeface="Kartika"/>
-        <a:font script="Laoo" typeface="DokChampa"/>
-        <a:font script="Sinh" typeface="Iskoola Pota"/>
-        <a:font script="Mong" typeface="Mongolian Baiti"/>
-        <a:font script="Viet" typeface="Times New Roman"/>
-        <a:font script="Uigh" typeface="Microsoft Uighur"/>
-        <a:font script="Geor" typeface="Sylfaen"/>
-      </a:majorFont>
-      <a:minorFont>
-        <a:latin typeface="Arial"/>
-        <a:ea typeface=""/>
-        <a:cs typeface=""/>
-        <a:font script="Jpan" typeface="ＭＳ Ｐゴシック"/>
-        <a:font script="Hang" typeface="맑은 고딕"/>
-        <a:font script="Hans" typeface="宋体"/>
-        <a:font script="Hant" typeface="新細明體"/>
-        <a:font script="Arab" typeface="Arial"/>
-        <a:font script="Hebr" typeface="Arial"/>
-        <a:font script="Thai" typeface="Cordia New"/>
-        <a:font script="Ethi" typeface="Nyala"/>
-        <a:font script="Beng" typeface="Vrinda"/>
-        <a:font script="Gujr" typeface="Shruti"/>
-        <a:font script="Khmr" typeface="DaunPenh"/>
-        <a:font script="Knda" typeface="Tunga"/>
-        <a:font script="Guru" typeface="Raavi"/>
-        <a:font script="Cans" typeface="Euphemia"/>
-        <a:font script="Cher" typeface="Plantagenet Cherokee"/>
-        <a:font script="Yiii" typeface="Microsoft Yi Baiti"/>
-        <a:font script="Tibt" typeface="Microsoft Himalaya"/>
-        <a:font script="Thaa" typeface="MV Boli"/>
-        <a:font script="Deva" typeface="Mangal"/>
-        <a:font script="Telu" typeface="Gautami"/>
-        <a:font script="Taml" typeface="Latha"/>
-        <a:font script="Syrc" typeface="Estrangelo Edessa"/>
-        <a:font script="Orya" typeface="Kalinga"/>
-        <a:font script="Mlym" typeface="Kartika"/>
-        <a:font script="Laoo" typeface="DokChampa"/>
-        <a:font script="Sinh" typeface="Iskoola Pota"/>
-        <a:font script="Mong" typeface="Mongolian Baiti"/>
-        <a:font script="Viet" typeface="Arial"/>
-        <a:font script="Uigh" typeface="Microsoft Uighur"/>
-        <a:font script="Geor" typeface="Sylfaen"/>
-      </a:minorFont>
-    </a:fontScheme>
-    <a:fmtScheme name="Office">
-      <a:fillStyleLst>
-        <a:solidFill>
-          <a:schemeClr val="phClr"/>
-        </a:solidFill>
-        <a:gradFill rotWithShape="1">
-          <a:gsLst>
-            <a:gs pos="0">
-              <a:schemeClr val="phClr">
-                <a:tint val="50000"/>
-                <a:satMod val="300000"/>
-              </a:schemeClr>
-            </a:gs>
-            <a:gs pos="35000">
-              <a:schemeClr val="phClr">
-                <a:tint val="37000"/>
-                <a:satMod val="300000"/>
-              </a:schemeClr>
-            </a:gs>
-            <a:gs pos="100000">
-              <a:schemeClr val="phClr">
-                <a:tint val="15000"/>
-                <a:satMod val="350000"/>
-              </a:schemeClr>
-            </a:gs>
-          </a:gsLst>
-          <a:lin ang="16200000" scaled="1"/>
-        </a:gradFill>
-        <a:gradFill rotWithShape="1">
-          <a:gsLst>
-            <a:gs pos="0">
-              <a:schemeClr val="phClr">
-                <a:tint val="100000"/>
-                <a:shade val="100000"/>
-                <a:satMod val="130000"/>
-              </a:schemeClr>
-            </a:gs>
-            <a:gs pos="100000">
-              <a:schemeClr val="phClr">
-                <a:tint val="50000"/>
-                <a:shade val="100000"/>
-                <a:satMod val="350000"/>
-              </a:schemeClr>
-            </a:gs>
-          </a:gsLst>
-          <a:lin ang="16200000" scaled="0"/>
-        </a:gradFill>
-      </a:fillStyleLst>
-      <a:lnStyleLst>
-        <a:ln w="9525" cap="flat" cmpd="sng" algn="ctr">
-          <a:solidFill>
-            <a:schemeClr val="phClr">
-              <a:shade val="95000"/>
-              <a:satMod val="105000"/>
-            </a:schemeClr>
-          </a:solidFill>
-          <a:prstDash val="solid"/>
-        </a:ln>
-        <a:ln w="25400" cap="flat" cmpd="sng" algn="ctr">
-          <a:solidFill>
-            <a:schemeClr val="phClr"/>
-          </a:solidFill>
-          <a:prstDash val="solid"/>
-        </a:ln>
-        <a:ln w="38100" cap="flat" cmpd="sng" algn="ctr">
-          <a:solidFill>
-            <a:schemeClr val="phClr"/>
-          </a:solidFill>
-          <a:prstDash val="solid"/>
-        </a:ln>
-      </a:lnStyleLst>
-      <a:effectStyleLst>
-        <a:effectStyle>
-          <a:effectLst>
-            <a:outerShdw blurRad="40000" dist="20000" dir="5400000" rotWithShape="0">
-              <a:srgbClr val="000000">
-                <a:alpha val="38000"/>
-              </a:srgbClr>
-            </a:outerShdw>
-          </a:effectLst>
-        </a:effectStyle>
-        <a:effectStyle>
-          <a:effectLst>
-            <a:outerShdw blurRad="40000" dist="23000" dir="5400000" rotWithShape="0">
-              <a:srgbClr val="000000">
-                <a:alpha val="35000"/>
-              </a:srgbClr>
-            </a:outerShdw>
-          </a:effectLst>
-        </a:effectStyle>
-        <a:effectStyle>
-          <a:effectLst>
-            <a:outerShdw blurRad="40000" dist="23000" dir="5400000" rotWithShape="0">
-              <a:srgbClr val="000000">
-                <a:alpha val="35000"/>
-              </a:srgbClr>
-            </a:outerShdw>
-          </a:effectLst>
-          <a:scene3d>
-            <a:camera prst="orthographicFront">
-              <a:rot lat="0" lon="0" rev="0"/>
-            </a:camera>
-            <a:lightRig rig="threePt" dir="t">
-              <a:rot lat="0" lon="0" rev="1200000"/>
-            </a:lightRig>
-          </a:scene3d>
-          <a:sp3d>
-            <a:bevelT w="63500" h="25400"/>
-          </a:sp3d>
-        </a:effectStyle>
-      </a:effectStyleLst>
-      <a:bgFillStyleLst>
-        <a:solidFill>
-          <a:schemeClr val="phClr"/>
-        </a:solidFill>
-        <a:gradFill rotWithShape="1">
-          <a:gsLst>
-            <a:gs pos="0">
-              <a:schemeClr val="phClr">
-                <a:tint val="40000"/>
-                <a:satMod val="350000"/>
-              </a:schemeClr>
-            </a:gs>
-            <a:gs pos="40000">
-              <a:schemeClr val="phClr">
-                <a:tint val="45000"/>
-                <a:shade val="99000"/>
-                <a:satMod val="350000"/>
-              </a:schemeClr>
-            </a:gs>
-            <a:gs pos="100000">
-              <a:schemeClr val="phClr">
-                <a:shade val="20000"/>
-                <a:satMod val="255000"/>
-              </a:schemeClr>
-            </a:gs>
-          </a:gsLst>
-          <a:path path="circle">
-            <a:fillToRect l="50000" t="-80000" r="50000" b="180000"/>
-          </a:path>
-        </a:gradFill>
-        <a:gradFill rotWithShape="1">
-          <a:gsLst>
-            <a:gs pos="0">
-              <a:schemeClr val="phClr">
-                <a:tint val="80000"/>
-                <a:satMod val="300000"/>
-              </a:schemeClr>
-            </a:gs>
-            <a:gs pos="100000">
-              <a:schemeClr val="phClr">
-                <a:shade val="30000"/>
-                <a:satMod val="200000"/>
-              </a:schemeClr>
-            </a:gs>
-          </a:gsLst>
-          <a:path path="circle">
-            <a:fillToRect l="50000" t="50000" r="50000" b="50000"/>
-          </a:path>
-        </a:gradFill>
-      </a:bgFillStyleLst>
-    </a:fmtScheme>
-  </a:themeElements>
-</a:theme>
 </file>
</xml_diff>